<commit_message>
actualizacion info power point
</commit_message>
<xml_diff>
--- a/Lógica de programación.pptx
+++ b/Lógica de programación.pptx
@@ -13,6 +13,11 @@
     <p:sldId id="261" r:id="rId7"/>
     <p:sldId id="262" r:id="rId8"/>
     <p:sldId id="263" r:id="rId9"/>
+    <p:sldId id="264" r:id="rId10"/>
+    <p:sldId id="265" r:id="rId11"/>
+    <p:sldId id="266" r:id="rId12"/>
+    <p:sldId id="267" r:id="rId13"/>
+    <p:sldId id="268" r:id="rId14"/>
   </p:sldIdLst>
   <p:sldSz cx="12192000" cy="6858000"/>
   <p:notesSz cx="6858000" cy="9144000"/>
@@ -111,6 +116,11 @@
       </a:defRPr>
     </a:lvl9pPr>
   </p:defaultTextStyle>
+  <p:extLst>
+    <p:ext uri="{EFAFB233-063F-42B5-8137-9DF3F51BA10A}">
+      <p15:sldGuideLst xmlns:p15="http://schemas.microsoft.com/office/powerpoint/2012/main"/>
+    </p:ext>
+  </p:extLst>
 </p:presentation>
 </file>
 
@@ -3348,10 +3358,24 @@
         </dgm:presLayoutVars>
       </dgm:prSet>
       <dgm:spPr/>
+      <dgm:t>
+        <a:bodyPr/>
+        <a:lstStyle/>
+        <a:p>
+          <a:endParaRPr lang="es-ES"/>
+        </a:p>
+      </dgm:t>
     </dgm:pt>
     <dgm:pt modelId="{750555E1-A28D-424D-A120-1314C822B5F8}" type="pres">
       <dgm:prSet presAssocID="{753C41A9-34B2-4759-8459-44FCB814A873}" presName="centerShape" presStyleLbl="node0" presStyleIdx="0" presStyleCnt="1"/>
       <dgm:spPr/>
+      <dgm:t>
+        <a:bodyPr/>
+        <a:lstStyle/>
+        <a:p>
+          <a:endParaRPr lang="es-ES"/>
+        </a:p>
+      </dgm:t>
     </dgm:pt>
     <dgm:pt modelId="{720CD217-6B6F-4C66-9827-3F530B72EB5D}" type="pres">
       <dgm:prSet presAssocID="{4092E42B-3105-4807-9EEC-B7274586BB46}" presName="node" presStyleLbl="node1" presStyleIdx="0" presStyleCnt="5">
@@ -3375,6 +3399,13 @@
     <dgm:pt modelId="{DB3006ED-35AC-4A39-BDEB-A0881FDF8D87}" type="pres">
       <dgm:prSet presAssocID="{539FF677-4652-4C9C-85C6-BE45298849DA}" presName="sibTrans" presStyleLbl="sibTrans2D1" presStyleIdx="0" presStyleCnt="5"/>
       <dgm:spPr/>
+      <dgm:t>
+        <a:bodyPr/>
+        <a:lstStyle/>
+        <a:p>
+          <a:endParaRPr lang="es-ES"/>
+        </a:p>
+      </dgm:t>
     </dgm:pt>
     <dgm:pt modelId="{FA01F4A9-4DBF-4C57-A0CE-07D509A185E7}" type="pres">
       <dgm:prSet presAssocID="{F6982B39-5484-4A53-846D-A84C7A19FD13}" presName="node" presStyleLbl="node1" presStyleIdx="1" presStyleCnt="5" custRadScaleRad="100183" custRadScaleInc="-1330">
@@ -3383,6 +3414,13 @@
         </dgm:presLayoutVars>
       </dgm:prSet>
       <dgm:spPr/>
+      <dgm:t>
+        <a:bodyPr/>
+        <a:lstStyle/>
+        <a:p>
+          <a:endParaRPr lang="es-ES"/>
+        </a:p>
+      </dgm:t>
     </dgm:pt>
     <dgm:pt modelId="{6DD499CB-7F14-4C9B-87C5-AEB06F86F683}" type="pres">
       <dgm:prSet presAssocID="{F6982B39-5484-4A53-846D-A84C7A19FD13}" presName="dummy" presStyleCnt="0"/>
@@ -3391,6 +3429,13 @@
     <dgm:pt modelId="{F052CEAA-AEB4-454B-87AB-B05C1AB670C2}" type="pres">
       <dgm:prSet presAssocID="{024D7616-0CEE-46BE-AC81-A76BEF22C50D}" presName="sibTrans" presStyleLbl="sibTrans2D1" presStyleIdx="1" presStyleCnt="5"/>
       <dgm:spPr/>
+      <dgm:t>
+        <a:bodyPr/>
+        <a:lstStyle/>
+        <a:p>
+          <a:endParaRPr lang="es-ES"/>
+        </a:p>
+      </dgm:t>
     </dgm:pt>
     <dgm:pt modelId="{86C66C06-80B9-48BF-821C-73603074C5B1}" type="pres">
       <dgm:prSet presAssocID="{CA82F33A-F0E5-4821-8602-94FCF7777017}" presName="node" presStyleLbl="node1" presStyleIdx="2" presStyleCnt="5">
@@ -3414,6 +3459,13 @@
     <dgm:pt modelId="{EF84FA0B-7C07-42F2-8BEB-1B4C71321AC6}" type="pres">
       <dgm:prSet presAssocID="{C8A1F54A-7E3A-41A1-959F-6B5FD5F8636D}" presName="sibTrans" presStyleLbl="sibTrans2D1" presStyleIdx="2" presStyleCnt="5"/>
       <dgm:spPr/>
+      <dgm:t>
+        <a:bodyPr/>
+        <a:lstStyle/>
+        <a:p>
+          <a:endParaRPr lang="es-ES"/>
+        </a:p>
+      </dgm:t>
     </dgm:pt>
     <dgm:pt modelId="{C760C070-470B-4058-9545-BF03EAB89CA8}" type="pres">
       <dgm:prSet presAssocID="{48E85755-4A7D-4901-9FAC-071F1358DF2F}" presName="node" presStyleLbl="node1" presStyleIdx="3" presStyleCnt="5">
@@ -3437,6 +3489,13 @@
     <dgm:pt modelId="{D02974D2-277D-4223-861D-60F4EE29FC41}" type="pres">
       <dgm:prSet presAssocID="{0C26AA64-874D-45B6-B598-A200D29CC792}" presName="sibTrans" presStyleLbl="sibTrans2D1" presStyleIdx="3" presStyleCnt="5"/>
       <dgm:spPr/>
+      <dgm:t>
+        <a:bodyPr/>
+        <a:lstStyle/>
+        <a:p>
+          <a:endParaRPr lang="es-ES"/>
+        </a:p>
+      </dgm:t>
     </dgm:pt>
     <dgm:pt modelId="{9292AA3E-A295-4EDC-9A1D-55A4AE350311}" type="pres">
       <dgm:prSet presAssocID="{15CAE864-9AE0-42B4-89DA-2894529FBF96}" presName="node" presStyleLbl="node1" presStyleIdx="4" presStyleCnt="5">
@@ -3460,27 +3519,34 @@
     <dgm:pt modelId="{E656DB39-A96D-401F-8B91-C56532357FFA}" type="pres">
       <dgm:prSet presAssocID="{7271335F-4252-412C-A6F6-823EE27C067C}" presName="sibTrans" presStyleLbl="sibTrans2D1" presStyleIdx="4" presStyleCnt="5"/>
       <dgm:spPr/>
+      <dgm:t>
+        <a:bodyPr/>
+        <a:lstStyle/>
+        <a:p>
+          <a:endParaRPr lang="es-ES"/>
+        </a:p>
+      </dgm:t>
     </dgm:pt>
   </dgm:ptLst>
   <dgm:cxnLst>
+    <dgm:cxn modelId="{AE49F806-54FE-4496-84AB-BEE977FD9C4D}" type="presOf" srcId="{539FF677-4652-4C9C-85C6-BE45298849DA}" destId="{DB3006ED-35AC-4A39-BDEB-A0881FDF8D87}" srcOrd="0" destOrd="0" presId="urn:microsoft.com/office/officeart/2005/8/layout/radial6"/>
+    <dgm:cxn modelId="{04190B09-AB27-403F-861D-1576F6FD2F13}" type="presOf" srcId="{0C26AA64-874D-45B6-B598-A200D29CC792}" destId="{D02974D2-277D-4223-861D-60F4EE29FC41}" srcOrd="0" destOrd="0" presId="urn:microsoft.com/office/officeart/2005/8/layout/radial6"/>
+    <dgm:cxn modelId="{B3929CE4-633A-4EE2-B075-A3C124015D41}" type="presOf" srcId="{F6982B39-5484-4A53-846D-A84C7A19FD13}" destId="{FA01F4A9-4DBF-4C57-A0CE-07D509A185E7}" srcOrd="0" destOrd="0" presId="urn:microsoft.com/office/officeart/2005/8/layout/radial6"/>
+    <dgm:cxn modelId="{92E9A541-9849-4C3F-86CB-2599D64B6F16}" type="presOf" srcId="{C8A1F54A-7E3A-41A1-959F-6B5FD5F8636D}" destId="{EF84FA0B-7C07-42F2-8BEB-1B4C71321AC6}" srcOrd="0" destOrd="0" presId="urn:microsoft.com/office/officeart/2005/8/layout/radial6"/>
+    <dgm:cxn modelId="{E3E687C0-D67F-47A6-8780-7A3225AAEBAB}" type="presOf" srcId="{4092E42B-3105-4807-9EEC-B7274586BB46}" destId="{720CD217-6B6F-4C66-9827-3F530B72EB5D}" srcOrd="0" destOrd="0" presId="urn:microsoft.com/office/officeart/2005/8/layout/radial6"/>
+    <dgm:cxn modelId="{CC8BFFB6-06FE-4B12-B3FE-D4EF0C5503AD}" srcId="{F782DAC8-F23E-4080-9EF9-36615D3A2FDF}" destId="{753C41A9-34B2-4759-8459-44FCB814A873}" srcOrd="0" destOrd="0" parTransId="{F14466D8-F0E0-407E-9FFE-6F5A2598B2CF}" sibTransId="{37267226-84DA-4213-9E7C-98387433E4DE}"/>
+    <dgm:cxn modelId="{D0AF5723-9AF1-4370-BF36-67DDD6F2B256}" type="presOf" srcId="{753C41A9-34B2-4759-8459-44FCB814A873}" destId="{750555E1-A28D-424D-A120-1314C822B5F8}" srcOrd="0" destOrd="0" presId="urn:microsoft.com/office/officeart/2005/8/layout/radial6"/>
+    <dgm:cxn modelId="{2D4EB3CF-F686-4D06-B619-F0D3A385A4CA}" type="presOf" srcId="{7271335F-4252-412C-A6F6-823EE27C067C}" destId="{E656DB39-A96D-401F-8B91-C56532357FFA}" srcOrd="0" destOrd="0" presId="urn:microsoft.com/office/officeart/2005/8/layout/radial6"/>
+    <dgm:cxn modelId="{8B70EA4F-FF65-4A3A-B4F6-AA28B681200B}" srcId="{753C41A9-34B2-4759-8459-44FCB814A873}" destId="{48E85755-4A7D-4901-9FAC-071F1358DF2F}" srcOrd="3" destOrd="0" parTransId="{22E45507-E917-4ECC-B2C8-FCB30CB1883D}" sibTransId="{0C26AA64-874D-45B6-B598-A200D29CC792}"/>
+    <dgm:cxn modelId="{F849B287-BECA-47DE-B6FD-0AA124AA507C}" type="presOf" srcId="{F782DAC8-F23E-4080-9EF9-36615D3A2FDF}" destId="{91017005-1548-4F51-B091-230E65C4F934}" srcOrd="0" destOrd="0" presId="urn:microsoft.com/office/officeart/2005/8/layout/radial6"/>
+    <dgm:cxn modelId="{87209B28-82FD-47CD-AB01-6A5D515B582B}" srcId="{753C41A9-34B2-4759-8459-44FCB814A873}" destId="{4092E42B-3105-4807-9EEC-B7274586BB46}" srcOrd="0" destOrd="0" parTransId="{57B30B1C-6B60-4912-88A2-5FAE9CB0A246}" sibTransId="{539FF677-4652-4C9C-85C6-BE45298849DA}"/>
+    <dgm:cxn modelId="{0ABE7AEA-866C-4F1D-A12F-C4089B6348EB}" type="presOf" srcId="{CA82F33A-F0E5-4821-8602-94FCF7777017}" destId="{86C66C06-80B9-48BF-821C-73603074C5B1}" srcOrd="0" destOrd="0" presId="urn:microsoft.com/office/officeart/2005/8/layout/radial6"/>
+    <dgm:cxn modelId="{EE3CE602-3BA6-46CF-9150-25CC2C33B0CE}" type="presOf" srcId="{15CAE864-9AE0-42B4-89DA-2894529FBF96}" destId="{9292AA3E-A295-4EDC-9A1D-55A4AE350311}" srcOrd="0" destOrd="0" presId="urn:microsoft.com/office/officeart/2005/8/layout/radial6"/>
     <dgm:cxn modelId="{F0AD4971-8AA1-4856-883B-8F7DCED19621}" type="presOf" srcId="{48E85755-4A7D-4901-9FAC-071F1358DF2F}" destId="{C760C070-470B-4058-9545-BF03EAB89CA8}" srcOrd="0" destOrd="0" presId="urn:microsoft.com/office/officeart/2005/8/layout/radial6"/>
-    <dgm:cxn modelId="{8B70EA4F-FF65-4A3A-B4F6-AA28B681200B}" srcId="{753C41A9-34B2-4759-8459-44FCB814A873}" destId="{48E85755-4A7D-4901-9FAC-071F1358DF2F}" srcOrd="3" destOrd="0" parTransId="{22E45507-E917-4ECC-B2C8-FCB30CB1883D}" sibTransId="{0C26AA64-874D-45B6-B598-A200D29CC792}"/>
-    <dgm:cxn modelId="{EE3CE602-3BA6-46CF-9150-25CC2C33B0CE}" type="presOf" srcId="{15CAE864-9AE0-42B4-89DA-2894529FBF96}" destId="{9292AA3E-A295-4EDC-9A1D-55A4AE350311}" srcOrd="0" destOrd="0" presId="urn:microsoft.com/office/officeart/2005/8/layout/radial6"/>
     <dgm:cxn modelId="{01FE2A5F-B83D-4606-91FC-6515F1F2C347}" type="presOf" srcId="{024D7616-0CEE-46BE-AC81-A76BEF22C50D}" destId="{F052CEAA-AEB4-454B-87AB-B05C1AB670C2}" srcOrd="0" destOrd="0" presId="urn:microsoft.com/office/officeart/2005/8/layout/radial6"/>
-    <dgm:cxn modelId="{92E9A541-9849-4C3F-86CB-2599D64B6F16}" type="presOf" srcId="{C8A1F54A-7E3A-41A1-959F-6B5FD5F8636D}" destId="{EF84FA0B-7C07-42F2-8BEB-1B4C71321AC6}" srcOrd="0" destOrd="0" presId="urn:microsoft.com/office/officeart/2005/8/layout/radial6"/>
+    <dgm:cxn modelId="{A182A60D-55C2-42D8-B51D-2BC18089FA22}" srcId="{753C41A9-34B2-4759-8459-44FCB814A873}" destId="{CA82F33A-F0E5-4821-8602-94FCF7777017}" srcOrd="2" destOrd="0" parTransId="{72C64EE2-E210-49CD-B5C3-94D0D5232AA5}" sibTransId="{C8A1F54A-7E3A-41A1-959F-6B5FD5F8636D}"/>
+    <dgm:cxn modelId="{913D46C3-47D7-48F4-9E51-DC6072FE287D}" srcId="{753C41A9-34B2-4759-8459-44FCB814A873}" destId="{F6982B39-5484-4A53-846D-A84C7A19FD13}" srcOrd="1" destOrd="0" parTransId="{74ADD96D-FB65-4357-81DC-635CF42BD811}" sibTransId="{024D7616-0CEE-46BE-AC81-A76BEF22C50D}"/>
     <dgm:cxn modelId="{9868034A-5F47-4F09-A86B-52BF2EAF1DBF}" srcId="{753C41A9-34B2-4759-8459-44FCB814A873}" destId="{15CAE864-9AE0-42B4-89DA-2894529FBF96}" srcOrd="4" destOrd="0" parTransId="{EF00EB5E-5CAA-4A52-AB92-CDDEEA17C3A9}" sibTransId="{7271335F-4252-412C-A6F6-823EE27C067C}"/>
-    <dgm:cxn modelId="{A182A60D-55C2-42D8-B51D-2BC18089FA22}" srcId="{753C41A9-34B2-4759-8459-44FCB814A873}" destId="{CA82F33A-F0E5-4821-8602-94FCF7777017}" srcOrd="2" destOrd="0" parTransId="{72C64EE2-E210-49CD-B5C3-94D0D5232AA5}" sibTransId="{C8A1F54A-7E3A-41A1-959F-6B5FD5F8636D}"/>
-    <dgm:cxn modelId="{AE49F806-54FE-4496-84AB-BEE977FD9C4D}" type="presOf" srcId="{539FF677-4652-4C9C-85C6-BE45298849DA}" destId="{DB3006ED-35AC-4A39-BDEB-A0881FDF8D87}" srcOrd="0" destOrd="0" presId="urn:microsoft.com/office/officeart/2005/8/layout/radial6"/>
-    <dgm:cxn modelId="{D0AF5723-9AF1-4370-BF36-67DDD6F2B256}" type="presOf" srcId="{753C41A9-34B2-4759-8459-44FCB814A873}" destId="{750555E1-A28D-424D-A120-1314C822B5F8}" srcOrd="0" destOrd="0" presId="urn:microsoft.com/office/officeart/2005/8/layout/radial6"/>
-    <dgm:cxn modelId="{87209B28-82FD-47CD-AB01-6A5D515B582B}" srcId="{753C41A9-34B2-4759-8459-44FCB814A873}" destId="{4092E42B-3105-4807-9EEC-B7274586BB46}" srcOrd="0" destOrd="0" parTransId="{57B30B1C-6B60-4912-88A2-5FAE9CB0A246}" sibTransId="{539FF677-4652-4C9C-85C6-BE45298849DA}"/>
-    <dgm:cxn modelId="{04190B09-AB27-403F-861D-1576F6FD2F13}" type="presOf" srcId="{0C26AA64-874D-45B6-B598-A200D29CC792}" destId="{D02974D2-277D-4223-861D-60F4EE29FC41}" srcOrd="0" destOrd="0" presId="urn:microsoft.com/office/officeart/2005/8/layout/radial6"/>
-    <dgm:cxn modelId="{0ABE7AEA-866C-4F1D-A12F-C4089B6348EB}" type="presOf" srcId="{CA82F33A-F0E5-4821-8602-94FCF7777017}" destId="{86C66C06-80B9-48BF-821C-73603074C5B1}" srcOrd="0" destOrd="0" presId="urn:microsoft.com/office/officeart/2005/8/layout/radial6"/>
-    <dgm:cxn modelId="{913D46C3-47D7-48F4-9E51-DC6072FE287D}" srcId="{753C41A9-34B2-4759-8459-44FCB814A873}" destId="{F6982B39-5484-4A53-846D-A84C7A19FD13}" srcOrd="1" destOrd="0" parTransId="{74ADD96D-FB65-4357-81DC-635CF42BD811}" sibTransId="{024D7616-0CEE-46BE-AC81-A76BEF22C50D}"/>
-    <dgm:cxn modelId="{CC8BFFB6-06FE-4B12-B3FE-D4EF0C5503AD}" srcId="{F782DAC8-F23E-4080-9EF9-36615D3A2FDF}" destId="{753C41A9-34B2-4759-8459-44FCB814A873}" srcOrd="0" destOrd="0" parTransId="{F14466D8-F0E0-407E-9FFE-6F5A2598B2CF}" sibTransId="{37267226-84DA-4213-9E7C-98387433E4DE}"/>
-    <dgm:cxn modelId="{F849B287-BECA-47DE-B6FD-0AA124AA507C}" type="presOf" srcId="{F782DAC8-F23E-4080-9EF9-36615D3A2FDF}" destId="{91017005-1548-4F51-B091-230E65C4F934}" srcOrd="0" destOrd="0" presId="urn:microsoft.com/office/officeart/2005/8/layout/radial6"/>
-    <dgm:cxn modelId="{2D4EB3CF-F686-4D06-B619-F0D3A385A4CA}" type="presOf" srcId="{7271335F-4252-412C-A6F6-823EE27C067C}" destId="{E656DB39-A96D-401F-8B91-C56532357FFA}" srcOrd="0" destOrd="0" presId="urn:microsoft.com/office/officeart/2005/8/layout/radial6"/>
-    <dgm:cxn modelId="{B3929CE4-633A-4EE2-B075-A3C124015D41}" type="presOf" srcId="{F6982B39-5484-4A53-846D-A84C7A19FD13}" destId="{FA01F4A9-4DBF-4C57-A0CE-07D509A185E7}" srcOrd="0" destOrd="0" presId="urn:microsoft.com/office/officeart/2005/8/layout/radial6"/>
-    <dgm:cxn modelId="{E3E687C0-D67F-47A6-8780-7A3225AAEBAB}" type="presOf" srcId="{4092E42B-3105-4807-9EEC-B7274586BB46}" destId="{720CD217-6B6F-4C66-9827-3F530B72EB5D}" srcOrd="0" destOrd="0" presId="urn:microsoft.com/office/officeart/2005/8/layout/radial6"/>
     <dgm:cxn modelId="{B16BB641-7EFE-41FE-B4F4-EED4A5B052B1}" type="presParOf" srcId="{91017005-1548-4F51-B091-230E65C4F934}" destId="{750555E1-A28D-424D-A120-1314C822B5F8}" srcOrd="0" destOrd="0" presId="urn:microsoft.com/office/officeart/2005/8/layout/radial6"/>
     <dgm:cxn modelId="{CB0D5225-CAD2-4A75-AA42-47201CE99BAF}" type="presParOf" srcId="{91017005-1548-4F51-B091-230E65C4F934}" destId="{720CD217-6B6F-4C66-9827-3F530B72EB5D}" srcOrd="1" destOrd="0" presId="urn:microsoft.com/office/officeart/2005/8/layout/radial6"/>
     <dgm:cxn modelId="{663E1C07-1184-44D6-B49D-E089BC902A38}" type="presParOf" srcId="{91017005-1548-4F51-B091-230E65C4F934}" destId="{8C7FD0EA-4DED-4237-B424-BAD4C6E66243}" srcOrd="2" destOrd="0" presId="urn:microsoft.com/office/officeart/2005/8/layout/radial6"/>
@@ -3828,6 +3894,13 @@
         </dgm:presLayoutVars>
       </dgm:prSet>
       <dgm:spPr/>
+      <dgm:t>
+        <a:bodyPr/>
+        <a:lstStyle/>
+        <a:p>
+          <a:endParaRPr lang="es-ES"/>
+        </a:p>
+      </dgm:t>
     </dgm:pt>
     <dgm:pt modelId="{7E0A0CFA-4386-4DEF-B853-5C9A3444DF70}" type="pres">
       <dgm:prSet presAssocID="{D1170F9D-6596-49F8-BFB4-07C1E2902CCC}" presName="centerShape" presStyleLbl="node0" presStyleIdx="0" presStyleCnt="1"/>
@@ -3847,6 +3920,13 @@
         </dgm:presLayoutVars>
       </dgm:prSet>
       <dgm:spPr/>
+      <dgm:t>
+        <a:bodyPr/>
+        <a:lstStyle/>
+        <a:p>
+          <a:endParaRPr lang="es-ES"/>
+        </a:p>
+      </dgm:t>
     </dgm:pt>
     <dgm:pt modelId="{0CCAE9DD-CB08-405D-A867-534658233BE4}" type="pres">
       <dgm:prSet presAssocID="{4D7C806A-EEA2-473F-8736-BAB4C38E8466}" presName="dummy" presStyleCnt="0"/>
@@ -3855,6 +3935,13 @@
     <dgm:pt modelId="{3ADB3F8A-AC5D-4DA2-ABBA-D87270B92B13}" type="pres">
       <dgm:prSet presAssocID="{871975E1-5ED9-48E9-8FC9-E286909C5E26}" presName="sibTrans" presStyleLbl="sibTrans2D1" presStyleIdx="0" presStyleCnt="7"/>
       <dgm:spPr/>
+      <dgm:t>
+        <a:bodyPr/>
+        <a:lstStyle/>
+        <a:p>
+          <a:endParaRPr lang="es-ES"/>
+        </a:p>
+      </dgm:t>
     </dgm:pt>
     <dgm:pt modelId="{D17DD24D-CF5A-40D5-865A-6F971D0B2D66}" type="pres">
       <dgm:prSet presAssocID="{751A509F-5087-4982-89B2-7F2CFAACEE4D}" presName="node" presStyleLbl="node1" presStyleIdx="1" presStyleCnt="7">
@@ -3863,6 +3950,13 @@
         </dgm:presLayoutVars>
       </dgm:prSet>
       <dgm:spPr/>
+      <dgm:t>
+        <a:bodyPr/>
+        <a:lstStyle/>
+        <a:p>
+          <a:endParaRPr lang="es-ES"/>
+        </a:p>
+      </dgm:t>
     </dgm:pt>
     <dgm:pt modelId="{3F044B8D-ED21-4402-A756-EC79CC5F8024}" type="pres">
       <dgm:prSet presAssocID="{751A509F-5087-4982-89B2-7F2CFAACEE4D}" presName="dummy" presStyleCnt="0"/>
@@ -3871,6 +3965,13 @@
     <dgm:pt modelId="{D5366938-5041-4BAE-9A02-022551A8138F}" type="pres">
       <dgm:prSet presAssocID="{DDC5B467-63B8-45C8-8447-A3C970D85AE3}" presName="sibTrans" presStyleLbl="sibTrans2D1" presStyleIdx="1" presStyleCnt="7"/>
       <dgm:spPr/>
+      <dgm:t>
+        <a:bodyPr/>
+        <a:lstStyle/>
+        <a:p>
+          <a:endParaRPr lang="es-ES"/>
+        </a:p>
+      </dgm:t>
     </dgm:pt>
     <dgm:pt modelId="{64F633B2-9A65-4249-9CA2-205FEA2815DC}" type="pres">
       <dgm:prSet presAssocID="{5F8E6E75-2CC3-4D82-85CA-AEBE14576879}" presName="node" presStyleLbl="node1" presStyleIdx="2" presStyleCnt="7" custRadScaleRad="103180" custRadScaleInc="-2350">
@@ -3879,6 +3980,13 @@
         </dgm:presLayoutVars>
       </dgm:prSet>
       <dgm:spPr/>
+      <dgm:t>
+        <a:bodyPr/>
+        <a:lstStyle/>
+        <a:p>
+          <a:endParaRPr lang="es-ES"/>
+        </a:p>
+      </dgm:t>
     </dgm:pt>
     <dgm:pt modelId="{3ED1C059-D36C-4CCB-9B90-1AD3A301461F}" type="pres">
       <dgm:prSet presAssocID="{5F8E6E75-2CC3-4D82-85CA-AEBE14576879}" presName="dummy" presStyleCnt="0"/>
@@ -3887,6 +3995,13 @@
     <dgm:pt modelId="{C2B75EB0-DEEB-42DE-87AC-5DFB0B6BB203}" type="pres">
       <dgm:prSet presAssocID="{D03CF598-52F4-41AB-9FAC-24CA4AA2EB86}" presName="sibTrans" presStyleLbl="sibTrans2D1" presStyleIdx="2" presStyleCnt="7"/>
       <dgm:spPr/>
+      <dgm:t>
+        <a:bodyPr/>
+        <a:lstStyle/>
+        <a:p>
+          <a:endParaRPr lang="es-ES"/>
+        </a:p>
+      </dgm:t>
     </dgm:pt>
     <dgm:pt modelId="{6588DCC8-9148-4E69-A8A5-49D2DF439D53}" type="pres">
       <dgm:prSet presAssocID="{24EE8152-732C-4CB6-9271-FF06BC863B25}" presName="node" presStyleLbl="node1" presStyleIdx="3" presStyleCnt="7">
@@ -3895,6 +4010,13 @@
         </dgm:presLayoutVars>
       </dgm:prSet>
       <dgm:spPr/>
+      <dgm:t>
+        <a:bodyPr/>
+        <a:lstStyle/>
+        <a:p>
+          <a:endParaRPr lang="es-ES"/>
+        </a:p>
+      </dgm:t>
     </dgm:pt>
     <dgm:pt modelId="{8E7DEFCB-DFE1-4E92-BF6D-97F3A865341D}" type="pres">
       <dgm:prSet presAssocID="{24EE8152-732C-4CB6-9271-FF06BC863B25}" presName="dummy" presStyleCnt="0"/>
@@ -3903,6 +4025,13 @@
     <dgm:pt modelId="{15D1F4A9-20F8-4C97-A376-94591C07911D}" type="pres">
       <dgm:prSet presAssocID="{0804483B-6387-4E85-BFAB-AC9058131FB7}" presName="sibTrans" presStyleLbl="sibTrans2D1" presStyleIdx="3" presStyleCnt="7"/>
       <dgm:spPr/>
+      <dgm:t>
+        <a:bodyPr/>
+        <a:lstStyle/>
+        <a:p>
+          <a:endParaRPr lang="es-ES"/>
+        </a:p>
+      </dgm:t>
     </dgm:pt>
     <dgm:pt modelId="{F49D2894-ED4E-4E5D-BD79-122DE9F31C0D}" type="pres">
       <dgm:prSet presAssocID="{797D0252-0D06-4FC0-A9CB-02EEA066EB04}" presName="node" presStyleLbl="node1" presStyleIdx="4" presStyleCnt="7">
@@ -3911,6 +4040,13 @@
         </dgm:presLayoutVars>
       </dgm:prSet>
       <dgm:spPr/>
+      <dgm:t>
+        <a:bodyPr/>
+        <a:lstStyle/>
+        <a:p>
+          <a:endParaRPr lang="es-ES"/>
+        </a:p>
+      </dgm:t>
     </dgm:pt>
     <dgm:pt modelId="{DF488CDB-DFA2-4570-A4A5-7DB95939D74C}" type="pres">
       <dgm:prSet presAssocID="{797D0252-0D06-4FC0-A9CB-02EEA066EB04}" presName="dummy" presStyleCnt="0"/>
@@ -3919,6 +4055,13 @@
     <dgm:pt modelId="{85FDA7A6-CD2F-4B74-BFC4-44EF9B3E3FA9}" type="pres">
       <dgm:prSet presAssocID="{52A7AB67-E8DD-40F9-B63E-8B2A1303C9A4}" presName="sibTrans" presStyleLbl="sibTrans2D1" presStyleIdx="4" presStyleCnt="7"/>
       <dgm:spPr/>
+      <dgm:t>
+        <a:bodyPr/>
+        <a:lstStyle/>
+        <a:p>
+          <a:endParaRPr lang="es-ES"/>
+        </a:p>
+      </dgm:t>
     </dgm:pt>
     <dgm:pt modelId="{4E8A6913-A0F9-4877-A2B4-CA41470C0ADD}" type="pres">
       <dgm:prSet presAssocID="{CDA1568E-9218-4A90-B7F8-C7B959EE19AE}" presName="node" presStyleLbl="node1" presStyleIdx="5" presStyleCnt="7">
@@ -3927,6 +4070,13 @@
         </dgm:presLayoutVars>
       </dgm:prSet>
       <dgm:spPr/>
+      <dgm:t>
+        <a:bodyPr/>
+        <a:lstStyle/>
+        <a:p>
+          <a:endParaRPr lang="es-ES"/>
+        </a:p>
+      </dgm:t>
     </dgm:pt>
     <dgm:pt modelId="{C4F013AA-2230-46E4-B77A-F492C220AF7A}" type="pres">
       <dgm:prSet presAssocID="{CDA1568E-9218-4A90-B7F8-C7B959EE19AE}" presName="dummy" presStyleCnt="0"/>
@@ -3935,6 +4085,13 @@
     <dgm:pt modelId="{9A1C5EEE-3DE1-44FA-BABB-139645BFC863}" type="pres">
       <dgm:prSet presAssocID="{7D7BE51C-581D-4B7D-B871-40BC3C27B290}" presName="sibTrans" presStyleLbl="sibTrans2D1" presStyleIdx="5" presStyleCnt="7"/>
       <dgm:spPr/>
+      <dgm:t>
+        <a:bodyPr/>
+        <a:lstStyle/>
+        <a:p>
+          <a:endParaRPr lang="es-ES"/>
+        </a:p>
+      </dgm:t>
     </dgm:pt>
     <dgm:pt modelId="{D1EA7DBF-5A2C-46B1-A0BD-B79586CEF74E}" type="pres">
       <dgm:prSet presAssocID="{4F255599-3467-4ADF-8C22-F6F3627EC890}" presName="node" presStyleLbl="node1" presStyleIdx="6" presStyleCnt="7">
@@ -3943,6 +4100,13 @@
         </dgm:presLayoutVars>
       </dgm:prSet>
       <dgm:spPr/>
+      <dgm:t>
+        <a:bodyPr/>
+        <a:lstStyle/>
+        <a:p>
+          <a:endParaRPr lang="es-ES"/>
+        </a:p>
+      </dgm:t>
     </dgm:pt>
     <dgm:pt modelId="{44685795-607F-433B-A50F-1E426438C5DB}" type="pres">
       <dgm:prSet presAssocID="{4F255599-3467-4ADF-8C22-F6F3627EC890}" presName="dummy" presStyleCnt="0"/>
@@ -3951,6 +4115,13 @@
     <dgm:pt modelId="{1E5D4934-8594-4190-AEC5-C004F1CF1C90}" type="pres">
       <dgm:prSet presAssocID="{835E15FF-8153-41DE-A59A-AD4D5815715A}" presName="sibTrans" presStyleLbl="sibTrans2D1" presStyleIdx="6" presStyleCnt="7"/>
       <dgm:spPr/>
+      <dgm:t>
+        <a:bodyPr/>
+        <a:lstStyle/>
+        <a:p>
+          <a:endParaRPr lang="es-ES"/>
+        </a:p>
+      </dgm:t>
     </dgm:pt>
   </dgm:ptLst>
   <dgm:cxnLst>
@@ -4188,6 +4359,13 @@
         </dgm:presLayoutVars>
       </dgm:prSet>
       <dgm:spPr/>
+      <dgm:t>
+        <a:bodyPr/>
+        <a:lstStyle/>
+        <a:p>
+          <a:endParaRPr lang="es-ES"/>
+        </a:p>
+      </dgm:t>
     </dgm:pt>
     <dgm:pt modelId="{3490D61A-C7E6-48CC-91A4-84996B07A4EB}" type="pres">
       <dgm:prSet presAssocID="{850FEE1E-8E07-4DEB-AF68-4E9C9A73A14E}" presName="levelTx" presStyleLbl="revTx" presStyleIdx="0" presStyleCnt="0">
@@ -4197,6 +4375,13 @@
         </dgm:presLayoutVars>
       </dgm:prSet>
       <dgm:spPr/>
+      <dgm:t>
+        <a:bodyPr/>
+        <a:lstStyle/>
+        <a:p>
+          <a:endParaRPr lang="es-ES"/>
+        </a:p>
+      </dgm:t>
     </dgm:pt>
     <dgm:pt modelId="{265043F3-3368-4910-B3F9-DFE8BBCD230B}" type="pres">
       <dgm:prSet presAssocID="{557318D0-CD6D-4B17-BA73-BE02BE37EC24}" presName="Name8" presStyleCnt="0"/>
@@ -4246,6 +4431,13 @@
         </dgm:presLayoutVars>
       </dgm:prSet>
       <dgm:spPr/>
+      <dgm:t>
+        <a:bodyPr/>
+        <a:lstStyle/>
+        <a:p>
+          <a:endParaRPr lang="es-ES"/>
+        </a:p>
+      </dgm:t>
     </dgm:pt>
     <dgm:pt modelId="{D4A803C9-A5B6-464C-A173-33AA676BBCB7}" type="pres">
       <dgm:prSet presAssocID="{8DCF43FC-7050-411D-B26A-0DE089FC3C22}" presName="levelTx" presStyleLbl="revTx" presStyleIdx="0" presStyleCnt="0">
@@ -4255,6 +4447,13 @@
         </dgm:presLayoutVars>
       </dgm:prSet>
       <dgm:spPr/>
+      <dgm:t>
+        <a:bodyPr/>
+        <a:lstStyle/>
+        <a:p>
+          <a:endParaRPr lang="es-ES"/>
+        </a:p>
+      </dgm:t>
     </dgm:pt>
     <dgm:pt modelId="{7E4933C0-C621-490A-9F59-BEBB8CB805E7}" type="pres">
       <dgm:prSet presAssocID="{69C51301-F753-4AFB-B01D-DA712909A5F5}" presName="Name8" presStyleCnt="0"/>
@@ -4268,6 +4467,13 @@
         </dgm:presLayoutVars>
       </dgm:prSet>
       <dgm:spPr/>
+      <dgm:t>
+        <a:bodyPr/>
+        <a:lstStyle/>
+        <a:p>
+          <a:endParaRPr lang="es-ES"/>
+        </a:p>
+      </dgm:t>
     </dgm:pt>
     <dgm:pt modelId="{42B47102-9BE6-45FF-A0CA-57A4102CE0CA}" type="pres">
       <dgm:prSet presAssocID="{69C51301-F753-4AFB-B01D-DA712909A5F5}" presName="levelTx" presStyleLbl="revTx" presStyleIdx="0" presStyleCnt="0">
@@ -4277,22 +4483,29 @@
         </dgm:presLayoutVars>
       </dgm:prSet>
       <dgm:spPr/>
+      <dgm:t>
+        <a:bodyPr/>
+        <a:lstStyle/>
+        <a:p>
+          <a:endParaRPr lang="es-ES"/>
+        </a:p>
+      </dgm:t>
     </dgm:pt>
   </dgm:ptLst>
   <dgm:cxnLst>
-    <dgm:cxn modelId="{1D490AD5-FD37-4DE5-82F1-90B9F36464C6}" type="presOf" srcId="{557318D0-CD6D-4B17-BA73-BE02BE37EC24}" destId="{3542C7FB-6AFC-4DB2-92D9-8843CFA1B7BF}" srcOrd="0" destOrd="0" presId="urn:microsoft.com/office/officeart/2005/8/layout/pyramid1"/>
+    <dgm:cxn modelId="{E1C97117-C0CC-4A94-AB49-2DCA42AB733E}" type="presOf" srcId="{8DCF43FC-7050-411D-B26A-0DE089FC3C22}" destId="{D4A803C9-A5B6-464C-A173-33AA676BBCB7}" srcOrd="1" destOrd="0" presId="urn:microsoft.com/office/officeart/2005/8/layout/pyramid1"/>
     <dgm:cxn modelId="{8977F04B-5F6F-4D37-B7AD-9265575C4B00}" srcId="{2D143037-BAFB-4DBD-978F-86980B4B1B5B}" destId="{8DCF43FC-7050-411D-B26A-0DE089FC3C22}" srcOrd="2" destOrd="0" parTransId="{01282BEB-A8E3-49F9-913F-F4434CDB360B}" sibTransId="{F90EB139-2B42-40EE-8F28-46EDBD5FC4A9}"/>
+    <dgm:cxn modelId="{257DE404-2551-4CBF-81D1-FAB12876FE75}" type="presOf" srcId="{69C51301-F753-4AFB-B01D-DA712909A5F5}" destId="{6B5297C7-9DDB-462B-ADF3-7DEAACA7ED9A}" srcOrd="0" destOrd="0" presId="urn:microsoft.com/office/officeart/2005/8/layout/pyramid1"/>
     <dgm:cxn modelId="{8B9917D5-D3AD-4AFD-BB2A-C0AA5F7227F4}" type="presOf" srcId="{557318D0-CD6D-4B17-BA73-BE02BE37EC24}" destId="{6E6EE393-2070-4D06-A6BA-8D6A48F8F8EC}" srcOrd="1" destOrd="0" presId="urn:microsoft.com/office/officeart/2005/8/layout/pyramid1"/>
-    <dgm:cxn modelId="{AC95EEAA-23E8-4742-AD90-5B9BC0AF33E9}" type="presOf" srcId="{2D143037-BAFB-4DBD-978F-86980B4B1B5B}" destId="{11900027-BB55-4281-80A7-8FF2E98A79FE}" srcOrd="0" destOrd="0" presId="urn:microsoft.com/office/officeart/2005/8/layout/pyramid1"/>
-    <dgm:cxn modelId="{2B3BAC04-EAD2-48F0-8341-AA71B4C726D3}" type="presOf" srcId="{8DCF43FC-7050-411D-B26A-0DE089FC3C22}" destId="{BB420B58-7E31-40A6-A88A-C19406AB8532}" srcOrd="0" destOrd="0" presId="urn:microsoft.com/office/officeart/2005/8/layout/pyramid1"/>
-    <dgm:cxn modelId="{257DE404-2551-4CBF-81D1-FAB12876FE75}" type="presOf" srcId="{69C51301-F753-4AFB-B01D-DA712909A5F5}" destId="{6B5297C7-9DDB-462B-ADF3-7DEAACA7ED9A}" srcOrd="0" destOrd="0" presId="urn:microsoft.com/office/officeart/2005/8/layout/pyramid1"/>
-    <dgm:cxn modelId="{E1C97117-C0CC-4A94-AB49-2DCA42AB733E}" type="presOf" srcId="{8DCF43FC-7050-411D-B26A-0DE089FC3C22}" destId="{D4A803C9-A5B6-464C-A173-33AA676BBCB7}" srcOrd="1" destOrd="0" presId="urn:microsoft.com/office/officeart/2005/8/layout/pyramid1"/>
     <dgm:cxn modelId="{FDBB5680-AF8A-457C-A85D-8377A6F64524}" srcId="{2D143037-BAFB-4DBD-978F-86980B4B1B5B}" destId="{557318D0-CD6D-4B17-BA73-BE02BE37EC24}" srcOrd="1" destOrd="0" parTransId="{85954B79-750A-49BF-946F-FC77FC04B3E7}" sibTransId="{18D28316-4524-4067-B3D0-E9DFDA37C5AE}"/>
-    <dgm:cxn modelId="{4D7F505F-BFDF-4C98-B240-69164CFF3367}" type="presOf" srcId="{850FEE1E-8E07-4DEB-AF68-4E9C9A73A14E}" destId="{3490D61A-C7E6-48CC-91A4-84996B07A4EB}" srcOrd="1" destOrd="0" presId="urn:microsoft.com/office/officeart/2005/8/layout/pyramid1"/>
-    <dgm:cxn modelId="{E7B0FB73-DBE2-4C29-AAD4-35209BF7AB18}" srcId="{2D143037-BAFB-4DBD-978F-86980B4B1B5B}" destId="{69C51301-F753-4AFB-B01D-DA712909A5F5}" srcOrd="3" destOrd="0" parTransId="{97469D9F-AA96-46F3-BBF1-E24160EC9462}" sibTransId="{37855D86-091D-42B7-85B2-27BCE5884109}"/>
     <dgm:cxn modelId="{6523E267-AE09-4FC9-825D-6142006D5B7E}" type="presOf" srcId="{850FEE1E-8E07-4DEB-AF68-4E9C9A73A14E}" destId="{197E24CA-9E70-46F0-B095-2D7B84FF46A1}" srcOrd="0" destOrd="0" presId="urn:microsoft.com/office/officeart/2005/8/layout/pyramid1"/>
     <dgm:cxn modelId="{C63DFB5F-3BA7-4CED-92AE-CFBDCA1B97ED}" srcId="{2D143037-BAFB-4DBD-978F-86980B4B1B5B}" destId="{850FEE1E-8E07-4DEB-AF68-4E9C9A73A14E}" srcOrd="0" destOrd="0" parTransId="{2114D27D-9BC7-4457-B3E3-F554E75865BA}" sibTransId="{1AE1047C-6029-4060-8446-FF3030110075}"/>
+    <dgm:cxn modelId="{E7B0FB73-DBE2-4C29-AAD4-35209BF7AB18}" srcId="{2D143037-BAFB-4DBD-978F-86980B4B1B5B}" destId="{69C51301-F753-4AFB-B01D-DA712909A5F5}" srcOrd="3" destOrd="0" parTransId="{97469D9F-AA96-46F3-BBF1-E24160EC9462}" sibTransId="{37855D86-091D-42B7-85B2-27BCE5884109}"/>
+    <dgm:cxn modelId="{2B3BAC04-EAD2-48F0-8341-AA71B4C726D3}" type="presOf" srcId="{8DCF43FC-7050-411D-B26A-0DE089FC3C22}" destId="{BB420B58-7E31-40A6-A88A-C19406AB8532}" srcOrd="0" destOrd="0" presId="urn:microsoft.com/office/officeart/2005/8/layout/pyramid1"/>
     <dgm:cxn modelId="{FBB074BE-FAF5-459F-848C-2193B78CDC1C}" type="presOf" srcId="{69C51301-F753-4AFB-B01D-DA712909A5F5}" destId="{42B47102-9BE6-45FF-A0CA-57A4102CE0CA}" srcOrd="1" destOrd="0" presId="urn:microsoft.com/office/officeart/2005/8/layout/pyramid1"/>
+    <dgm:cxn modelId="{AC95EEAA-23E8-4742-AD90-5B9BC0AF33E9}" type="presOf" srcId="{2D143037-BAFB-4DBD-978F-86980B4B1B5B}" destId="{11900027-BB55-4281-80A7-8FF2E98A79FE}" srcOrd="0" destOrd="0" presId="urn:microsoft.com/office/officeart/2005/8/layout/pyramid1"/>
+    <dgm:cxn modelId="{1D490AD5-FD37-4DE5-82F1-90B9F36464C6}" type="presOf" srcId="{557318D0-CD6D-4B17-BA73-BE02BE37EC24}" destId="{3542C7FB-6AFC-4DB2-92D9-8843CFA1B7BF}" srcOrd="0" destOrd="0" presId="urn:microsoft.com/office/officeart/2005/8/layout/pyramid1"/>
+    <dgm:cxn modelId="{4D7F505F-BFDF-4C98-B240-69164CFF3367}" type="presOf" srcId="{850FEE1E-8E07-4DEB-AF68-4E9C9A73A14E}" destId="{3490D61A-C7E6-48CC-91A4-84996B07A4EB}" srcOrd="1" destOrd="0" presId="urn:microsoft.com/office/officeart/2005/8/layout/pyramid1"/>
     <dgm:cxn modelId="{0785F6D9-D17C-47D3-A57A-99855B1C4B2B}" type="presParOf" srcId="{11900027-BB55-4281-80A7-8FF2E98A79FE}" destId="{F9C38B7D-F077-44C7-BEF5-4CACD6024ABA}" srcOrd="0" destOrd="0" presId="urn:microsoft.com/office/officeart/2005/8/layout/pyramid1"/>
     <dgm:cxn modelId="{C888405A-3708-46E7-8360-A88C197D99AE}" type="presParOf" srcId="{F9C38B7D-F077-44C7-BEF5-4CACD6024ABA}" destId="{197E24CA-9E70-46F0-B095-2D7B84FF46A1}" srcOrd="0" destOrd="0" presId="urn:microsoft.com/office/officeart/2005/8/layout/pyramid1"/>
     <dgm:cxn modelId="{99365B9B-F541-472F-A6BE-79367B23E9B0}" type="presParOf" srcId="{F9C38B7D-F077-44C7-BEF5-4CACD6024ABA}" destId="{3490D61A-C7E6-48CC-91A4-84996B07A4EB}" srcOrd="1" destOrd="0" presId="urn:microsoft.com/office/officeart/2005/8/layout/pyramid1"/>
@@ -4672,6 +4885,13 @@
         </dgm:presLayoutVars>
       </dgm:prSet>
       <dgm:spPr/>
+      <dgm:t>
+        <a:bodyPr/>
+        <a:lstStyle/>
+        <a:p>
+          <a:endParaRPr lang="es-ES"/>
+        </a:p>
+      </dgm:t>
     </dgm:pt>
     <dgm:pt modelId="{DC187493-7C44-4C39-B65B-6D6A5D1F9339}" type="pres">
       <dgm:prSet presAssocID="{F4ECBBBF-29B5-4B73-8AEE-7809DD2BC705}" presName="composite" presStyleCnt="0"/>
@@ -4686,10 +4906,24 @@
         </dgm:presLayoutVars>
       </dgm:prSet>
       <dgm:spPr/>
+      <dgm:t>
+        <a:bodyPr/>
+        <a:lstStyle/>
+        <a:p>
+          <a:endParaRPr lang="es-ES"/>
+        </a:p>
+      </dgm:t>
     </dgm:pt>
     <dgm:pt modelId="{B1C9B447-8A48-41AE-A948-BA91BB37F5EF}" type="pres">
       <dgm:prSet presAssocID="{F4ECBBBF-29B5-4B73-8AEE-7809DD2BC705}" presName="parSh" presStyleLbl="node1" presStyleIdx="0" presStyleCnt="3"/>
       <dgm:spPr/>
+      <dgm:t>
+        <a:bodyPr/>
+        <a:lstStyle/>
+        <a:p>
+          <a:endParaRPr lang="es-ES"/>
+        </a:p>
+      </dgm:t>
     </dgm:pt>
     <dgm:pt modelId="{13497FBF-CB88-4658-8BA9-6438EDAE6C1C}" type="pres">
       <dgm:prSet presAssocID="{F4ECBBBF-29B5-4B73-8AEE-7809DD2BC705}" presName="desTx" presStyleLbl="fgAcc1" presStyleIdx="0" presStyleCnt="3">
@@ -4709,10 +4943,24 @@
     <dgm:pt modelId="{C7EF69E3-9CFB-4FDF-922A-40663CC7AF4B}" type="pres">
       <dgm:prSet presAssocID="{07F7C31D-CBAC-493A-9116-CE8774E937BF}" presName="sibTrans" presStyleLbl="sibTrans2D1" presStyleIdx="0" presStyleCnt="2"/>
       <dgm:spPr/>
+      <dgm:t>
+        <a:bodyPr/>
+        <a:lstStyle/>
+        <a:p>
+          <a:endParaRPr lang="es-ES"/>
+        </a:p>
+      </dgm:t>
     </dgm:pt>
     <dgm:pt modelId="{63540CC0-2DF2-40EA-8131-24DBC1259824}" type="pres">
       <dgm:prSet presAssocID="{07F7C31D-CBAC-493A-9116-CE8774E937BF}" presName="connTx" presStyleLbl="sibTrans2D1" presStyleIdx="0" presStyleCnt="2"/>
       <dgm:spPr/>
+      <dgm:t>
+        <a:bodyPr/>
+        <a:lstStyle/>
+        <a:p>
+          <a:endParaRPr lang="es-ES"/>
+        </a:p>
+      </dgm:t>
     </dgm:pt>
     <dgm:pt modelId="{CFE0BB33-45D2-4268-9997-68A43EFF368A}" type="pres">
       <dgm:prSet presAssocID="{11800C95-3752-4AAD-A633-BFF26B208769}" presName="composite" presStyleCnt="0"/>
@@ -4727,10 +4975,24 @@
         </dgm:presLayoutVars>
       </dgm:prSet>
       <dgm:spPr/>
+      <dgm:t>
+        <a:bodyPr/>
+        <a:lstStyle/>
+        <a:p>
+          <a:endParaRPr lang="es-ES"/>
+        </a:p>
+      </dgm:t>
     </dgm:pt>
     <dgm:pt modelId="{28919450-A08E-4CBD-B7B3-BF2BB2C53EA3}" type="pres">
       <dgm:prSet presAssocID="{11800C95-3752-4AAD-A633-BFF26B208769}" presName="parSh" presStyleLbl="node1" presStyleIdx="1" presStyleCnt="3"/>
       <dgm:spPr/>
+      <dgm:t>
+        <a:bodyPr/>
+        <a:lstStyle/>
+        <a:p>
+          <a:endParaRPr lang="es-ES"/>
+        </a:p>
+      </dgm:t>
     </dgm:pt>
     <dgm:pt modelId="{846E6A1E-4752-430D-AEE6-72629B9C2FB6}" type="pres">
       <dgm:prSet presAssocID="{11800C95-3752-4AAD-A633-BFF26B208769}" presName="desTx" presStyleLbl="fgAcc1" presStyleIdx="1" presStyleCnt="3">
@@ -4750,10 +5012,24 @@
     <dgm:pt modelId="{F2B6018B-5F37-447B-8458-71C3FBC52578}" type="pres">
       <dgm:prSet presAssocID="{60FC52E2-B33B-437B-8460-BBE63C216FE8}" presName="sibTrans" presStyleLbl="sibTrans2D1" presStyleIdx="1" presStyleCnt="2"/>
       <dgm:spPr/>
+      <dgm:t>
+        <a:bodyPr/>
+        <a:lstStyle/>
+        <a:p>
+          <a:endParaRPr lang="es-ES"/>
+        </a:p>
+      </dgm:t>
     </dgm:pt>
     <dgm:pt modelId="{F95EBC23-FE1A-4DC1-8D9F-76683A86CDD5}" type="pres">
       <dgm:prSet presAssocID="{60FC52E2-B33B-437B-8460-BBE63C216FE8}" presName="connTx" presStyleLbl="sibTrans2D1" presStyleIdx="1" presStyleCnt="2"/>
       <dgm:spPr/>
+      <dgm:t>
+        <a:bodyPr/>
+        <a:lstStyle/>
+        <a:p>
+          <a:endParaRPr lang="es-ES"/>
+        </a:p>
+      </dgm:t>
     </dgm:pt>
     <dgm:pt modelId="{9136B4E4-5EE2-4A92-BDB6-A99F7F6D89E2}" type="pres">
       <dgm:prSet presAssocID="{BAF05006-AA9D-4A75-92DE-B5CF4F7BD5DC}" presName="composite" presStyleCnt="0"/>
@@ -4768,10 +5044,24 @@
         </dgm:presLayoutVars>
       </dgm:prSet>
       <dgm:spPr/>
+      <dgm:t>
+        <a:bodyPr/>
+        <a:lstStyle/>
+        <a:p>
+          <a:endParaRPr lang="es-ES"/>
+        </a:p>
+      </dgm:t>
     </dgm:pt>
     <dgm:pt modelId="{95A27EA2-7AE2-43CB-ACE1-633A12E9500D}" type="pres">
       <dgm:prSet presAssocID="{BAF05006-AA9D-4A75-92DE-B5CF4F7BD5DC}" presName="parSh" presStyleLbl="node1" presStyleIdx="2" presStyleCnt="3"/>
       <dgm:spPr/>
+      <dgm:t>
+        <a:bodyPr/>
+        <a:lstStyle/>
+        <a:p>
+          <a:endParaRPr lang="es-ES"/>
+        </a:p>
+      </dgm:t>
     </dgm:pt>
     <dgm:pt modelId="{B83159D5-5BCF-4CE8-A211-4AB76192FDFC}" type="pres">
       <dgm:prSet presAssocID="{BAF05006-AA9D-4A75-92DE-B5CF4F7BD5DC}" presName="desTx" presStyleLbl="fgAcc1" presStyleIdx="2" presStyleCnt="3">
@@ -4780,6 +5070,13 @@
         </dgm:presLayoutVars>
       </dgm:prSet>
       <dgm:spPr/>
+      <dgm:t>
+        <a:bodyPr/>
+        <a:lstStyle/>
+        <a:p>
+          <a:endParaRPr lang="es-ES"/>
+        </a:p>
+      </dgm:t>
     </dgm:pt>
   </dgm:ptLst>
   <dgm:cxnLst>
@@ -4797,10 +5094,10 @@
     <dgm:cxn modelId="{F63B9523-9179-43C0-A23D-027C85A8421D}" type="presOf" srcId="{60FC52E2-B33B-437B-8460-BBE63C216FE8}" destId="{F2B6018B-5F37-447B-8458-71C3FBC52578}" srcOrd="0" destOrd="0" presId="urn:microsoft.com/office/officeart/2005/8/layout/process3"/>
     <dgm:cxn modelId="{10002A1B-34C0-4CA4-97A0-B2C7C0C98C18}" srcId="{BAF05006-AA9D-4A75-92DE-B5CF4F7BD5DC}" destId="{A010A8B5-C36B-4748-8A41-B1CC5F84B855}" srcOrd="1" destOrd="0" parTransId="{9EE43D60-BA7D-4C81-BF9A-F9400BA5BC4A}" sibTransId="{6B8477F5-29B8-4E3D-B56C-AB2C5DCA94AD}"/>
     <dgm:cxn modelId="{39CC2355-20BF-447E-8601-BC3B1FFFEF28}" type="presOf" srcId="{9E3B7C5D-6889-4F68-AFD5-F2B8ECD697F8}" destId="{13497FBF-CB88-4658-8BA9-6438EDAE6C1C}" srcOrd="0" destOrd="0" presId="urn:microsoft.com/office/officeart/2005/8/layout/process3"/>
-    <dgm:cxn modelId="{60D0CA9D-6381-421D-B20C-A4A3E54DEAD1}" srcId="{87D3117F-EEDF-47C5-910B-9354F9B1446F}" destId="{11800C95-3752-4AAD-A633-BFF26B208769}" srcOrd="1" destOrd="0" parTransId="{ECE6DB5C-F7CC-4D01-9D75-20BE6990D99A}" sibTransId="{60FC52E2-B33B-437B-8460-BBE63C216FE8}"/>
-    <dgm:cxn modelId="{D6F74EB5-4063-4D53-9B84-E3F22AAD99C8}" type="presOf" srcId="{BA3DCE2B-217C-4AD0-8483-167B691605B8}" destId="{13497FBF-CB88-4658-8BA9-6438EDAE6C1C}" srcOrd="0" destOrd="1" presId="urn:microsoft.com/office/officeart/2005/8/layout/process3"/>
     <dgm:cxn modelId="{AB442554-699B-42D5-80BB-62E3E75E3738}" type="presOf" srcId="{BAF05006-AA9D-4A75-92DE-B5CF4F7BD5DC}" destId="{8F38C317-151E-4CA4-B988-7875398E86DF}" srcOrd="0" destOrd="0" presId="urn:microsoft.com/office/officeart/2005/8/layout/process3"/>
     <dgm:cxn modelId="{04438A1D-C955-4DFA-94FE-F6657DCFE5C5}" type="presOf" srcId="{07F7C31D-CBAC-493A-9116-CE8774E937BF}" destId="{C7EF69E3-9CFB-4FDF-922A-40663CC7AF4B}" srcOrd="0" destOrd="0" presId="urn:microsoft.com/office/officeart/2005/8/layout/process3"/>
+    <dgm:cxn modelId="{D6F74EB5-4063-4D53-9B84-E3F22AAD99C8}" type="presOf" srcId="{BA3DCE2B-217C-4AD0-8483-167B691605B8}" destId="{13497FBF-CB88-4658-8BA9-6438EDAE6C1C}" srcOrd="0" destOrd="1" presId="urn:microsoft.com/office/officeart/2005/8/layout/process3"/>
+    <dgm:cxn modelId="{60D0CA9D-6381-421D-B20C-A4A3E54DEAD1}" srcId="{87D3117F-EEDF-47C5-910B-9354F9B1446F}" destId="{11800C95-3752-4AAD-A633-BFF26B208769}" srcOrd="1" destOrd="0" parTransId="{ECE6DB5C-F7CC-4D01-9D75-20BE6990D99A}" sibTransId="{60FC52E2-B33B-437B-8460-BBE63C216FE8}"/>
     <dgm:cxn modelId="{666E2B18-70A4-4CB2-BFB3-388185F78F8C}" type="presOf" srcId="{60FC52E2-B33B-437B-8460-BBE63C216FE8}" destId="{F95EBC23-FE1A-4DC1-8D9F-76683A86CDD5}" srcOrd="1" destOrd="0" presId="urn:microsoft.com/office/officeart/2005/8/layout/process3"/>
     <dgm:cxn modelId="{71649137-8410-4ABB-A19E-956DE351FF44}" type="presOf" srcId="{A010A8B5-C36B-4748-8A41-B1CC5F84B855}" destId="{B83159D5-5BCF-4CE8-A211-4AB76192FDFC}" srcOrd="0" destOrd="1" presId="urn:microsoft.com/office/officeart/2005/8/layout/process3"/>
     <dgm:cxn modelId="{5030A0CB-9E9C-4BFC-9DD0-EA9496D8087B}" srcId="{BAF05006-AA9D-4A75-92DE-B5CF4F7BD5DC}" destId="{F497F4CB-A53E-49D6-A14B-30E86FEB771F}" srcOrd="0" destOrd="0" parTransId="{40C0A60B-D729-4067-BB9D-BA68C906294D}" sibTransId="{3B33CFEB-7972-45A6-B919-EC75EC27F3F7}"/>
@@ -14193,7 +14490,7 @@
           <a:p>
             <a:fld id="{9ECBFC88-F22F-4398-975C-D0F8EC99CB0D}" type="datetimeFigureOut">
               <a:rPr lang="es-BO" smtClean="0"/>
-              <a:t>28/10/2024</a:t>
+              <a:t>3/11/2024</a:t>
             </a:fld>
             <a:endParaRPr lang="es-BO"/>
           </a:p>
@@ -14431,7 +14728,7 @@
           <a:p>
             <a:fld id="{9ECBFC88-F22F-4398-975C-D0F8EC99CB0D}" type="datetimeFigureOut">
               <a:rPr lang="es-BO" smtClean="0"/>
-              <a:t>28/10/2024</a:t>
+              <a:t>3/11/2024</a:t>
             </a:fld>
             <a:endParaRPr lang="es-BO"/>
           </a:p>
@@ -14611,7 +14908,7 @@
           <a:p>
             <a:fld id="{9ECBFC88-F22F-4398-975C-D0F8EC99CB0D}" type="datetimeFigureOut">
               <a:rPr lang="es-BO" smtClean="0"/>
-              <a:t>28/10/2024</a:t>
+              <a:t>3/11/2024</a:t>
             </a:fld>
             <a:endParaRPr lang="es-BO"/>
           </a:p>
@@ -14781,7 +15078,7 @@
           <a:p>
             <a:fld id="{9ECBFC88-F22F-4398-975C-D0F8EC99CB0D}" type="datetimeFigureOut">
               <a:rPr lang="es-BO" smtClean="0"/>
-              <a:t>28/10/2024</a:t>
+              <a:t>3/11/2024</a:t>
             </a:fld>
             <a:endParaRPr lang="es-BO"/>
           </a:p>
@@ -15057,7 +15354,7 @@
           <a:p>
             <a:fld id="{9ECBFC88-F22F-4398-975C-D0F8EC99CB0D}" type="datetimeFigureOut">
               <a:rPr lang="es-BO" smtClean="0"/>
-              <a:t>28/10/2024</a:t>
+              <a:t>3/11/2024</a:t>
             </a:fld>
             <a:endParaRPr lang="es-BO"/>
           </a:p>
@@ -16258,7 +16555,7 @@
           <a:p>
             <a:fld id="{9ECBFC88-F22F-4398-975C-D0F8EC99CB0D}" type="datetimeFigureOut">
               <a:rPr lang="es-BO" smtClean="0"/>
-              <a:t>28/10/2024</a:t>
+              <a:t>3/11/2024</a:t>
             </a:fld>
             <a:endParaRPr lang="es-BO"/>
           </a:p>
@@ -16648,7 +16945,7 @@
           <a:p>
             <a:fld id="{9ECBFC88-F22F-4398-975C-D0F8EC99CB0D}" type="datetimeFigureOut">
               <a:rPr lang="es-BO" smtClean="0"/>
-              <a:t>28/10/2024</a:t>
+              <a:t>3/11/2024</a:t>
             </a:fld>
             <a:endParaRPr lang="es-BO"/>
           </a:p>
@@ -16771,7 +17068,7 @@
           <a:p>
             <a:fld id="{9ECBFC88-F22F-4398-975C-D0F8EC99CB0D}" type="datetimeFigureOut">
               <a:rPr lang="es-BO" smtClean="0"/>
-              <a:t>28/10/2024</a:t>
+              <a:t>3/11/2024</a:t>
             </a:fld>
             <a:endParaRPr lang="es-BO"/>
           </a:p>
@@ -16866,7 +17163,7 @@
           <a:p>
             <a:fld id="{9ECBFC88-F22F-4398-975C-D0F8EC99CB0D}" type="datetimeFigureOut">
               <a:rPr lang="es-BO" smtClean="0"/>
-              <a:t>28/10/2024</a:t>
+              <a:t>3/11/2024</a:t>
             </a:fld>
             <a:endParaRPr lang="es-BO"/>
           </a:p>
@@ -17629,7 +17926,7 @@
           <a:p>
             <a:fld id="{9ECBFC88-F22F-4398-975C-D0F8EC99CB0D}" type="datetimeFigureOut">
               <a:rPr lang="es-BO" smtClean="0"/>
-              <a:t>28/10/2024</a:t>
+              <a:t>3/11/2024</a:t>
             </a:fld>
             <a:endParaRPr lang="es-BO"/>
           </a:p>
@@ -18469,7 +18766,7 @@
           <a:p>
             <a:fld id="{9ECBFC88-F22F-4398-975C-D0F8EC99CB0D}" type="datetimeFigureOut">
               <a:rPr lang="es-BO" smtClean="0"/>
-              <a:t>28/10/2024</a:t>
+              <a:t>3/11/2024</a:t>
             </a:fld>
             <a:endParaRPr lang="es-BO"/>
           </a:p>
@@ -18696,7 +18993,7 @@
           <a:p>
             <a:fld id="{9ECBFC88-F22F-4398-975C-D0F8EC99CB0D}" type="datetimeFigureOut">
               <a:rPr lang="es-BO" smtClean="0"/>
-              <a:t>28/10/2024</a:t>
+              <a:t>3/11/2024</a:t>
             </a:fld>
             <a:endParaRPr lang="es-BO"/>
           </a:p>
@@ -19749,6 +20046,590 @@
     <p:extLst>
       <p:ext uri="{BB962C8B-B14F-4D97-AF65-F5344CB8AC3E}">
         <p14:creationId xmlns:p14="http://schemas.microsoft.com/office/powerpoint/2010/main" val="857968587"/>
+      </p:ext>
+    </p:extLst>
+  </p:cSld>
+  <p:clrMapOvr>
+    <a:masterClrMapping/>
+  </p:clrMapOvr>
+</p:sld>
+</file>
+
+<file path=ppt/slides/slide10.xml><?xml version="1.0" encoding="utf-8"?>
+<p:sld xmlns:a="http://schemas.openxmlformats.org/drawingml/2006/main" xmlns:r="http://schemas.openxmlformats.org/officeDocument/2006/relationships" xmlns:p="http://schemas.openxmlformats.org/presentationml/2006/main">
+  <p:cSld>
+    <p:spTree>
+      <p:nvGrpSpPr>
+        <p:cNvPr id="1" name=""/>
+        <p:cNvGrpSpPr/>
+        <p:nvPr/>
+      </p:nvGrpSpPr>
+      <p:grpSpPr>
+        <a:xfrm>
+          <a:off x="0" y="0"/>
+          <a:ext cx="0" cy="0"/>
+          <a:chOff x="0" y="0"/>
+          <a:chExt cx="0" cy="0"/>
+        </a:xfrm>
+      </p:grpSpPr>
+      <p:sp>
+        <p:nvSpPr>
+          <p:cNvPr id="2" name="Título 1"/>
+          <p:cNvSpPr>
+            <a:spLocks noGrp="1"/>
+          </p:cNvSpPr>
+          <p:nvPr>
+            <p:ph type="title"/>
+          </p:nvPr>
+        </p:nvSpPr>
+        <p:spPr/>
+        <p:txBody>
+          <a:bodyPr/>
+          <a:lstStyle/>
+          <a:p>
+            <a:r>
+              <a:rPr lang="es-ES" dirty="0" smtClean="0"/>
+              <a:t>Condicionales simples si/no</a:t>
+            </a:r>
+            <a:endParaRPr lang="en-US" dirty="0"/>
+          </a:p>
+        </p:txBody>
+      </p:sp>
+      <p:sp>
+        <p:nvSpPr>
+          <p:cNvPr id="4" name="Rombo 3"/>
+          <p:cNvSpPr/>
+          <p:nvPr/>
+        </p:nvSpPr>
+        <p:spPr>
+          <a:xfrm>
+            <a:off x="4310703" y="3414319"/>
+            <a:ext cx="4060271" cy="2759978"/>
+          </a:xfrm>
+          <a:prstGeom prst="diamond">
+            <a:avLst/>
+          </a:prstGeom>
+        </p:spPr>
+        <p:style>
+          <a:lnRef idx="2">
+            <a:schemeClr val="accent1">
+              <a:shade val="50000"/>
+            </a:schemeClr>
+          </a:lnRef>
+          <a:fillRef idx="1">
+            <a:schemeClr val="accent1"/>
+          </a:fillRef>
+          <a:effectRef idx="0">
+            <a:schemeClr val="accent1"/>
+          </a:effectRef>
+          <a:fontRef idx="minor">
+            <a:schemeClr val="lt1"/>
+          </a:fontRef>
+        </p:style>
+        <p:txBody>
+          <a:bodyPr rtlCol="0" anchor="ctr"/>
+          <a:lstStyle/>
+          <a:p>
+            <a:pPr algn="ctr"/>
+            <a:r>
+              <a:rPr lang="es-ES" dirty="0"/>
+              <a:t>¿</a:t>
+            </a:r>
+            <a:r>
+              <a:rPr lang="es-ES" dirty="0" smtClean="0"/>
+              <a:t>ERES MAYOR DE EDAD?</a:t>
+            </a:r>
+            <a:endParaRPr lang="en-US" dirty="0"/>
+          </a:p>
+        </p:txBody>
+      </p:sp>
+      <p:sp>
+        <p:nvSpPr>
+          <p:cNvPr id="5" name="CuadroTexto 4"/>
+          <p:cNvSpPr txBox="1"/>
+          <p:nvPr/>
+        </p:nvSpPr>
+        <p:spPr>
+          <a:xfrm flipH="1">
+            <a:off x="8370974" y="4471142"/>
+            <a:ext cx="3251155" cy="646331"/>
+          </a:xfrm>
+          <a:prstGeom prst="rect">
+            <a:avLst/>
+          </a:prstGeom>
+          <a:noFill/>
+        </p:spPr>
+        <p:txBody>
+          <a:bodyPr wrap="square" rtlCol="0">
+            <a:spAutoFit/>
+          </a:bodyPr>
+          <a:lstStyle/>
+          <a:p>
+            <a:pPr algn="ctr"/>
+            <a:r>
+              <a:rPr lang="es-ES" dirty="0" smtClean="0">
+                <a:solidFill>
+                  <a:schemeClr val="accent3">
+                    <a:lumMod val="75000"/>
+                  </a:schemeClr>
+                </a:solidFill>
+              </a:rPr>
+              <a:t>SI</a:t>
+            </a:r>
+          </a:p>
+          <a:p>
+            <a:pPr algn="ctr"/>
+            <a:r>
+              <a:rPr lang="es-ES" dirty="0" smtClean="0">
+                <a:solidFill>
+                  <a:schemeClr val="accent3">
+                    <a:lumMod val="75000"/>
+                  </a:schemeClr>
+                </a:solidFill>
+              </a:rPr>
+              <a:t>PUEDES ENTRAR</a:t>
+            </a:r>
+            <a:endParaRPr lang="en-US" dirty="0">
+              <a:solidFill>
+                <a:schemeClr val="accent3">
+                  <a:lumMod val="75000"/>
+                </a:schemeClr>
+              </a:solidFill>
+            </a:endParaRPr>
+          </a:p>
+        </p:txBody>
+      </p:sp>
+      <p:sp>
+        <p:nvSpPr>
+          <p:cNvPr id="6" name="CuadroTexto 5"/>
+          <p:cNvSpPr txBox="1"/>
+          <p:nvPr/>
+        </p:nvSpPr>
+        <p:spPr>
+          <a:xfrm flipH="1">
+            <a:off x="1059548" y="4471142"/>
+            <a:ext cx="3251155" cy="646331"/>
+          </a:xfrm>
+          <a:prstGeom prst="rect">
+            <a:avLst/>
+          </a:prstGeom>
+          <a:noFill/>
+        </p:spPr>
+        <p:txBody>
+          <a:bodyPr wrap="square" rtlCol="0">
+            <a:spAutoFit/>
+          </a:bodyPr>
+          <a:lstStyle/>
+          <a:p>
+            <a:pPr algn="ctr"/>
+            <a:r>
+              <a:rPr lang="es-ES" dirty="0" smtClean="0">
+                <a:solidFill>
+                  <a:srgbClr val="FF0000"/>
+                </a:solidFill>
+              </a:rPr>
+              <a:t>NO</a:t>
+            </a:r>
+          </a:p>
+          <a:p>
+            <a:pPr algn="ctr"/>
+            <a:r>
+              <a:rPr lang="es-ES" dirty="0" smtClean="0">
+                <a:solidFill>
+                  <a:srgbClr val="FF0000"/>
+                </a:solidFill>
+              </a:rPr>
+              <a:t>PUEDES ENTRAR</a:t>
+            </a:r>
+            <a:endParaRPr lang="en-US" dirty="0">
+              <a:solidFill>
+                <a:srgbClr val="FF0000"/>
+              </a:solidFill>
+            </a:endParaRPr>
+          </a:p>
+        </p:txBody>
+      </p:sp>
+      <p:sp>
+        <p:nvSpPr>
+          <p:cNvPr id="7" name="CuadroTexto 6"/>
+          <p:cNvSpPr txBox="1"/>
+          <p:nvPr/>
+        </p:nvSpPr>
+        <p:spPr>
+          <a:xfrm>
+            <a:off x="1251678" y="1792841"/>
+            <a:ext cx="7780976" cy="646331"/>
+          </a:xfrm>
+          <a:prstGeom prst="rect">
+            <a:avLst/>
+          </a:prstGeom>
+          <a:noFill/>
+        </p:spPr>
+        <p:txBody>
+          <a:bodyPr wrap="none" rtlCol="0">
+            <a:spAutoFit/>
+          </a:bodyPr>
+          <a:lstStyle/>
+          <a:p>
+            <a:pPr marL="285750" indent="-285750">
+              <a:buFont typeface="Arial" panose="020B0604020202020204" pitchFamily="34" charset="0"/>
+              <a:buChar char="•"/>
+            </a:pPr>
+            <a:r>
+              <a:rPr lang="es-ES" dirty="0" smtClean="0"/>
+              <a:t>Las condicionales nos permiten tomar decisiones dentro de nuestro programa</a:t>
+            </a:r>
+          </a:p>
+          <a:p>
+            <a:endParaRPr lang="en-US" dirty="0"/>
+          </a:p>
+        </p:txBody>
+      </p:sp>
+    </p:spTree>
+    <p:extLst>
+      <p:ext uri="{BB962C8B-B14F-4D97-AF65-F5344CB8AC3E}">
+        <p14:creationId xmlns:p14="http://schemas.microsoft.com/office/powerpoint/2010/main" val="2938097263"/>
+      </p:ext>
+    </p:extLst>
+  </p:cSld>
+  <p:clrMapOvr>
+    <a:masterClrMapping/>
+  </p:clrMapOvr>
+</p:sld>
+</file>
+
+<file path=ppt/slides/slide11.xml><?xml version="1.0" encoding="utf-8"?>
+<p:sld xmlns:a="http://schemas.openxmlformats.org/drawingml/2006/main" xmlns:r="http://schemas.openxmlformats.org/officeDocument/2006/relationships" xmlns:p="http://schemas.openxmlformats.org/presentationml/2006/main">
+  <p:cSld>
+    <p:spTree>
+      <p:nvGrpSpPr>
+        <p:cNvPr id="1" name=""/>
+        <p:cNvGrpSpPr/>
+        <p:nvPr/>
+      </p:nvGrpSpPr>
+      <p:grpSpPr>
+        <a:xfrm>
+          <a:off x="0" y="0"/>
+          <a:ext cx="0" cy="0"/>
+          <a:chOff x="0" y="0"/>
+          <a:chExt cx="0" cy="0"/>
+        </a:xfrm>
+      </p:grpSpPr>
+      <p:sp>
+        <p:nvSpPr>
+          <p:cNvPr id="2" name="Título 1"/>
+          <p:cNvSpPr>
+            <a:spLocks noGrp="1"/>
+          </p:cNvSpPr>
+          <p:nvPr>
+            <p:ph type="title"/>
+          </p:nvPr>
+        </p:nvSpPr>
+        <p:spPr/>
+        <p:txBody>
+          <a:bodyPr/>
+          <a:lstStyle/>
+          <a:p>
+            <a:r>
+              <a:rPr lang="es-ES" dirty="0" smtClean="0"/>
+              <a:t>Ejemplo de condicionales</a:t>
+            </a:r>
+            <a:endParaRPr lang="en-US" dirty="0"/>
+          </a:p>
+        </p:txBody>
+      </p:sp>
+      <p:pic>
+        <p:nvPicPr>
+          <p:cNvPr id="4" name="Imagen 3"/>
+          <p:cNvPicPr>
+            <a:picLocks noChangeAspect="1"/>
+          </p:cNvPicPr>
+          <p:nvPr/>
+        </p:nvPicPr>
+        <p:blipFill>
+          <a:blip r:embed="rId2"/>
+          <a:stretch>
+            <a:fillRect/>
+          </a:stretch>
+        </p:blipFill>
+        <p:spPr>
+          <a:xfrm>
+            <a:off x="1504187" y="1405064"/>
+            <a:ext cx="2791215" cy="1933845"/>
+          </a:xfrm>
+          <a:prstGeom prst="rect">
+            <a:avLst/>
+          </a:prstGeom>
+        </p:spPr>
+      </p:pic>
+      <p:pic>
+        <p:nvPicPr>
+          <p:cNvPr id="5" name="Imagen 4"/>
+          <p:cNvPicPr>
+            <a:picLocks noChangeAspect="1"/>
+          </p:cNvPicPr>
+          <p:nvPr/>
+        </p:nvPicPr>
+        <p:blipFill rotWithShape="1">
+          <a:blip r:embed="rId3"/>
+          <a:srcRect l="7630"/>
+          <a:stretch/>
+        </p:blipFill>
+        <p:spPr>
+          <a:xfrm>
+            <a:off x="1504187" y="3657599"/>
+            <a:ext cx="2901789" cy="2839256"/>
+          </a:xfrm>
+          <a:prstGeom prst="rect">
+            <a:avLst/>
+          </a:prstGeom>
+        </p:spPr>
+      </p:pic>
+      <p:pic>
+        <p:nvPicPr>
+          <p:cNvPr id="6" name="Imagen 5"/>
+          <p:cNvPicPr>
+            <a:picLocks noChangeAspect="1"/>
+          </p:cNvPicPr>
+          <p:nvPr/>
+        </p:nvPicPr>
+        <p:blipFill>
+          <a:blip r:embed="rId4"/>
+          <a:stretch>
+            <a:fillRect/>
+          </a:stretch>
+        </p:blipFill>
+        <p:spPr>
+          <a:xfrm>
+            <a:off x="6340839" y="1567011"/>
+            <a:ext cx="2391109" cy="1609950"/>
+          </a:xfrm>
+          <a:prstGeom prst="rect">
+            <a:avLst/>
+          </a:prstGeom>
+        </p:spPr>
+      </p:pic>
+      <p:pic>
+        <p:nvPicPr>
+          <p:cNvPr id="7" name="Imagen 6"/>
+          <p:cNvPicPr>
+            <a:picLocks noChangeAspect="1"/>
+          </p:cNvPicPr>
+          <p:nvPr/>
+        </p:nvPicPr>
+        <p:blipFill>
+          <a:blip r:embed="rId5"/>
+          <a:stretch>
+            <a:fillRect/>
+          </a:stretch>
+        </p:blipFill>
+        <p:spPr>
+          <a:xfrm>
+            <a:off x="6340839" y="3657599"/>
+            <a:ext cx="4191585" cy="2438740"/>
+          </a:xfrm>
+          <a:prstGeom prst="rect">
+            <a:avLst/>
+          </a:prstGeom>
+        </p:spPr>
+      </p:pic>
+    </p:spTree>
+    <p:extLst>
+      <p:ext uri="{BB962C8B-B14F-4D97-AF65-F5344CB8AC3E}">
+        <p14:creationId xmlns:p14="http://schemas.microsoft.com/office/powerpoint/2010/main" val="2147110593"/>
+      </p:ext>
+    </p:extLst>
+  </p:cSld>
+  <p:clrMapOvr>
+    <a:masterClrMapping/>
+  </p:clrMapOvr>
+</p:sld>
+</file>
+
+<file path=ppt/slides/slide12.xml><?xml version="1.0" encoding="utf-8"?>
+<p:sld xmlns:a="http://schemas.openxmlformats.org/drawingml/2006/main" xmlns:r="http://schemas.openxmlformats.org/officeDocument/2006/relationships" xmlns:p="http://schemas.openxmlformats.org/presentationml/2006/main">
+  <p:cSld>
+    <p:spTree>
+      <p:nvGrpSpPr>
+        <p:cNvPr id="1" name=""/>
+        <p:cNvGrpSpPr/>
+        <p:nvPr/>
+      </p:nvGrpSpPr>
+      <p:grpSpPr>
+        <a:xfrm>
+          <a:off x="0" y="0"/>
+          <a:ext cx="0" cy="0"/>
+          <a:chOff x="0" y="0"/>
+          <a:chExt cx="0" cy="0"/>
+        </a:xfrm>
+      </p:grpSpPr>
+      <p:sp>
+        <p:nvSpPr>
+          <p:cNvPr id="2" name="Título 1"/>
+          <p:cNvSpPr>
+            <a:spLocks noGrp="1"/>
+          </p:cNvSpPr>
+          <p:nvPr>
+            <p:ph type="title"/>
+          </p:nvPr>
+        </p:nvSpPr>
+        <p:spPr/>
+        <p:txBody>
+          <a:bodyPr/>
+          <a:lstStyle/>
+          <a:p>
+            <a:r>
+              <a:rPr lang="es-ES" dirty="0" smtClean="0"/>
+              <a:t>Estructura repetitiva </a:t>
+            </a:r>
+            <a:r>
+              <a:rPr lang="es-ES" dirty="0" err="1" smtClean="0"/>
+              <a:t>for</a:t>
+            </a:r>
+            <a:endParaRPr lang="en-US" dirty="0"/>
+          </a:p>
+        </p:txBody>
+      </p:sp>
+      <p:sp>
+        <p:nvSpPr>
+          <p:cNvPr id="3" name="Marcador de contenido 2"/>
+          <p:cNvSpPr>
+            <a:spLocks noGrp="1"/>
+          </p:cNvSpPr>
+          <p:nvPr>
+            <p:ph idx="1"/>
+          </p:nvPr>
+        </p:nvSpPr>
+        <p:spPr>
+          <a:xfrm>
+            <a:off x="1251678" y="2025942"/>
+            <a:ext cx="10178322" cy="3593591"/>
+          </a:xfrm>
+        </p:spPr>
+        <p:txBody>
+          <a:bodyPr/>
+          <a:lstStyle/>
+          <a:p>
+            <a:r>
+              <a:rPr lang="es-ES" dirty="0" smtClean="0"/>
+              <a:t>La estructura repetitiva FOR es la cual podemos ejecutar unas instrucciones un numero finito de veces, a diferencia del </a:t>
+            </a:r>
+            <a:r>
+              <a:rPr lang="es-ES" dirty="0" err="1" smtClean="0"/>
+              <a:t>while</a:t>
+            </a:r>
+            <a:r>
+              <a:rPr lang="es-ES" dirty="0" smtClean="0"/>
+              <a:t> que se repite una cantidad de veces según la condición se cumpla, el </a:t>
+            </a:r>
+            <a:r>
+              <a:rPr lang="es-ES" dirty="0" err="1" smtClean="0"/>
+              <a:t>for</a:t>
+            </a:r>
+            <a:r>
+              <a:rPr lang="es-ES" dirty="0" smtClean="0"/>
+              <a:t> solo le da el numero de veces que se quiere repetir</a:t>
+            </a:r>
+            <a:endParaRPr lang="en-US" dirty="0"/>
+          </a:p>
+        </p:txBody>
+      </p:sp>
+      <p:pic>
+        <p:nvPicPr>
+          <p:cNvPr id="4" name="Imagen 3"/>
+          <p:cNvPicPr>
+            <a:picLocks noChangeAspect="1"/>
+          </p:cNvPicPr>
+          <p:nvPr/>
+        </p:nvPicPr>
+        <p:blipFill>
+          <a:blip r:embed="rId2"/>
+          <a:stretch>
+            <a:fillRect/>
+          </a:stretch>
+        </p:blipFill>
+        <p:spPr>
+          <a:xfrm>
+            <a:off x="4636150" y="3548543"/>
+            <a:ext cx="3335749" cy="2696215"/>
+          </a:xfrm>
+          <a:prstGeom prst="rect">
+            <a:avLst/>
+          </a:prstGeom>
+        </p:spPr>
+      </p:pic>
+    </p:spTree>
+    <p:extLst>
+      <p:ext uri="{BB962C8B-B14F-4D97-AF65-F5344CB8AC3E}">
+        <p14:creationId xmlns:p14="http://schemas.microsoft.com/office/powerpoint/2010/main" val="280386236"/>
+      </p:ext>
+    </p:extLst>
+  </p:cSld>
+  <p:clrMapOvr>
+    <a:masterClrMapping/>
+  </p:clrMapOvr>
+</p:sld>
+</file>
+
+<file path=ppt/slides/slide13.xml><?xml version="1.0" encoding="utf-8"?>
+<p:sld xmlns:a="http://schemas.openxmlformats.org/drawingml/2006/main" xmlns:r="http://schemas.openxmlformats.org/officeDocument/2006/relationships" xmlns:p="http://schemas.openxmlformats.org/presentationml/2006/main">
+  <p:cSld>
+    <p:spTree>
+      <p:nvGrpSpPr>
+        <p:cNvPr id="1" name=""/>
+        <p:cNvGrpSpPr/>
+        <p:nvPr/>
+      </p:nvGrpSpPr>
+      <p:grpSpPr>
+        <a:xfrm>
+          <a:off x="0" y="0"/>
+          <a:ext cx="0" cy="0"/>
+          <a:chOff x="0" y="0"/>
+          <a:chExt cx="0" cy="0"/>
+        </a:xfrm>
+      </p:grpSpPr>
+      <p:sp>
+        <p:nvSpPr>
+          <p:cNvPr id="2" name="Título 1"/>
+          <p:cNvSpPr>
+            <a:spLocks noGrp="1"/>
+          </p:cNvSpPr>
+          <p:nvPr>
+            <p:ph type="title"/>
+          </p:nvPr>
+        </p:nvSpPr>
+        <p:spPr/>
+        <p:txBody>
+          <a:bodyPr/>
+          <a:lstStyle/>
+          <a:p>
+            <a:endParaRPr lang="en-US"/>
+          </a:p>
+        </p:txBody>
+      </p:sp>
+      <p:sp>
+        <p:nvSpPr>
+          <p:cNvPr id="3" name="Marcador de contenido 2"/>
+          <p:cNvSpPr>
+            <a:spLocks noGrp="1"/>
+          </p:cNvSpPr>
+          <p:nvPr>
+            <p:ph idx="1"/>
+          </p:nvPr>
+        </p:nvSpPr>
+        <p:spPr/>
+        <p:txBody>
+          <a:bodyPr/>
+          <a:lstStyle/>
+          <a:p>
+            <a:endParaRPr lang="en-US"/>
+          </a:p>
+        </p:txBody>
+      </p:sp>
+    </p:spTree>
+    <p:extLst>
+      <p:ext uri="{BB962C8B-B14F-4D97-AF65-F5344CB8AC3E}">
+        <p14:creationId xmlns:p14="http://schemas.microsoft.com/office/powerpoint/2010/main" val="910873455"/>
       </p:ext>
     </p:extLst>
   </p:cSld>
@@ -21040,14 +21921,92 @@
           </a:p>
         </p:txBody>
       </p:sp>
+      <p:pic>
+        <p:nvPicPr>
+          <p:cNvPr id="4" name="Imagen 3"/>
+          <p:cNvPicPr>
+            <a:picLocks noChangeAspect="1"/>
+          </p:cNvPicPr>
+          <p:nvPr/>
+        </p:nvPicPr>
+        <p:blipFill>
+          <a:blip r:embed="rId2"/>
+          <a:stretch>
+            <a:fillRect/>
+          </a:stretch>
+        </p:blipFill>
+        <p:spPr>
+          <a:xfrm>
+            <a:off x="1371600" y="1360112"/>
+            <a:ext cx="9719482" cy="2473905"/>
+          </a:xfrm>
+          <a:prstGeom prst="rect">
+            <a:avLst/>
+          </a:prstGeom>
+        </p:spPr>
+      </p:pic>
+      <p:pic>
+        <p:nvPicPr>
+          <p:cNvPr id="5" name="Imagen 4"/>
+          <p:cNvPicPr>
+            <a:picLocks noChangeAspect="1"/>
+          </p:cNvPicPr>
+          <p:nvPr/>
+        </p:nvPicPr>
+        <p:blipFill>
+          <a:blip r:embed="rId3"/>
+          <a:stretch>
+            <a:fillRect/>
+          </a:stretch>
+        </p:blipFill>
+        <p:spPr>
+          <a:xfrm>
+            <a:off x="4871564" y="3834017"/>
+            <a:ext cx="1680942" cy="2709091"/>
+          </a:xfrm>
+          <a:prstGeom prst="rect">
+            <a:avLst/>
+          </a:prstGeom>
+        </p:spPr>
+      </p:pic>
+    </p:spTree>
+    <p:extLst>
+      <p:ext uri="{BB962C8B-B14F-4D97-AF65-F5344CB8AC3E}">
+        <p14:creationId xmlns:p14="http://schemas.microsoft.com/office/powerpoint/2010/main" val="2129387778"/>
+      </p:ext>
+    </p:extLst>
+  </p:cSld>
+  <p:clrMapOvr>
+    <a:masterClrMapping/>
+  </p:clrMapOvr>
+</p:sld>
+</file>
+
+<file path=ppt/slides/slide9.xml><?xml version="1.0" encoding="utf-8"?>
+<p:sld xmlns:a="http://schemas.openxmlformats.org/drawingml/2006/main" xmlns:r="http://schemas.openxmlformats.org/officeDocument/2006/relationships" xmlns:p="http://schemas.openxmlformats.org/presentationml/2006/main">
+  <p:cSld>
+    <p:spTree>
+      <p:nvGrpSpPr>
+        <p:cNvPr id="1" name=""/>
+        <p:cNvGrpSpPr/>
+        <p:nvPr/>
+      </p:nvGrpSpPr>
+      <p:grpSpPr>
+        <a:xfrm>
+          <a:off x="0" y="0"/>
+          <a:ext cx="0" cy="0"/>
+          <a:chOff x="0" y="0"/>
+          <a:chExt cx="0" cy="0"/>
+        </a:xfrm>
+      </p:grpSpPr>
       <p:sp>
         <p:nvSpPr>
-          <p:cNvPr id="3" name="Marcador de contenido 2"/>
+          <p:cNvPr id="2" name="Título 1"/>
           <p:cNvSpPr>
             <a:spLocks noGrp="1"/>
           </p:cNvSpPr>
           <p:nvPr>
-            <p:ph idx="1"/>
+            <p:ph type="title"/>
           </p:nvPr>
         </p:nvSpPr>
         <p:spPr/>
@@ -21055,14 +22014,544 @@
           <a:bodyPr/>
           <a:lstStyle/>
           <a:p>
-            <a:endParaRPr lang="es-BO" dirty="0"/>
+            <a:r>
+              <a:rPr lang="es-ES" dirty="0" smtClean="0"/>
+              <a:t>Operadores relacionales</a:t>
+            </a:r>
+            <a:endParaRPr lang="en-US" dirty="0"/>
           </a:p>
         </p:txBody>
       </p:sp>
+      <p:graphicFrame>
+        <p:nvGraphicFramePr>
+          <p:cNvPr id="5" name="Marcador de contenido 4"/>
+          <p:cNvGraphicFramePr>
+            <a:graphicFrameLocks noGrp="1"/>
+          </p:cNvGraphicFramePr>
+          <p:nvPr>
+            <p:ph idx="1"/>
+            <p:extLst>
+              <p:ext uri="{D42A27DB-BD31-4B8C-83A1-F6EECF244321}">
+                <p14:modId xmlns:p14="http://schemas.microsoft.com/office/powerpoint/2010/main" val="1940463766"/>
+              </p:ext>
+            </p:extLst>
+          </p:nvPr>
+        </p:nvGraphicFramePr>
+        <p:xfrm>
+          <a:off x="1250950" y="2286000"/>
+          <a:ext cx="10179052" cy="2595880"/>
+        </p:xfrm>
+        <a:graphic>
+          <a:graphicData uri="http://schemas.openxmlformats.org/drawingml/2006/table">
+            <a:tbl>
+              <a:tblPr firstRow="1" bandRow="1">
+                <a:tableStyleId>{5C22544A-7EE6-4342-B048-85BDC9FD1C3A}</a:tableStyleId>
+              </a:tblPr>
+              <a:tblGrid>
+                <a:gridCol w="2544763">
+                  <a:extLst>
+                    <a:ext uri="{9D8B030D-6E8A-4147-A177-3AD203B41FA5}">
+                      <a16:colId xmlns:a16="http://schemas.microsoft.com/office/drawing/2014/main" val="2633381577"/>
+                    </a:ext>
+                  </a:extLst>
+                </a:gridCol>
+                <a:gridCol w="2544763">
+                  <a:extLst>
+                    <a:ext uri="{9D8B030D-6E8A-4147-A177-3AD203B41FA5}">
+                      <a16:colId xmlns:a16="http://schemas.microsoft.com/office/drawing/2014/main" val="510132965"/>
+                    </a:ext>
+                  </a:extLst>
+                </a:gridCol>
+                <a:gridCol w="2544763">
+                  <a:extLst>
+                    <a:ext uri="{9D8B030D-6E8A-4147-A177-3AD203B41FA5}">
+                      <a16:colId xmlns:a16="http://schemas.microsoft.com/office/drawing/2014/main" val="3345385508"/>
+                    </a:ext>
+                  </a:extLst>
+                </a:gridCol>
+                <a:gridCol w="2544763">
+                  <a:extLst>
+                    <a:ext uri="{9D8B030D-6E8A-4147-A177-3AD203B41FA5}">
+                      <a16:colId xmlns:a16="http://schemas.microsoft.com/office/drawing/2014/main" val="2139433591"/>
+                    </a:ext>
+                  </a:extLst>
+                </a:gridCol>
+              </a:tblGrid>
+              <a:tr h="370840">
+                <a:tc>
+                  <a:txBody>
+                    <a:bodyPr/>
+                    <a:lstStyle/>
+                    <a:p>
+                      <a:r>
+                        <a:rPr lang="es-ES" sz="1600" dirty="0" smtClean="0"/>
+                        <a:t>operador</a:t>
+                      </a:r>
+                      <a:endParaRPr lang="en-US" sz="1600" dirty="0"/>
+                    </a:p>
+                  </a:txBody>
+                  <a:tcPr/>
+                </a:tc>
+                <a:tc>
+                  <a:txBody>
+                    <a:bodyPr/>
+                    <a:lstStyle/>
+                    <a:p>
+                      <a:r>
+                        <a:rPr lang="es-ES" sz="1600" dirty="0" smtClean="0"/>
+                        <a:t>nombre</a:t>
+                      </a:r>
+                      <a:endParaRPr lang="en-US" sz="1600" dirty="0"/>
+                    </a:p>
+                  </a:txBody>
+                  <a:tcPr/>
+                </a:tc>
+                <a:tc>
+                  <a:txBody>
+                    <a:bodyPr/>
+                    <a:lstStyle/>
+                    <a:p>
+                      <a:r>
+                        <a:rPr lang="es-ES" sz="1600" dirty="0" smtClean="0"/>
+                        <a:t>ejemplo</a:t>
+                      </a:r>
+                      <a:endParaRPr lang="en-US" sz="1600" dirty="0"/>
+                    </a:p>
+                  </a:txBody>
+                  <a:tcPr/>
+                </a:tc>
+                <a:tc>
+                  <a:txBody>
+                    <a:bodyPr/>
+                    <a:lstStyle/>
+                    <a:p>
+                      <a:r>
+                        <a:rPr lang="es-ES" sz="1600" dirty="0" smtClean="0"/>
+                        <a:t>significado</a:t>
+                      </a:r>
+                      <a:endParaRPr lang="en-US" sz="1600" dirty="0"/>
+                    </a:p>
+                  </a:txBody>
+                  <a:tcPr/>
+                </a:tc>
+                <a:extLst>
+                  <a:ext uri="{0D108BD9-81ED-4DB2-BD59-A6C34878D82A}">
+                    <a16:rowId xmlns:a16="http://schemas.microsoft.com/office/drawing/2014/main" val="4282715213"/>
+                  </a:ext>
+                </a:extLst>
+              </a:tr>
+              <a:tr h="370840">
+                <a:tc>
+                  <a:txBody>
+                    <a:bodyPr/>
+                    <a:lstStyle/>
+                    <a:p>
+                      <a:r>
+                        <a:rPr lang="es-ES" sz="1600" dirty="0" smtClean="0"/>
+                        <a:t>&lt;</a:t>
+                      </a:r>
+                    </a:p>
+                  </a:txBody>
+                  <a:tcPr/>
+                </a:tc>
+                <a:tc>
+                  <a:txBody>
+                    <a:bodyPr/>
+                    <a:lstStyle/>
+                    <a:p>
+                      <a:r>
+                        <a:rPr lang="es-ES" sz="1600" dirty="0" smtClean="0"/>
+                        <a:t>menor</a:t>
+                      </a:r>
+                      <a:r>
+                        <a:rPr lang="es-ES" sz="1600" baseline="0" dirty="0" smtClean="0"/>
+                        <a:t> que</a:t>
+                      </a:r>
+                      <a:endParaRPr lang="en-US" sz="1600" dirty="0"/>
+                    </a:p>
+                  </a:txBody>
+                  <a:tcPr/>
+                </a:tc>
+                <a:tc>
+                  <a:txBody>
+                    <a:bodyPr/>
+                    <a:lstStyle/>
+                    <a:p>
+                      <a:r>
+                        <a:rPr lang="es-ES" sz="1600" dirty="0" smtClean="0"/>
+                        <a:t>a&lt;b</a:t>
+                      </a:r>
+                      <a:endParaRPr lang="en-US" sz="1600" dirty="0"/>
+                    </a:p>
+                  </a:txBody>
+                  <a:tcPr/>
+                </a:tc>
+                <a:tc>
+                  <a:txBody>
+                    <a:bodyPr/>
+                    <a:lstStyle/>
+                    <a:p>
+                      <a:r>
+                        <a:rPr lang="es-ES" sz="1600" dirty="0" smtClean="0"/>
+                        <a:t>a</a:t>
+                      </a:r>
+                      <a:r>
+                        <a:rPr lang="es-ES" sz="1600" baseline="0" dirty="0" smtClean="0"/>
+                        <a:t> es menor que b</a:t>
+                      </a:r>
+                    </a:p>
+                  </a:txBody>
+                  <a:tcPr/>
+                </a:tc>
+                <a:extLst>
+                  <a:ext uri="{0D108BD9-81ED-4DB2-BD59-A6C34878D82A}">
+                    <a16:rowId xmlns:a16="http://schemas.microsoft.com/office/drawing/2014/main" val="120121548"/>
+                  </a:ext>
+                </a:extLst>
+              </a:tr>
+              <a:tr h="370840">
+                <a:tc>
+                  <a:txBody>
+                    <a:bodyPr/>
+                    <a:lstStyle/>
+                    <a:p>
+                      <a:r>
+                        <a:rPr lang="es-ES" sz="1600" dirty="0" smtClean="0"/>
+                        <a:t>&gt;</a:t>
+                      </a:r>
+                      <a:endParaRPr lang="en-US" sz="1600" dirty="0"/>
+                    </a:p>
+                  </a:txBody>
+                  <a:tcPr/>
+                </a:tc>
+                <a:tc>
+                  <a:txBody>
+                    <a:bodyPr/>
+                    <a:lstStyle/>
+                    <a:p>
+                      <a:r>
+                        <a:rPr lang="es-ES" sz="1600" dirty="0" smtClean="0"/>
+                        <a:t>mayor que</a:t>
+                      </a:r>
+                      <a:endParaRPr lang="en-US" sz="1600" dirty="0"/>
+                    </a:p>
+                  </a:txBody>
+                  <a:tcPr/>
+                </a:tc>
+                <a:tc>
+                  <a:txBody>
+                    <a:bodyPr/>
+                    <a:lstStyle/>
+                    <a:p>
+                      <a:r>
+                        <a:rPr lang="es-ES" sz="1600" dirty="0" smtClean="0"/>
+                        <a:t>a&gt;b</a:t>
+                      </a:r>
+                      <a:endParaRPr lang="en-US" sz="1600" dirty="0"/>
+                    </a:p>
+                  </a:txBody>
+                  <a:tcPr/>
+                </a:tc>
+                <a:tc>
+                  <a:txBody>
+                    <a:bodyPr/>
+                    <a:lstStyle/>
+                    <a:p>
+                      <a:r>
+                        <a:rPr lang="es-ES" sz="1600" dirty="0" smtClean="0"/>
+                        <a:t>a es</a:t>
+                      </a:r>
+                      <a:r>
+                        <a:rPr lang="es-ES" sz="1600" baseline="0" dirty="0" smtClean="0"/>
+                        <a:t> menor que b</a:t>
+                      </a:r>
+                    </a:p>
+                  </a:txBody>
+                  <a:tcPr/>
+                </a:tc>
+                <a:extLst>
+                  <a:ext uri="{0D108BD9-81ED-4DB2-BD59-A6C34878D82A}">
+                    <a16:rowId xmlns:a16="http://schemas.microsoft.com/office/drawing/2014/main" val="1326027241"/>
+                  </a:ext>
+                </a:extLst>
+              </a:tr>
+              <a:tr h="370840">
+                <a:tc>
+                  <a:txBody>
+                    <a:bodyPr/>
+                    <a:lstStyle/>
+                    <a:p>
+                      <a:r>
+                        <a:rPr lang="es-ES" sz="1600" dirty="0" smtClean="0"/>
+                        <a:t>==</a:t>
+                      </a:r>
+                      <a:endParaRPr lang="en-US" sz="1600" dirty="0"/>
+                    </a:p>
+                  </a:txBody>
+                  <a:tcPr/>
+                </a:tc>
+                <a:tc>
+                  <a:txBody>
+                    <a:bodyPr/>
+                    <a:lstStyle/>
+                    <a:p>
+                      <a:r>
+                        <a:rPr lang="es-ES" sz="1600" dirty="0" smtClean="0"/>
+                        <a:t>igual a</a:t>
+                      </a:r>
+                      <a:endParaRPr lang="en-US" sz="1600" dirty="0"/>
+                    </a:p>
+                  </a:txBody>
+                  <a:tcPr/>
+                </a:tc>
+                <a:tc>
+                  <a:txBody>
+                    <a:bodyPr/>
+                    <a:lstStyle/>
+                    <a:p>
+                      <a:r>
+                        <a:rPr lang="es-ES" sz="1600" dirty="0" smtClean="0"/>
+                        <a:t>a==b</a:t>
+                      </a:r>
+                      <a:endParaRPr lang="en-US" sz="1600" dirty="0"/>
+                    </a:p>
+                  </a:txBody>
+                  <a:tcPr/>
+                </a:tc>
+                <a:tc>
+                  <a:txBody>
+                    <a:bodyPr/>
+                    <a:lstStyle/>
+                    <a:p>
+                      <a:r>
+                        <a:rPr lang="es-ES" sz="1600" dirty="0" smtClean="0"/>
+                        <a:t>a es igual que b</a:t>
+                      </a:r>
+                    </a:p>
+                  </a:txBody>
+                  <a:tcPr/>
+                </a:tc>
+                <a:extLst>
+                  <a:ext uri="{0D108BD9-81ED-4DB2-BD59-A6C34878D82A}">
+                    <a16:rowId xmlns:a16="http://schemas.microsoft.com/office/drawing/2014/main" val="1354027791"/>
+                  </a:ext>
+                </a:extLst>
+              </a:tr>
+              <a:tr h="370840">
+                <a:tc>
+                  <a:txBody>
+                    <a:bodyPr/>
+                    <a:lstStyle/>
+                    <a:p>
+                      <a:r>
+                        <a:rPr lang="es-ES" sz="1600" dirty="0" smtClean="0"/>
+                        <a:t>&lt;&gt;</a:t>
+                      </a:r>
+                      <a:r>
+                        <a:rPr lang="es-ES" sz="1600" baseline="0" dirty="0" smtClean="0"/>
+                        <a:t> o </a:t>
+                      </a:r>
+                      <a:r>
+                        <a:rPr lang="es-ES" sz="1600" dirty="0" smtClean="0"/>
+                        <a:t>≠</a:t>
+                      </a:r>
+                      <a:endParaRPr lang="en-US" sz="1600" dirty="0"/>
+                    </a:p>
+                  </a:txBody>
+                  <a:tcPr/>
+                </a:tc>
+                <a:tc>
+                  <a:txBody>
+                    <a:bodyPr/>
+                    <a:lstStyle/>
+                    <a:p>
+                      <a:r>
+                        <a:rPr lang="es-ES" sz="1600" dirty="0" smtClean="0"/>
+                        <a:t>no igual a </a:t>
+                      </a:r>
+                      <a:endParaRPr lang="en-US" sz="1600" dirty="0"/>
+                    </a:p>
+                  </a:txBody>
+                  <a:tcPr/>
+                </a:tc>
+                <a:tc>
+                  <a:txBody>
+                    <a:bodyPr/>
+                    <a:lstStyle/>
+                    <a:p>
+                      <a:r>
+                        <a:rPr lang="es-ES" sz="1600" dirty="0" smtClean="0"/>
+                        <a:t>a ≠ b</a:t>
+                      </a:r>
+                      <a:endParaRPr lang="en-US" sz="1600" dirty="0"/>
+                    </a:p>
+                  </a:txBody>
+                  <a:tcPr/>
+                </a:tc>
+                <a:tc>
+                  <a:txBody>
+                    <a:bodyPr/>
+                    <a:lstStyle/>
+                    <a:p>
+                      <a:r>
+                        <a:rPr lang="es-ES" sz="1600" dirty="0" smtClean="0"/>
+                        <a:t>a no</a:t>
+                      </a:r>
+                      <a:r>
+                        <a:rPr lang="es-ES" sz="1600" baseline="0" dirty="0" smtClean="0"/>
+                        <a:t> es igual que b</a:t>
+                      </a:r>
+                      <a:endParaRPr lang="en-US" sz="1600" dirty="0"/>
+                    </a:p>
+                  </a:txBody>
+                  <a:tcPr/>
+                </a:tc>
+                <a:extLst>
+                  <a:ext uri="{0D108BD9-81ED-4DB2-BD59-A6C34878D82A}">
+                    <a16:rowId xmlns:a16="http://schemas.microsoft.com/office/drawing/2014/main" val="3212821456"/>
+                  </a:ext>
+                </a:extLst>
+              </a:tr>
+              <a:tr h="370840">
+                <a:tc>
+                  <a:txBody>
+                    <a:bodyPr/>
+                    <a:lstStyle/>
+                    <a:p>
+                      <a:r>
+                        <a:rPr lang="es-ES" sz="1600" dirty="0" smtClean="0"/>
+                        <a:t>&lt;=</a:t>
+                      </a:r>
+                    </a:p>
+                  </a:txBody>
+                  <a:tcPr/>
+                </a:tc>
+                <a:tc>
+                  <a:txBody>
+                    <a:bodyPr/>
+                    <a:lstStyle/>
+                    <a:p>
+                      <a:r>
+                        <a:rPr lang="es-ES" sz="1600" dirty="0" smtClean="0"/>
+                        <a:t>menor que o igual a </a:t>
+                      </a:r>
+                      <a:endParaRPr lang="en-US" sz="1600" dirty="0"/>
+                    </a:p>
+                  </a:txBody>
+                  <a:tcPr/>
+                </a:tc>
+                <a:tc>
+                  <a:txBody>
+                    <a:bodyPr/>
+                    <a:lstStyle/>
+                    <a:p>
+                      <a:r>
+                        <a:rPr lang="es-ES" sz="1600" dirty="0" smtClean="0"/>
+                        <a:t>a&lt;=b</a:t>
+                      </a:r>
+                      <a:endParaRPr lang="en-US" sz="1600" dirty="0"/>
+                    </a:p>
+                  </a:txBody>
+                  <a:tcPr/>
+                </a:tc>
+                <a:tc>
+                  <a:txBody>
+                    <a:bodyPr/>
+                    <a:lstStyle/>
+                    <a:p>
+                      <a:r>
+                        <a:rPr lang="es-ES" sz="1600" dirty="0" smtClean="0"/>
+                        <a:t>a es menor o igual</a:t>
+                      </a:r>
+                      <a:r>
+                        <a:rPr lang="es-ES" sz="1600" baseline="0" dirty="0" smtClean="0"/>
+                        <a:t> que b</a:t>
+                      </a:r>
+                    </a:p>
+                  </a:txBody>
+                  <a:tcPr/>
+                </a:tc>
+                <a:extLst>
+                  <a:ext uri="{0D108BD9-81ED-4DB2-BD59-A6C34878D82A}">
+                    <a16:rowId xmlns:a16="http://schemas.microsoft.com/office/drawing/2014/main" val="3577244523"/>
+                  </a:ext>
+                </a:extLst>
+              </a:tr>
+              <a:tr h="370840">
+                <a:tc>
+                  <a:txBody>
+                    <a:bodyPr/>
+                    <a:lstStyle/>
+                    <a:p>
+                      <a:r>
+                        <a:rPr lang="es-ES" sz="1600" dirty="0" smtClean="0"/>
+                        <a:t>&gt;=</a:t>
+                      </a:r>
+                      <a:endParaRPr lang="en-US" sz="1600" dirty="0"/>
+                    </a:p>
+                  </a:txBody>
+                  <a:tcPr/>
+                </a:tc>
+                <a:tc>
+                  <a:txBody>
+                    <a:bodyPr/>
+                    <a:lstStyle/>
+                    <a:p>
+                      <a:r>
+                        <a:rPr lang="es-ES" sz="1600" dirty="0" smtClean="0"/>
+                        <a:t>mayor</a:t>
+                      </a:r>
+                      <a:r>
+                        <a:rPr lang="es-ES" sz="1600" baseline="0" dirty="0" smtClean="0"/>
+                        <a:t> que o igual a </a:t>
+                      </a:r>
+                      <a:endParaRPr lang="en-US" sz="1600" dirty="0"/>
+                    </a:p>
+                  </a:txBody>
+                  <a:tcPr/>
+                </a:tc>
+                <a:tc>
+                  <a:txBody>
+                    <a:bodyPr/>
+                    <a:lstStyle/>
+                    <a:p>
+                      <a:r>
+                        <a:rPr lang="es-ES" sz="1600" dirty="0" smtClean="0"/>
+                        <a:t>a&gt;=b</a:t>
+                      </a:r>
+                      <a:endParaRPr lang="en-US" sz="1600" dirty="0"/>
+                    </a:p>
+                  </a:txBody>
+                  <a:tcPr/>
+                </a:tc>
+                <a:tc>
+                  <a:txBody>
+                    <a:bodyPr/>
+                    <a:lstStyle/>
+                    <a:p>
+                      <a:r>
+                        <a:rPr lang="es-ES" sz="1600" dirty="0" smtClean="0"/>
+                        <a:t>a es mayor o igual que b</a:t>
+                      </a:r>
+                      <a:endParaRPr lang="en-US" sz="1600" dirty="0"/>
+                    </a:p>
+                  </a:txBody>
+                  <a:tcPr/>
+                </a:tc>
+                <a:extLst>
+                  <a:ext uri="{0D108BD9-81ED-4DB2-BD59-A6C34878D82A}">
+                    <a16:rowId xmlns:a16="http://schemas.microsoft.com/office/drawing/2014/main" val="1832875506"/>
+                  </a:ext>
+                </a:extLst>
+              </a:tr>
+            </a:tbl>
+          </a:graphicData>
+        </a:graphic>
+      </p:graphicFrame>
     </p:spTree>
     <p:extLst>
       <p:ext uri="{BB962C8B-B14F-4D97-AF65-F5344CB8AC3E}">
-        <p14:creationId xmlns:p14="http://schemas.microsoft.com/office/powerpoint/2010/main" val="2129387778"/>
+        <p14:creationId xmlns:p14="http://schemas.microsoft.com/office/powerpoint/2010/main" val="2146800918"/>
       </p:ext>
     </p:extLst>
   </p:cSld>

</xml_diff>

<commit_message>
fin de la clase
</commit_message>
<xml_diff>
--- a/Lógica de programación.pptx
+++ b/Lógica de programación.pptx
@@ -18,6 +18,10 @@
     <p:sldId id="266" r:id="rId12"/>
     <p:sldId id="267" r:id="rId13"/>
     <p:sldId id="268" r:id="rId14"/>
+    <p:sldId id="269" r:id="rId15"/>
+    <p:sldId id="270" r:id="rId16"/>
+    <p:sldId id="271" r:id="rId17"/>
+    <p:sldId id="272" r:id="rId18"/>
   </p:sldIdLst>
   <p:sldSz cx="12192000" cy="6858000"/>
   <p:notesSz cx="6858000" cy="9144000"/>
@@ -2366,6 +2370,753 @@
 </file>
 
 <file path=ppt/diagrams/colors4.xml><?xml version="1.0" encoding="utf-8"?>
+<dgm:colorsDef xmlns:dgm="http://schemas.openxmlformats.org/drawingml/2006/diagram" xmlns:a="http://schemas.openxmlformats.org/drawingml/2006/main" uniqueId="urn:microsoft.com/office/officeart/2005/8/colors/accent1_2">
+  <dgm:title val=""/>
+  <dgm:desc val=""/>
+  <dgm:catLst>
+    <dgm:cat type="accent1" pri="11200"/>
+  </dgm:catLst>
+  <dgm:styleLbl name="node0">
+    <dgm:fillClrLst meth="repeat">
+      <a:schemeClr val="accent1"/>
+    </dgm:fillClrLst>
+    <dgm:linClrLst meth="repeat">
+      <a:schemeClr val="lt1"/>
+    </dgm:linClrLst>
+    <dgm:effectClrLst/>
+    <dgm:txLinClrLst/>
+    <dgm:txFillClrLst/>
+    <dgm:txEffectClrLst/>
+  </dgm:styleLbl>
+  <dgm:styleLbl name="alignNode1">
+    <dgm:fillClrLst meth="repeat">
+      <a:schemeClr val="accent1"/>
+    </dgm:fillClrLst>
+    <dgm:linClrLst meth="repeat">
+      <a:schemeClr val="accent1"/>
+    </dgm:linClrLst>
+    <dgm:effectClrLst/>
+    <dgm:txLinClrLst/>
+    <dgm:txFillClrLst/>
+    <dgm:txEffectClrLst/>
+  </dgm:styleLbl>
+  <dgm:styleLbl name="node1">
+    <dgm:fillClrLst meth="repeat">
+      <a:schemeClr val="accent1"/>
+    </dgm:fillClrLst>
+    <dgm:linClrLst meth="repeat">
+      <a:schemeClr val="lt1"/>
+    </dgm:linClrLst>
+    <dgm:effectClrLst/>
+    <dgm:txLinClrLst/>
+    <dgm:txFillClrLst/>
+    <dgm:txEffectClrLst/>
+  </dgm:styleLbl>
+  <dgm:styleLbl name="lnNode1">
+    <dgm:fillClrLst meth="repeat">
+      <a:schemeClr val="accent1"/>
+    </dgm:fillClrLst>
+    <dgm:linClrLst meth="repeat">
+      <a:schemeClr val="lt1"/>
+    </dgm:linClrLst>
+    <dgm:effectClrLst/>
+    <dgm:txLinClrLst/>
+    <dgm:txFillClrLst/>
+    <dgm:txEffectClrLst/>
+  </dgm:styleLbl>
+  <dgm:styleLbl name="vennNode1">
+    <dgm:fillClrLst meth="repeat">
+      <a:schemeClr val="accent1">
+        <a:alpha val="50000"/>
+      </a:schemeClr>
+    </dgm:fillClrLst>
+    <dgm:linClrLst meth="repeat">
+      <a:schemeClr val="lt1"/>
+    </dgm:linClrLst>
+    <dgm:effectClrLst/>
+    <dgm:txLinClrLst/>
+    <dgm:txFillClrLst/>
+    <dgm:txEffectClrLst/>
+  </dgm:styleLbl>
+  <dgm:styleLbl name="node2">
+    <dgm:fillClrLst meth="repeat">
+      <a:schemeClr val="accent1"/>
+    </dgm:fillClrLst>
+    <dgm:linClrLst meth="repeat">
+      <a:schemeClr val="lt1"/>
+    </dgm:linClrLst>
+    <dgm:effectClrLst/>
+    <dgm:txLinClrLst/>
+    <dgm:txFillClrLst/>
+    <dgm:txEffectClrLst/>
+  </dgm:styleLbl>
+  <dgm:styleLbl name="node3">
+    <dgm:fillClrLst meth="repeat">
+      <a:schemeClr val="accent1"/>
+    </dgm:fillClrLst>
+    <dgm:linClrLst meth="repeat">
+      <a:schemeClr val="lt1"/>
+    </dgm:linClrLst>
+    <dgm:effectClrLst/>
+    <dgm:txLinClrLst/>
+    <dgm:txFillClrLst/>
+    <dgm:txEffectClrLst/>
+  </dgm:styleLbl>
+  <dgm:styleLbl name="node4">
+    <dgm:fillClrLst meth="repeat">
+      <a:schemeClr val="accent1"/>
+    </dgm:fillClrLst>
+    <dgm:linClrLst meth="repeat">
+      <a:schemeClr val="lt1"/>
+    </dgm:linClrLst>
+    <dgm:effectClrLst/>
+    <dgm:txLinClrLst/>
+    <dgm:txFillClrLst/>
+    <dgm:txEffectClrLst/>
+  </dgm:styleLbl>
+  <dgm:styleLbl name="fgImgPlace1">
+    <dgm:fillClrLst meth="repeat">
+      <a:schemeClr val="accent1">
+        <a:tint val="50000"/>
+      </a:schemeClr>
+    </dgm:fillClrLst>
+    <dgm:linClrLst meth="repeat">
+      <a:schemeClr val="lt1"/>
+    </dgm:linClrLst>
+    <dgm:effectClrLst/>
+    <dgm:txLinClrLst/>
+    <dgm:txFillClrLst meth="repeat">
+      <a:schemeClr val="lt1"/>
+    </dgm:txFillClrLst>
+    <dgm:txEffectClrLst/>
+  </dgm:styleLbl>
+  <dgm:styleLbl name="alignImgPlace1">
+    <dgm:fillClrLst meth="repeat">
+      <a:schemeClr val="accent1">
+        <a:tint val="50000"/>
+      </a:schemeClr>
+    </dgm:fillClrLst>
+    <dgm:linClrLst meth="repeat">
+      <a:schemeClr val="lt1"/>
+    </dgm:linClrLst>
+    <dgm:effectClrLst/>
+    <dgm:txLinClrLst/>
+    <dgm:txFillClrLst meth="repeat">
+      <a:schemeClr val="lt1"/>
+    </dgm:txFillClrLst>
+    <dgm:txEffectClrLst/>
+  </dgm:styleLbl>
+  <dgm:styleLbl name="bgImgPlace1">
+    <dgm:fillClrLst meth="repeat">
+      <a:schemeClr val="accent1">
+        <a:tint val="50000"/>
+      </a:schemeClr>
+    </dgm:fillClrLst>
+    <dgm:linClrLst meth="repeat">
+      <a:schemeClr val="lt1"/>
+    </dgm:linClrLst>
+    <dgm:effectClrLst/>
+    <dgm:txLinClrLst/>
+    <dgm:txFillClrLst meth="repeat">
+      <a:schemeClr val="lt1"/>
+    </dgm:txFillClrLst>
+    <dgm:txEffectClrLst/>
+  </dgm:styleLbl>
+  <dgm:styleLbl name="sibTrans2D1">
+    <dgm:fillClrLst meth="repeat">
+      <a:schemeClr val="accent1">
+        <a:tint val="60000"/>
+      </a:schemeClr>
+    </dgm:fillClrLst>
+    <dgm:linClrLst meth="repeat">
+      <a:schemeClr val="accent1">
+        <a:tint val="60000"/>
+      </a:schemeClr>
+    </dgm:linClrLst>
+    <dgm:effectClrLst/>
+    <dgm:txLinClrLst/>
+    <dgm:txFillClrLst/>
+    <dgm:txEffectClrLst/>
+  </dgm:styleLbl>
+  <dgm:styleLbl name="fgSibTrans2D1">
+    <dgm:fillClrLst meth="repeat">
+      <a:schemeClr val="accent1">
+        <a:tint val="60000"/>
+      </a:schemeClr>
+    </dgm:fillClrLst>
+    <dgm:linClrLst meth="repeat">
+      <a:schemeClr val="accent1">
+        <a:tint val="60000"/>
+      </a:schemeClr>
+    </dgm:linClrLst>
+    <dgm:effectClrLst/>
+    <dgm:txLinClrLst/>
+    <dgm:txFillClrLst/>
+    <dgm:txEffectClrLst/>
+  </dgm:styleLbl>
+  <dgm:styleLbl name="bgSibTrans2D1">
+    <dgm:fillClrLst meth="repeat">
+      <a:schemeClr val="accent1">
+        <a:tint val="60000"/>
+      </a:schemeClr>
+    </dgm:fillClrLst>
+    <dgm:linClrLst meth="repeat">
+      <a:schemeClr val="accent1">
+        <a:tint val="60000"/>
+      </a:schemeClr>
+    </dgm:linClrLst>
+    <dgm:effectClrLst/>
+    <dgm:txLinClrLst/>
+    <dgm:txFillClrLst/>
+    <dgm:txEffectClrLst/>
+  </dgm:styleLbl>
+  <dgm:styleLbl name="sibTrans1D1">
+    <dgm:fillClrLst meth="repeat">
+      <a:schemeClr val="accent1"/>
+    </dgm:fillClrLst>
+    <dgm:linClrLst meth="repeat">
+      <a:schemeClr val="accent1"/>
+    </dgm:linClrLst>
+    <dgm:effectClrLst/>
+    <dgm:txLinClrLst/>
+    <dgm:txFillClrLst meth="repeat">
+      <a:schemeClr val="tx1"/>
+    </dgm:txFillClrLst>
+    <dgm:txEffectClrLst/>
+  </dgm:styleLbl>
+  <dgm:styleLbl name="callout">
+    <dgm:fillClrLst meth="repeat">
+      <a:schemeClr val="accent1"/>
+    </dgm:fillClrLst>
+    <dgm:linClrLst meth="repeat">
+      <a:schemeClr val="accent1">
+        <a:tint val="50000"/>
+      </a:schemeClr>
+    </dgm:linClrLst>
+    <dgm:effectClrLst/>
+    <dgm:txLinClrLst/>
+    <dgm:txFillClrLst meth="repeat">
+      <a:schemeClr val="tx1"/>
+    </dgm:txFillClrLst>
+    <dgm:txEffectClrLst/>
+  </dgm:styleLbl>
+  <dgm:styleLbl name="asst0">
+    <dgm:fillClrLst meth="repeat">
+      <a:schemeClr val="accent1"/>
+    </dgm:fillClrLst>
+    <dgm:linClrLst meth="repeat">
+      <a:schemeClr val="lt1"/>
+    </dgm:linClrLst>
+    <dgm:effectClrLst/>
+    <dgm:txLinClrLst/>
+    <dgm:txFillClrLst/>
+    <dgm:txEffectClrLst/>
+  </dgm:styleLbl>
+  <dgm:styleLbl name="asst1">
+    <dgm:fillClrLst meth="repeat">
+      <a:schemeClr val="accent1"/>
+    </dgm:fillClrLst>
+    <dgm:linClrLst meth="repeat">
+      <a:schemeClr val="lt1"/>
+    </dgm:linClrLst>
+    <dgm:effectClrLst/>
+    <dgm:txLinClrLst/>
+    <dgm:txFillClrLst/>
+    <dgm:txEffectClrLst/>
+  </dgm:styleLbl>
+  <dgm:styleLbl name="asst2">
+    <dgm:fillClrLst meth="repeat">
+      <a:schemeClr val="accent1"/>
+    </dgm:fillClrLst>
+    <dgm:linClrLst meth="repeat">
+      <a:schemeClr val="lt1"/>
+    </dgm:linClrLst>
+    <dgm:effectClrLst/>
+    <dgm:txLinClrLst/>
+    <dgm:txFillClrLst/>
+    <dgm:txEffectClrLst/>
+  </dgm:styleLbl>
+  <dgm:styleLbl name="asst3">
+    <dgm:fillClrLst meth="repeat">
+      <a:schemeClr val="accent1"/>
+    </dgm:fillClrLst>
+    <dgm:linClrLst meth="repeat">
+      <a:schemeClr val="lt1"/>
+    </dgm:linClrLst>
+    <dgm:effectClrLst/>
+    <dgm:txLinClrLst/>
+    <dgm:txFillClrLst/>
+    <dgm:txEffectClrLst/>
+  </dgm:styleLbl>
+  <dgm:styleLbl name="asst4">
+    <dgm:fillClrLst meth="repeat">
+      <a:schemeClr val="accent1"/>
+    </dgm:fillClrLst>
+    <dgm:linClrLst meth="repeat">
+      <a:schemeClr val="lt1"/>
+    </dgm:linClrLst>
+    <dgm:effectClrLst/>
+    <dgm:txLinClrLst/>
+    <dgm:txFillClrLst/>
+    <dgm:txEffectClrLst/>
+  </dgm:styleLbl>
+  <dgm:styleLbl name="parChTrans2D1">
+    <dgm:fillClrLst meth="repeat">
+      <a:schemeClr val="accent1">
+        <a:tint val="60000"/>
+      </a:schemeClr>
+    </dgm:fillClrLst>
+    <dgm:linClrLst meth="repeat">
+      <a:schemeClr val="accent1">
+        <a:tint val="60000"/>
+      </a:schemeClr>
+    </dgm:linClrLst>
+    <dgm:effectClrLst/>
+    <dgm:txLinClrLst/>
+    <dgm:txFillClrLst meth="repeat">
+      <a:schemeClr val="lt1"/>
+    </dgm:txFillClrLst>
+    <dgm:txEffectClrLst/>
+  </dgm:styleLbl>
+  <dgm:styleLbl name="parChTrans2D2">
+    <dgm:fillClrLst meth="repeat">
+      <a:schemeClr val="accent1"/>
+    </dgm:fillClrLst>
+    <dgm:linClrLst meth="repeat">
+      <a:schemeClr val="accent1"/>
+    </dgm:linClrLst>
+    <dgm:effectClrLst/>
+    <dgm:txLinClrLst/>
+    <dgm:txFillClrLst meth="repeat">
+      <a:schemeClr val="lt1"/>
+    </dgm:txFillClrLst>
+    <dgm:txEffectClrLst/>
+  </dgm:styleLbl>
+  <dgm:styleLbl name="parChTrans2D3">
+    <dgm:fillClrLst meth="repeat">
+      <a:schemeClr val="accent1"/>
+    </dgm:fillClrLst>
+    <dgm:linClrLst meth="repeat">
+      <a:schemeClr val="accent1"/>
+    </dgm:linClrLst>
+    <dgm:effectClrLst/>
+    <dgm:txLinClrLst/>
+    <dgm:txFillClrLst meth="repeat">
+      <a:schemeClr val="lt1"/>
+    </dgm:txFillClrLst>
+    <dgm:txEffectClrLst/>
+  </dgm:styleLbl>
+  <dgm:styleLbl name="parChTrans2D4">
+    <dgm:fillClrLst meth="repeat">
+      <a:schemeClr val="accent1"/>
+    </dgm:fillClrLst>
+    <dgm:linClrLst meth="repeat">
+      <a:schemeClr val="accent1"/>
+    </dgm:linClrLst>
+    <dgm:effectClrLst/>
+    <dgm:txLinClrLst/>
+    <dgm:txFillClrLst meth="repeat">
+      <a:schemeClr val="lt1"/>
+    </dgm:txFillClrLst>
+    <dgm:txEffectClrLst/>
+  </dgm:styleLbl>
+  <dgm:styleLbl name="parChTrans1D1">
+    <dgm:fillClrLst meth="repeat">
+      <a:schemeClr val="accent1"/>
+    </dgm:fillClrLst>
+    <dgm:linClrLst meth="repeat">
+      <a:schemeClr val="accent1">
+        <a:shade val="60000"/>
+      </a:schemeClr>
+    </dgm:linClrLst>
+    <dgm:effectClrLst/>
+    <dgm:txLinClrLst/>
+    <dgm:txFillClrLst meth="repeat">
+      <a:schemeClr val="tx1"/>
+    </dgm:txFillClrLst>
+    <dgm:txEffectClrLst/>
+  </dgm:styleLbl>
+  <dgm:styleLbl name="parChTrans1D2">
+    <dgm:fillClrLst meth="repeat">
+      <a:schemeClr val="accent1"/>
+    </dgm:fillClrLst>
+    <dgm:linClrLst meth="repeat">
+      <a:schemeClr val="accent1">
+        <a:shade val="60000"/>
+      </a:schemeClr>
+    </dgm:linClrLst>
+    <dgm:effectClrLst/>
+    <dgm:txLinClrLst/>
+    <dgm:txFillClrLst meth="repeat">
+      <a:schemeClr val="tx1"/>
+    </dgm:txFillClrLst>
+    <dgm:txEffectClrLst/>
+  </dgm:styleLbl>
+  <dgm:styleLbl name="parChTrans1D3">
+    <dgm:fillClrLst meth="repeat">
+      <a:schemeClr val="accent1"/>
+    </dgm:fillClrLst>
+    <dgm:linClrLst meth="repeat">
+      <a:schemeClr val="accent1">
+        <a:shade val="80000"/>
+      </a:schemeClr>
+    </dgm:linClrLst>
+    <dgm:effectClrLst/>
+    <dgm:txLinClrLst/>
+    <dgm:txFillClrLst meth="repeat">
+      <a:schemeClr val="tx1"/>
+    </dgm:txFillClrLst>
+    <dgm:txEffectClrLst/>
+  </dgm:styleLbl>
+  <dgm:styleLbl name="parChTrans1D4">
+    <dgm:fillClrLst meth="repeat">
+      <a:schemeClr val="accent1"/>
+    </dgm:fillClrLst>
+    <dgm:linClrLst meth="repeat">
+      <a:schemeClr val="accent1">
+        <a:shade val="80000"/>
+      </a:schemeClr>
+    </dgm:linClrLst>
+    <dgm:effectClrLst/>
+    <dgm:txLinClrLst/>
+    <dgm:txFillClrLst meth="repeat">
+      <a:schemeClr val="tx1"/>
+    </dgm:txFillClrLst>
+    <dgm:txEffectClrLst/>
+  </dgm:styleLbl>
+  <dgm:styleLbl name="fgAcc1">
+    <dgm:fillClrLst meth="repeat">
+      <a:schemeClr val="lt1">
+        <a:alpha val="90000"/>
+      </a:schemeClr>
+    </dgm:fillClrLst>
+    <dgm:linClrLst meth="repeat">
+      <a:schemeClr val="accent1"/>
+    </dgm:linClrLst>
+    <dgm:effectClrLst/>
+    <dgm:txLinClrLst/>
+    <dgm:txFillClrLst meth="repeat">
+      <a:schemeClr val="dk1"/>
+    </dgm:txFillClrLst>
+    <dgm:txEffectClrLst/>
+  </dgm:styleLbl>
+  <dgm:styleLbl name="conFgAcc1">
+    <dgm:fillClrLst meth="repeat">
+      <a:schemeClr val="lt1">
+        <a:alpha val="90000"/>
+      </a:schemeClr>
+    </dgm:fillClrLst>
+    <dgm:linClrLst meth="repeat">
+      <a:schemeClr val="accent1"/>
+    </dgm:linClrLst>
+    <dgm:effectClrLst/>
+    <dgm:txLinClrLst/>
+    <dgm:txFillClrLst meth="repeat">
+      <a:schemeClr val="dk1"/>
+    </dgm:txFillClrLst>
+    <dgm:txEffectClrLst/>
+  </dgm:styleLbl>
+  <dgm:styleLbl name="alignAcc1">
+    <dgm:fillClrLst meth="repeat">
+      <a:schemeClr val="lt1">
+        <a:alpha val="90000"/>
+      </a:schemeClr>
+    </dgm:fillClrLst>
+    <dgm:linClrLst meth="repeat">
+      <a:schemeClr val="accent1"/>
+    </dgm:linClrLst>
+    <dgm:effectClrLst/>
+    <dgm:txLinClrLst/>
+    <dgm:txFillClrLst meth="repeat">
+      <a:schemeClr val="dk1"/>
+    </dgm:txFillClrLst>
+    <dgm:txEffectClrLst/>
+  </dgm:styleLbl>
+  <dgm:styleLbl name="trAlignAcc1">
+    <dgm:fillClrLst meth="repeat">
+      <a:schemeClr val="lt1">
+        <a:alpha val="40000"/>
+      </a:schemeClr>
+    </dgm:fillClrLst>
+    <dgm:linClrLst meth="repeat">
+      <a:schemeClr val="accent1"/>
+    </dgm:linClrLst>
+    <dgm:effectClrLst/>
+    <dgm:txLinClrLst/>
+    <dgm:txFillClrLst meth="repeat">
+      <a:schemeClr val="dk1"/>
+    </dgm:txFillClrLst>
+    <dgm:txEffectClrLst/>
+  </dgm:styleLbl>
+  <dgm:styleLbl name="bgAcc1">
+    <dgm:fillClrLst meth="repeat">
+      <a:schemeClr val="lt1">
+        <a:alpha val="90000"/>
+      </a:schemeClr>
+    </dgm:fillClrLst>
+    <dgm:linClrLst meth="repeat">
+      <a:schemeClr val="accent1"/>
+    </dgm:linClrLst>
+    <dgm:effectClrLst/>
+    <dgm:txLinClrLst/>
+    <dgm:txFillClrLst meth="repeat">
+      <a:schemeClr val="dk1"/>
+    </dgm:txFillClrLst>
+    <dgm:txEffectClrLst/>
+  </dgm:styleLbl>
+  <dgm:styleLbl name="solidFgAcc1">
+    <dgm:fillClrLst meth="repeat">
+      <a:schemeClr val="lt1"/>
+    </dgm:fillClrLst>
+    <dgm:linClrLst meth="repeat">
+      <a:schemeClr val="accent1"/>
+    </dgm:linClrLst>
+    <dgm:effectClrLst/>
+    <dgm:txLinClrLst/>
+    <dgm:txFillClrLst meth="repeat">
+      <a:schemeClr val="dk1"/>
+    </dgm:txFillClrLst>
+    <dgm:txEffectClrLst/>
+  </dgm:styleLbl>
+  <dgm:styleLbl name="solidAlignAcc1">
+    <dgm:fillClrLst meth="repeat">
+      <a:schemeClr val="lt1"/>
+    </dgm:fillClrLst>
+    <dgm:linClrLst meth="repeat">
+      <a:schemeClr val="accent1"/>
+    </dgm:linClrLst>
+    <dgm:effectClrLst/>
+    <dgm:txLinClrLst/>
+    <dgm:txFillClrLst meth="repeat">
+      <a:schemeClr val="dk1"/>
+    </dgm:txFillClrLst>
+    <dgm:txEffectClrLst/>
+  </dgm:styleLbl>
+  <dgm:styleLbl name="solidBgAcc1">
+    <dgm:fillClrLst meth="repeat">
+      <a:schemeClr val="lt1"/>
+    </dgm:fillClrLst>
+    <dgm:linClrLst meth="repeat">
+      <a:schemeClr val="accent1"/>
+    </dgm:linClrLst>
+    <dgm:effectClrLst/>
+    <dgm:txLinClrLst/>
+    <dgm:txFillClrLst meth="repeat">
+      <a:schemeClr val="dk1"/>
+    </dgm:txFillClrLst>
+    <dgm:txEffectClrLst/>
+  </dgm:styleLbl>
+  <dgm:styleLbl name="fgAccFollowNode1">
+    <dgm:fillClrLst meth="repeat">
+      <a:schemeClr val="accent1">
+        <a:alpha val="90000"/>
+        <a:tint val="40000"/>
+      </a:schemeClr>
+    </dgm:fillClrLst>
+    <dgm:linClrLst meth="repeat">
+      <a:schemeClr val="accent1">
+        <a:alpha val="90000"/>
+        <a:tint val="40000"/>
+      </a:schemeClr>
+    </dgm:linClrLst>
+    <dgm:effectClrLst/>
+    <dgm:txLinClrLst/>
+    <dgm:txFillClrLst meth="repeat">
+      <a:schemeClr val="dk1"/>
+    </dgm:txFillClrLst>
+    <dgm:txEffectClrLst/>
+  </dgm:styleLbl>
+  <dgm:styleLbl name="alignAccFollowNode1">
+    <dgm:fillClrLst meth="repeat">
+      <a:schemeClr val="accent1">
+        <a:alpha val="90000"/>
+        <a:tint val="40000"/>
+      </a:schemeClr>
+    </dgm:fillClrLst>
+    <dgm:linClrLst meth="repeat">
+      <a:schemeClr val="accent1">
+        <a:alpha val="90000"/>
+        <a:tint val="40000"/>
+      </a:schemeClr>
+    </dgm:linClrLst>
+    <dgm:effectClrLst/>
+    <dgm:txLinClrLst/>
+    <dgm:txFillClrLst meth="repeat">
+      <a:schemeClr val="dk1"/>
+    </dgm:txFillClrLst>
+    <dgm:txEffectClrLst/>
+  </dgm:styleLbl>
+  <dgm:styleLbl name="bgAccFollowNode1">
+    <dgm:fillClrLst meth="repeat">
+      <a:schemeClr val="accent1">
+        <a:alpha val="90000"/>
+        <a:tint val="40000"/>
+      </a:schemeClr>
+    </dgm:fillClrLst>
+    <dgm:linClrLst meth="repeat">
+      <a:schemeClr val="accent1">
+        <a:alpha val="90000"/>
+        <a:tint val="40000"/>
+      </a:schemeClr>
+    </dgm:linClrLst>
+    <dgm:effectClrLst/>
+    <dgm:txLinClrLst/>
+    <dgm:txFillClrLst meth="repeat">
+      <a:schemeClr val="dk1"/>
+    </dgm:txFillClrLst>
+    <dgm:txEffectClrLst/>
+  </dgm:styleLbl>
+  <dgm:styleLbl name="fgAcc0">
+    <dgm:fillClrLst meth="repeat">
+      <a:schemeClr val="lt1">
+        <a:alpha val="90000"/>
+      </a:schemeClr>
+    </dgm:fillClrLst>
+    <dgm:linClrLst meth="repeat">
+      <a:schemeClr val="accent1"/>
+    </dgm:linClrLst>
+    <dgm:effectClrLst/>
+    <dgm:txLinClrLst/>
+    <dgm:txFillClrLst meth="repeat">
+      <a:schemeClr val="dk1"/>
+    </dgm:txFillClrLst>
+    <dgm:txEffectClrLst/>
+  </dgm:styleLbl>
+  <dgm:styleLbl name="fgAcc2">
+    <dgm:fillClrLst meth="repeat">
+      <a:schemeClr val="lt1">
+        <a:alpha val="90000"/>
+      </a:schemeClr>
+    </dgm:fillClrLst>
+    <dgm:linClrLst meth="repeat">
+      <a:schemeClr val="accent1"/>
+    </dgm:linClrLst>
+    <dgm:effectClrLst/>
+    <dgm:txLinClrLst/>
+    <dgm:txFillClrLst meth="repeat">
+      <a:schemeClr val="dk1"/>
+    </dgm:txFillClrLst>
+    <dgm:txEffectClrLst/>
+  </dgm:styleLbl>
+  <dgm:styleLbl name="fgAcc3">
+    <dgm:fillClrLst meth="repeat">
+      <a:schemeClr val="lt1">
+        <a:alpha val="90000"/>
+      </a:schemeClr>
+    </dgm:fillClrLst>
+    <dgm:linClrLst meth="repeat">
+      <a:schemeClr val="accent1"/>
+    </dgm:linClrLst>
+    <dgm:effectClrLst/>
+    <dgm:txLinClrLst/>
+    <dgm:txFillClrLst meth="repeat">
+      <a:schemeClr val="dk1"/>
+    </dgm:txFillClrLst>
+    <dgm:txEffectClrLst/>
+  </dgm:styleLbl>
+  <dgm:styleLbl name="fgAcc4">
+    <dgm:fillClrLst meth="repeat">
+      <a:schemeClr val="lt1">
+        <a:alpha val="90000"/>
+      </a:schemeClr>
+    </dgm:fillClrLst>
+    <dgm:linClrLst meth="repeat">
+      <a:schemeClr val="accent1"/>
+    </dgm:linClrLst>
+    <dgm:effectClrLst/>
+    <dgm:txLinClrLst/>
+    <dgm:txFillClrLst meth="repeat">
+      <a:schemeClr val="dk1"/>
+    </dgm:txFillClrLst>
+    <dgm:txEffectClrLst/>
+  </dgm:styleLbl>
+  <dgm:styleLbl name="bgShp">
+    <dgm:fillClrLst meth="repeat">
+      <a:schemeClr val="accent1">
+        <a:tint val="40000"/>
+      </a:schemeClr>
+    </dgm:fillClrLst>
+    <dgm:linClrLst meth="repeat">
+      <a:schemeClr val="accent1"/>
+    </dgm:linClrLst>
+    <dgm:effectClrLst/>
+    <dgm:txLinClrLst/>
+    <dgm:txFillClrLst meth="repeat">
+      <a:schemeClr val="dk1"/>
+    </dgm:txFillClrLst>
+    <dgm:txEffectClrLst/>
+  </dgm:styleLbl>
+  <dgm:styleLbl name="dkBgShp">
+    <dgm:fillClrLst meth="repeat">
+      <a:schemeClr val="accent1">
+        <a:shade val="80000"/>
+      </a:schemeClr>
+    </dgm:fillClrLst>
+    <dgm:linClrLst meth="repeat">
+      <a:schemeClr val="accent1"/>
+    </dgm:linClrLst>
+    <dgm:effectClrLst/>
+    <dgm:txLinClrLst/>
+    <dgm:txFillClrLst meth="repeat">
+      <a:schemeClr val="lt1"/>
+    </dgm:txFillClrLst>
+    <dgm:txEffectClrLst/>
+  </dgm:styleLbl>
+  <dgm:styleLbl name="trBgShp">
+    <dgm:fillClrLst meth="repeat">
+      <a:schemeClr val="accent1">
+        <a:tint val="50000"/>
+        <a:alpha val="40000"/>
+      </a:schemeClr>
+    </dgm:fillClrLst>
+    <dgm:linClrLst meth="repeat">
+      <a:schemeClr val="accent1"/>
+    </dgm:linClrLst>
+    <dgm:effectClrLst/>
+    <dgm:txLinClrLst/>
+    <dgm:txFillClrLst meth="repeat">
+      <a:schemeClr val="lt1"/>
+    </dgm:txFillClrLst>
+    <dgm:txEffectClrLst/>
+  </dgm:styleLbl>
+  <dgm:styleLbl name="fgShp">
+    <dgm:fillClrLst meth="repeat">
+      <a:schemeClr val="accent1">
+        <a:tint val="60000"/>
+      </a:schemeClr>
+    </dgm:fillClrLst>
+    <dgm:linClrLst meth="repeat">
+      <a:schemeClr val="lt1"/>
+    </dgm:linClrLst>
+    <dgm:effectClrLst/>
+    <dgm:txLinClrLst/>
+    <dgm:txFillClrLst meth="repeat">
+      <a:schemeClr val="dk1"/>
+    </dgm:txFillClrLst>
+    <dgm:txEffectClrLst/>
+  </dgm:styleLbl>
+  <dgm:styleLbl name="revTx">
+    <dgm:fillClrLst meth="repeat">
+      <a:schemeClr val="lt1">
+        <a:alpha val="0"/>
+      </a:schemeClr>
+    </dgm:fillClrLst>
+    <dgm:linClrLst meth="repeat">
+      <a:schemeClr val="dk1">
+        <a:alpha val="0"/>
+      </a:schemeClr>
+    </dgm:linClrLst>
+    <dgm:effectClrLst/>
+    <dgm:txLinClrLst/>
+    <dgm:txFillClrLst meth="repeat">
+      <a:schemeClr val="tx1"/>
+    </dgm:txFillClrLst>
+    <dgm:txEffectClrLst/>
+  </dgm:styleLbl>
+</dgm:colorsDef>
+</file>
+
+<file path=ppt/diagrams/colors5.xml><?xml version="1.0" encoding="utf-8"?>
 <dgm:colorsDef xmlns:dgm="http://schemas.openxmlformats.org/drawingml/2006/diagram" xmlns:a="http://schemas.openxmlformats.org/drawingml/2006/main" uniqueId="urn:microsoft.com/office/officeart/2005/8/colors/accent1_2">
   <dgm:title val=""/>
   <dgm:desc val=""/>
@@ -3532,10 +4283,10 @@
     <dgm:cxn modelId="{AE49F806-54FE-4496-84AB-BEE977FD9C4D}" type="presOf" srcId="{539FF677-4652-4C9C-85C6-BE45298849DA}" destId="{DB3006ED-35AC-4A39-BDEB-A0881FDF8D87}" srcOrd="0" destOrd="0" presId="urn:microsoft.com/office/officeart/2005/8/layout/radial6"/>
     <dgm:cxn modelId="{04190B09-AB27-403F-861D-1576F6FD2F13}" type="presOf" srcId="{0C26AA64-874D-45B6-B598-A200D29CC792}" destId="{D02974D2-277D-4223-861D-60F4EE29FC41}" srcOrd="0" destOrd="0" presId="urn:microsoft.com/office/officeart/2005/8/layout/radial6"/>
     <dgm:cxn modelId="{B3929CE4-633A-4EE2-B075-A3C124015D41}" type="presOf" srcId="{F6982B39-5484-4A53-846D-A84C7A19FD13}" destId="{FA01F4A9-4DBF-4C57-A0CE-07D509A185E7}" srcOrd="0" destOrd="0" presId="urn:microsoft.com/office/officeart/2005/8/layout/radial6"/>
-    <dgm:cxn modelId="{92E9A541-9849-4C3F-86CB-2599D64B6F16}" type="presOf" srcId="{C8A1F54A-7E3A-41A1-959F-6B5FD5F8636D}" destId="{EF84FA0B-7C07-42F2-8BEB-1B4C71321AC6}" srcOrd="0" destOrd="0" presId="urn:microsoft.com/office/officeart/2005/8/layout/radial6"/>
     <dgm:cxn modelId="{E3E687C0-D67F-47A6-8780-7A3225AAEBAB}" type="presOf" srcId="{4092E42B-3105-4807-9EEC-B7274586BB46}" destId="{720CD217-6B6F-4C66-9827-3F530B72EB5D}" srcOrd="0" destOrd="0" presId="urn:microsoft.com/office/officeart/2005/8/layout/radial6"/>
     <dgm:cxn modelId="{CC8BFFB6-06FE-4B12-B3FE-D4EF0C5503AD}" srcId="{F782DAC8-F23E-4080-9EF9-36615D3A2FDF}" destId="{753C41A9-34B2-4759-8459-44FCB814A873}" srcOrd="0" destOrd="0" parTransId="{F14466D8-F0E0-407E-9FFE-6F5A2598B2CF}" sibTransId="{37267226-84DA-4213-9E7C-98387433E4DE}"/>
     <dgm:cxn modelId="{D0AF5723-9AF1-4370-BF36-67DDD6F2B256}" type="presOf" srcId="{753C41A9-34B2-4759-8459-44FCB814A873}" destId="{750555E1-A28D-424D-A120-1314C822B5F8}" srcOrd="0" destOrd="0" presId="urn:microsoft.com/office/officeart/2005/8/layout/radial6"/>
+    <dgm:cxn modelId="{92E9A541-9849-4C3F-86CB-2599D64B6F16}" type="presOf" srcId="{C8A1F54A-7E3A-41A1-959F-6B5FD5F8636D}" destId="{EF84FA0B-7C07-42F2-8BEB-1B4C71321AC6}" srcOrd="0" destOrd="0" presId="urn:microsoft.com/office/officeart/2005/8/layout/radial6"/>
     <dgm:cxn modelId="{2D4EB3CF-F686-4D06-B619-F0D3A385A4CA}" type="presOf" srcId="{7271335F-4252-412C-A6F6-823EE27C067C}" destId="{E656DB39-A96D-401F-8B91-C56532357FFA}" srcOrd="0" destOrd="0" presId="urn:microsoft.com/office/officeart/2005/8/layout/radial6"/>
     <dgm:cxn modelId="{8B70EA4F-FF65-4A3A-B4F6-AA28B681200B}" srcId="{753C41A9-34B2-4759-8459-44FCB814A873}" destId="{48E85755-4A7D-4901-9FAC-071F1358DF2F}" srcOrd="3" destOrd="0" parTransId="{22E45507-E917-4ECC-B2C8-FCB30CB1883D}" sibTransId="{0C26AA64-874D-45B6-B598-A200D29CC792}"/>
     <dgm:cxn modelId="{F849B287-BECA-47DE-B6FD-0AA124AA507C}" type="presOf" srcId="{F782DAC8-F23E-4080-9EF9-36615D3A2FDF}" destId="{91017005-1548-4F51-B091-230E65C4F934}" srcOrd="0" destOrd="0" presId="urn:microsoft.com/office/officeart/2005/8/layout/radial6"/>
@@ -5095,9 +5846,9 @@
     <dgm:cxn modelId="{10002A1B-34C0-4CA4-97A0-B2C7C0C98C18}" srcId="{BAF05006-AA9D-4A75-92DE-B5CF4F7BD5DC}" destId="{A010A8B5-C36B-4748-8A41-B1CC5F84B855}" srcOrd="1" destOrd="0" parTransId="{9EE43D60-BA7D-4C81-BF9A-F9400BA5BC4A}" sibTransId="{6B8477F5-29B8-4E3D-B56C-AB2C5DCA94AD}"/>
     <dgm:cxn modelId="{39CC2355-20BF-447E-8601-BC3B1FFFEF28}" type="presOf" srcId="{9E3B7C5D-6889-4F68-AFD5-F2B8ECD697F8}" destId="{13497FBF-CB88-4658-8BA9-6438EDAE6C1C}" srcOrd="0" destOrd="0" presId="urn:microsoft.com/office/officeart/2005/8/layout/process3"/>
     <dgm:cxn modelId="{AB442554-699B-42D5-80BB-62E3E75E3738}" type="presOf" srcId="{BAF05006-AA9D-4A75-92DE-B5CF4F7BD5DC}" destId="{8F38C317-151E-4CA4-B988-7875398E86DF}" srcOrd="0" destOrd="0" presId="urn:microsoft.com/office/officeart/2005/8/layout/process3"/>
+    <dgm:cxn modelId="{60D0CA9D-6381-421D-B20C-A4A3E54DEAD1}" srcId="{87D3117F-EEDF-47C5-910B-9354F9B1446F}" destId="{11800C95-3752-4AAD-A633-BFF26B208769}" srcOrd="1" destOrd="0" parTransId="{ECE6DB5C-F7CC-4D01-9D75-20BE6990D99A}" sibTransId="{60FC52E2-B33B-437B-8460-BBE63C216FE8}"/>
+    <dgm:cxn modelId="{D6F74EB5-4063-4D53-9B84-E3F22AAD99C8}" type="presOf" srcId="{BA3DCE2B-217C-4AD0-8483-167B691605B8}" destId="{13497FBF-CB88-4658-8BA9-6438EDAE6C1C}" srcOrd="0" destOrd="1" presId="urn:microsoft.com/office/officeart/2005/8/layout/process3"/>
     <dgm:cxn modelId="{04438A1D-C955-4DFA-94FE-F6657DCFE5C5}" type="presOf" srcId="{07F7C31D-CBAC-493A-9116-CE8774E937BF}" destId="{C7EF69E3-9CFB-4FDF-922A-40663CC7AF4B}" srcOrd="0" destOrd="0" presId="urn:microsoft.com/office/officeart/2005/8/layout/process3"/>
-    <dgm:cxn modelId="{D6F74EB5-4063-4D53-9B84-E3F22AAD99C8}" type="presOf" srcId="{BA3DCE2B-217C-4AD0-8483-167B691605B8}" destId="{13497FBF-CB88-4658-8BA9-6438EDAE6C1C}" srcOrd="0" destOrd="1" presId="urn:microsoft.com/office/officeart/2005/8/layout/process3"/>
-    <dgm:cxn modelId="{60D0CA9D-6381-421D-B20C-A4A3E54DEAD1}" srcId="{87D3117F-EEDF-47C5-910B-9354F9B1446F}" destId="{11800C95-3752-4AAD-A633-BFF26B208769}" srcOrd="1" destOrd="0" parTransId="{ECE6DB5C-F7CC-4D01-9D75-20BE6990D99A}" sibTransId="{60FC52E2-B33B-437B-8460-BBE63C216FE8}"/>
     <dgm:cxn modelId="{666E2B18-70A4-4CB2-BFB3-388185F78F8C}" type="presOf" srcId="{60FC52E2-B33B-437B-8460-BBE63C216FE8}" destId="{F95EBC23-FE1A-4DC1-8D9F-76683A86CDD5}" srcOrd="1" destOrd="0" presId="urn:microsoft.com/office/officeart/2005/8/layout/process3"/>
     <dgm:cxn modelId="{71649137-8410-4ABB-A19E-956DE351FF44}" type="presOf" srcId="{A010A8B5-C36B-4748-8A41-B1CC5F84B855}" destId="{B83159D5-5BCF-4CE8-A211-4AB76192FDFC}" srcOrd="0" destOrd="1" presId="urn:microsoft.com/office/officeart/2005/8/layout/process3"/>
     <dgm:cxn modelId="{5030A0CB-9E9C-4BFC-9DD0-EA9496D8087B}" srcId="{BAF05006-AA9D-4A75-92DE-B5CF4F7BD5DC}" destId="{F497F4CB-A53E-49D6-A14B-30E86FEB771F}" srcOrd="0" destOrd="0" parTransId="{40C0A60B-D729-4067-BB9D-BA68C906294D}" sibTransId="{3B33CFEB-7972-45A6-B919-EC75EC27F3F7}"/>
@@ -5122,6 +5873,332 @@
     <dgm:cxn modelId="{8F3DC28E-0280-42E2-8626-F8E012E85EDC}" type="presParOf" srcId="{9136B4E4-5EE2-4A92-BDB6-A99F7F6D89E2}" destId="{8F38C317-151E-4CA4-B988-7875398E86DF}" srcOrd="0" destOrd="0" presId="urn:microsoft.com/office/officeart/2005/8/layout/process3"/>
     <dgm:cxn modelId="{EBCCDD64-F981-498E-95B5-2909B004FA96}" type="presParOf" srcId="{9136B4E4-5EE2-4A92-BDB6-A99F7F6D89E2}" destId="{95A27EA2-7AE2-43CB-ACE1-633A12E9500D}" srcOrd="1" destOrd="0" presId="urn:microsoft.com/office/officeart/2005/8/layout/process3"/>
     <dgm:cxn modelId="{FE815D5D-4798-4673-85D1-E2B1BE665DAC}" type="presParOf" srcId="{9136B4E4-5EE2-4A92-BDB6-A99F7F6D89E2}" destId="{B83159D5-5BCF-4CE8-A211-4AB76192FDFC}" srcOrd="2" destOrd="0" presId="urn:microsoft.com/office/officeart/2005/8/layout/process3"/>
+  </dgm:cxnLst>
+  <dgm:bg/>
+  <dgm:whole/>
+  <dgm:extLst>
+    <a:ext uri="http://schemas.microsoft.com/office/drawing/2008/diagram">
+      <dsp:dataModelExt xmlns:dsp="http://schemas.microsoft.com/office/drawing/2008/diagram" relId="rId6" minVer="http://schemas.openxmlformats.org/drawingml/2006/diagram"/>
+    </a:ext>
+  </dgm:extLst>
+</dgm:dataModel>
+</file>
+
+<file path=ppt/diagrams/data5.xml><?xml version="1.0" encoding="utf-8"?>
+<dgm:dataModel xmlns:dgm="http://schemas.openxmlformats.org/drawingml/2006/diagram" xmlns:a="http://schemas.openxmlformats.org/drawingml/2006/main">
+  <dgm:ptLst>
+    <dgm:pt modelId="{CA80CCA9-6AD5-4558-86BE-160A2E443C16}" type="doc">
+      <dgm:prSet loTypeId="urn:microsoft.com/office/officeart/2005/8/layout/radial6" loCatId="cycle" qsTypeId="urn:microsoft.com/office/officeart/2005/8/quickstyle/simple1" qsCatId="simple" csTypeId="urn:microsoft.com/office/officeart/2005/8/colors/accent1_2" csCatId="accent1" phldr="1"/>
+      <dgm:spPr/>
+      <dgm:t>
+        <a:bodyPr/>
+        <a:lstStyle/>
+        <a:p>
+          <a:endParaRPr lang="es-ES"/>
+        </a:p>
+      </dgm:t>
+    </dgm:pt>
+    <dgm:pt modelId="{E6BCD645-185A-4E16-9B71-58625E04BF19}">
+      <dgm:prSet phldrT="[Texto]"/>
+      <dgm:spPr/>
+      <dgm:t>
+        <a:bodyPr/>
+        <a:lstStyle/>
+        <a:p>
+          <a:r>
+            <a:rPr lang="es-ES" dirty="0" smtClean="0"/>
+            <a:t>HOJA DE RUTA 4 LECCIONES</a:t>
+          </a:r>
+          <a:endParaRPr lang="es-ES" dirty="0"/>
+        </a:p>
+      </dgm:t>
+    </dgm:pt>
+    <dgm:pt modelId="{74202490-D806-4A9A-BA0D-434843C02B78}" type="parTrans" cxnId="{4496735A-45C8-445D-836D-E58F12F3A04C}">
+      <dgm:prSet/>
+      <dgm:spPr/>
+      <dgm:t>
+        <a:bodyPr/>
+        <a:lstStyle/>
+        <a:p>
+          <a:endParaRPr lang="es-ES"/>
+        </a:p>
+      </dgm:t>
+    </dgm:pt>
+    <dgm:pt modelId="{215A2F51-316E-4F25-876B-3607AC1E8046}" type="sibTrans" cxnId="{4496735A-45C8-445D-836D-E58F12F3A04C}">
+      <dgm:prSet/>
+      <dgm:spPr/>
+      <dgm:t>
+        <a:bodyPr/>
+        <a:lstStyle/>
+        <a:p>
+          <a:endParaRPr lang="es-ES"/>
+        </a:p>
+      </dgm:t>
+    </dgm:pt>
+    <dgm:pt modelId="{E5F12C86-FDC0-4DBC-A4D3-FFEE10F48808}">
+      <dgm:prSet phldrT="[Texto]"/>
+      <dgm:spPr/>
+      <dgm:t>
+        <a:bodyPr/>
+        <a:lstStyle/>
+        <a:p>
+          <a:r>
+            <a:rPr lang="es-ES" dirty="0" smtClean="0"/>
+            <a:t>VECTORES</a:t>
+          </a:r>
+          <a:endParaRPr lang="es-ES" dirty="0"/>
+        </a:p>
+      </dgm:t>
+    </dgm:pt>
+    <dgm:pt modelId="{DCFD167D-C2FD-4D29-A01C-74201D74EBE6}" type="parTrans" cxnId="{87B49F98-AC55-4C3D-8ECF-D8F6B3339E8A}">
+      <dgm:prSet/>
+      <dgm:spPr/>
+      <dgm:t>
+        <a:bodyPr/>
+        <a:lstStyle/>
+        <a:p>
+          <a:endParaRPr lang="es-ES"/>
+        </a:p>
+      </dgm:t>
+    </dgm:pt>
+    <dgm:pt modelId="{3ED4C4D9-3E88-44C6-9CCC-53AE12020246}" type="sibTrans" cxnId="{87B49F98-AC55-4C3D-8ECF-D8F6B3339E8A}">
+      <dgm:prSet/>
+      <dgm:spPr/>
+      <dgm:t>
+        <a:bodyPr/>
+        <a:lstStyle/>
+        <a:p>
+          <a:endParaRPr lang="es-ES"/>
+        </a:p>
+      </dgm:t>
+    </dgm:pt>
+    <dgm:pt modelId="{9B594B02-F681-44A3-B88D-260EAFF244A2}">
+      <dgm:prSet phldrT="[Texto]"/>
+      <dgm:spPr/>
+      <dgm:t>
+        <a:bodyPr/>
+        <a:lstStyle/>
+        <a:p>
+          <a:r>
+            <a:rPr lang="es-ES" dirty="0" smtClean="0"/>
+            <a:t>TEORIA DE VECTORES</a:t>
+          </a:r>
+          <a:endParaRPr lang="es-ES" dirty="0"/>
+        </a:p>
+      </dgm:t>
+    </dgm:pt>
+    <dgm:pt modelId="{5DABA5D3-11DF-469E-B594-46C67AB46A71}" type="parTrans" cxnId="{D8912526-8E53-4B88-9BF7-8428810624D6}">
+      <dgm:prSet/>
+      <dgm:spPr/>
+      <dgm:t>
+        <a:bodyPr/>
+        <a:lstStyle/>
+        <a:p>
+          <a:endParaRPr lang="es-ES"/>
+        </a:p>
+      </dgm:t>
+    </dgm:pt>
+    <dgm:pt modelId="{355AAAEB-AFD1-4802-9A3C-AD16F767BEE7}" type="sibTrans" cxnId="{D8912526-8E53-4B88-9BF7-8428810624D6}">
+      <dgm:prSet/>
+      <dgm:spPr/>
+      <dgm:t>
+        <a:bodyPr/>
+        <a:lstStyle/>
+        <a:p>
+          <a:endParaRPr lang="es-ES"/>
+        </a:p>
+      </dgm:t>
+    </dgm:pt>
+    <dgm:pt modelId="{793C1180-23AC-41EA-968B-BB6450EDC85B}">
+      <dgm:prSet phldrT="[Texto]"/>
+      <dgm:spPr/>
+      <dgm:t>
+        <a:bodyPr/>
+        <a:lstStyle/>
+        <a:p>
+          <a:r>
+            <a:rPr lang="es-ES" dirty="0" smtClean="0"/>
+            <a:t>CARGAR UN VECTOR</a:t>
+          </a:r>
+          <a:endParaRPr lang="es-ES" dirty="0"/>
+        </a:p>
+      </dgm:t>
+    </dgm:pt>
+    <dgm:pt modelId="{30D5C636-3F98-4B13-80A9-F6BA0E67636F}" type="parTrans" cxnId="{F0C63CB5-FCCA-4C2D-A1C1-5623DFA360BC}">
+      <dgm:prSet/>
+      <dgm:spPr/>
+      <dgm:t>
+        <a:bodyPr/>
+        <a:lstStyle/>
+        <a:p>
+          <a:endParaRPr lang="es-ES"/>
+        </a:p>
+      </dgm:t>
+    </dgm:pt>
+    <dgm:pt modelId="{43E99B17-4AC8-4387-A52B-216E13B3E07F}" type="sibTrans" cxnId="{F0C63CB5-FCCA-4C2D-A1C1-5623DFA360BC}">
+      <dgm:prSet/>
+      <dgm:spPr/>
+      <dgm:t>
+        <a:bodyPr/>
+        <a:lstStyle/>
+        <a:p>
+          <a:endParaRPr lang="es-ES"/>
+        </a:p>
+      </dgm:t>
+    </dgm:pt>
+    <dgm:pt modelId="{1402902E-3883-4F86-BA2E-EB6A4D69EF3F}">
+      <dgm:prSet phldrT="[Texto]"/>
+      <dgm:spPr/>
+      <dgm:t>
+        <a:bodyPr/>
+        <a:lstStyle/>
+        <a:p>
+          <a:r>
+            <a:rPr lang="es-ES" dirty="0" smtClean="0"/>
+            <a:t>CARGAR UN VECTOR CON VALORES LEIDOS POR PANTALLA</a:t>
+          </a:r>
+          <a:endParaRPr lang="es-ES" dirty="0"/>
+        </a:p>
+      </dgm:t>
+    </dgm:pt>
+    <dgm:pt modelId="{F4B0EB33-4498-460E-B3D1-517157256595}" type="parTrans" cxnId="{93C248FC-9A9A-4F98-96A0-FF2B95F194EE}">
+      <dgm:prSet/>
+      <dgm:spPr/>
+      <dgm:t>
+        <a:bodyPr/>
+        <a:lstStyle/>
+        <a:p>
+          <a:endParaRPr lang="es-ES"/>
+        </a:p>
+      </dgm:t>
+    </dgm:pt>
+    <dgm:pt modelId="{2E0759A7-659A-40A6-979F-FCF9F0BF7D85}" type="sibTrans" cxnId="{93C248FC-9A9A-4F98-96A0-FF2B95F194EE}">
+      <dgm:prSet/>
+      <dgm:spPr/>
+      <dgm:t>
+        <a:bodyPr/>
+        <a:lstStyle/>
+        <a:p>
+          <a:endParaRPr lang="es-ES"/>
+        </a:p>
+      </dgm:t>
+    </dgm:pt>
+    <dgm:pt modelId="{722EF9AC-6351-49BE-BAE0-A01104CDB3B3}" type="pres">
+      <dgm:prSet presAssocID="{CA80CCA9-6AD5-4558-86BE-160A2E443C16}" presName="Name0" presStyleCnt="0">
+        <dgm:presLayoutVars>
+          <dgm:chMax val="1"/>
+          <dgm:dir/>
+          <dgm:animLvl val="ctr"/>
+          <dgm:resizeHandles val="exact"/>
+        </dgm:presLayoutVars>
+      </dgm:prSet>
+      <dgm:spPr/>
+    </dgm:pt>
+    <dgm:pt modelId="{196BEE09-3503-41FE-BFBA-2F76925FF1CA}" type="pres">
+      <dgm:prSet presAssocID="{E6BCD645-185A-4E16-9B71-58625E04BF19}" presName="centerShape" presStyleLbl="node0" presStyleIdx="0" presStyleCnt="1"/>
+      <dgm:spPr/>
+    </dgm:pt>
+    <dgm:pt modelId="{B05B266E-8899-4B7D-B8AF-271C41FAF613}" type="pres">
+      <dgm:prSet presAssocID="{E5F12C86-FDC0-4DBC-A4D3-FFEE10F48808}" presName="node" presStyleLbl="node1" presStyleIdx="0" presStyleCnt="4">
+        <dgm:presLayoutVars>
+          <dgm:bulletEnabled val="1"/>
+        </dgm:presLayoutVars>
+      </dgm:prSet>
+      <dgm:spPr/>
+      <dgm:t>
+        <a:bodyPr/>
+        <a:lstStyle/>
+        <a:p>
+          <a:endParaRPr lang="es-ES"/>
+        </a:p>
+      </dgm:t>
+    </dgm:pt>
+    <dgm:pt modelId="{19149C8B-CD7B-4669-9027-63FB6D9CE4FD}" type="pres">
+      <dgm:prSet presAssocID="{E5F12C86-FDC0-4DBC-A4D3-FFEE10F48808}" presName="dummy" presStyleCnt="0"/>
+      <dgm:spPr/>
+    </dgm:pt>
+    <dgm:pt modelId="{D153308B-8360-42EF-92A2-E6480D5A3FF2}" type="pres">
+      <dgm:prSet presAssocID="{3ED4C4D9-3E88-44C6-9CCC-53AE12020246}" presName="sibTrans" presStyleLbl="sibTrans2D1" presStyleIdx="0" presStyleCnt="4"/>
+      <dgm:spPr/>
+    </dgm:pt>
+    <dgm:pt modelId="{C71E3FD9-ACF6-4FE7-B636-DCF3116F4EAA}" type="pres">
+      <dgm:prSet presAssocID="{9B594B02-F681-44A3-B88D-260EAFF244A2}" presName="node" presStyleLbl="node1" presStyleIdx="1" presStyleCnt="4">
+        <dgm:presLayoutVars>
+          <dgm:bulletEnabled val="1"/>
+        </dgm:presLayoutVars>
+      </dgm:prSet>
+      <dgm:spPr/>
+    </dgm:pt>
+    <dgm:pt modelId="{AC7FF104-EA0C-4D01-9700-47DCB29D0A9D}" type="pres">
+      <dgm:prSet presAssocID="{9B594B02-F681-44A3-B88D-260EAFF244A2}" presName="dummy" presStyleCnt="0"/>
+      <dgm:spPr/>
+    </dgm:pt>
+    <dgm:pt modelId="{A365F0BA-7906-4B86-AACF-E312D372B462}" type="pres">
+      <dgm:prSet presAssocID="{355AAAEB-AFD1-4802-9A3C-AD16F767BEE7}" presName="sibTrans" presStyleLbl="sibTrans2D1" presStyleIdx="1" presStyleCnt="4"/>
+      <dgm:spPr/>
+    </dgm:pt>
+    <dgm:pt modelId="{551C5A19-5BE1-44B5-8D48-496B45068076}" type="pres">
+      <dgm:prSet presAssocID="{793C1180-23AC-41EA-968B-BB6450EDC85B}" presName="node" presStyleLbl="node1" presStyleIdx="2" presStyleCnt="4">
+        <dgm:presLayoutVars>
+          <dgm:bulletEnabled val="1"/>
+        </dgm:presLayoutVars>
+      </dgm:prSet>
+      <dgm:spPr/>
+    </dgm:pt>
+    <dgm:pt modelId="{91CF3872-089F-4067-8C2F-1470BA1E9EA4}" type="pres">
+      <dgm:prSet presAssocID="{793C1180-23AC-41EA-968B-BB6450EDC85B}" presName="dummy" presStyleCnt="0"/>
+      <dgm:spPr/>
+    </dgm:pt>
+    <dgm:pt modelId="{30D3B17C-ADFE-4D41-86A7-C02D107254C1}" type="pres">
+      <dgm:prSet presAssocID="{43E99B17-4AC8-4387-A52B-216E13B3E07F}" presName="sibTrans" presStyleLbl="sibTrans2D1" presStyleIdx="2" presStyleCnt="4"/>
+      <dgm:spPr/>
+    </dgm:pt>
+    <dgm:pt modelId="{C0CE6C72-EBD8-4CF8-ABDA-2F8ED73F4DB3}" type="pres">
+      <dgm:prSet presAssocID="{1402902E-3883-4F86-BA2E-EB6A4D69EF3F}" presName="node" presStyleLbl="node1" presStyleIdx="3" presStyleCnt="4">
+        <dgm:presLayoutVars>
+          <dgm:bulletEnabled val="1"/>
+        </dgm:presLayoutVars>
+      </dgm:prSet>
+      <dgm:spPr/>
+    </dgm:pt>
+    <dgm:pt modelId="{B83DC84F-46A8-46C8-ABE7-B1E2CC87BFF3}" type="pres">
+      <dgm:prSet presAssocID="{1402902E-3883-4F86-BA2E-EB6A4D69EF3F}" presName="dummy" presStyleCnt="0"/>
+      <dgm:spPr/>
+    </dgm:pt>
+    <dgm:pt modelId="{48C00575-8B2A-499E-A898-09FC70B78B9B}" type="pres">
+      <dgm:prSet presAssocID="{2E0759A7-659A-40A6-979F-FCF9F0BF7D85}" presName="sibTrans" presStyleLbl="sibTrans2D1" presStyleIdx="3" presStyleCnt="4"/>
+      <dgm:spPr/>
+    </dgm:pt>
+  </dgm:ptLst>
+  <dgm:cxnLst>
+    <dgm:cxn modelId="{4496735A-45C8-445D-836D-E58F12F3A04C}" srcId="{CA80CCA9-6AD5-4558-86BE-160A2E443C16}" destId="{E6BCD645-185A-4E16-9B71-58625E04BF19}" srcOrd="0" destOrd="0" parTransId="{74202490-D806-4A9A-BA0D-434843C02B78}" sibTransId="{215A2F51-316E-4F25-876B-3607AC1E8046}"/>
+    <dgm:cxn modelId="{C7B045D7-81D8-4042-BAC2-2A090D97DA77}" type="presOf" srcId="{793C1180-23AC-41EA-968B-BB6450EDC85B}" destId="{551C5A19-5BE1-44B5-8D48-496B45068076}" srcOrd="0" destOrd="0" presId="urn:microsoft.com/office/officeart/2005/8/layout/radial6"/>
+    <dgm:cxn modelId="{F0C63CB5-FCCA-4C2D-A1C1-5623DFA360BC}" srcId="{E6BCD645-185A-4E16-9B71-58625E04BF19}" destId="{793C1180-23AC-41EA-968B-BB6450EDC85B}" srcOrd="2" destOrd="0" parTransId="{30D5C636-3F98-4B13-80A9-F6BA0E67636F}" sibTransId="{43E99B17-4AC8-4387-A52B-216E13B3E07F}"/>
+    <dgm:cxn modelId="{93C248FC-9A9A-4F98-96A0-FF2B95F194EE}" srcId="{E6BCD645-185A-4E16-9B71-58625E04BF19}" destId="{1402902E-3883-4F86-BA2E-EB6A4D69EF3F}" srcOrd="3" destOrd="0" parTransId="{F4B0EB33-4498-460E-B3D1-517157256595}" sibTransId="{2E0759A7-659A-40A6-979F-FCF9F0BF7D85}"/>
+    <dgm:cxn modelId="{3DB347BB-8C04-40BA-8115-2D5423F9638B}" type="presOf" srcId="{9B594B02-F681-44A3-B88D-260EAFF244A2}" destId="{C71E3FD9-ACF6-4FE7-B636-DCF3116F4EAA}" srcOrd="0" destOrd="0" presId="urn:microsoft.com/office/officeart/2005/8/layout/radial6"/>
+    <dgm:cxn modelId="{14C5666C-55E6-4861-9AC0-123EB1362CD2}" type="presOf" srcId="{E6BCD645-185A-4E16-9B71-58625E04BF19}" destId="{196BEE09-3503-41FE-BFBA-2F76925FF1CA}" srcOrd="0" destOrd="0" presId="urn:microsoft.com/office/officeart/2005/8/layout/radial6"/>
+    <dgm:cxn modelId="{1AE255E0-F40E-4513-906D-C085B71EDAA1}" type="presOf" srcId="{3ED4C4D9-3E88-44C6-9CCC-53AE12020246}" destId="{D153308B-8360-42EF-92A2-E6480D5A3FF2}" srcOrd="0" destOrd="0" presId="urn:microsoft.com/office/officeart/2005/8/layout/radial6"/>
+    <dgm:cxn modelId="{D8912526-8E53-4B88-9BF7-8428810624D6}" srcId="{E6BCD645-185A-4E16-9B71-58625E04BF19}" destId="{9B594B02-F681-44A3-B88D-260EAFF244A2}" srcOrd="1" destOrd="0" parTransId="{5DABA5D3-11DF-469E-B594-46C67AB46A71}" sibTransId="{355AAAEB-AFD1-4802-9A3C-AD16F767BEE7}"/>
+    <dgm:cxn modelId="{BAFCEFD1-6A11-4847-9BF8-A87F6BC896D8}" type="presOf" srcId="{CA80CCA9-6AD5-4558-86BE-160A2E443C16}" destId="{722EF9AC-6351-49BE-BAE0-A01104CDB3B3}" srcOrd="0" destOrd="0" presId="urn:microsoft.com/office/officeart/2005/8/layout/radial6"/>
+    <dgm:cxn modelId="{B49E902F-F4ED-4773-A5BC-15008A558699}" type="presOf" srcId="{2E0759A7-659A-40A6-979F-FCF9F0BF7D85}" destId="{48C00575-8B2A-499E-A898-09FC70B78B9B}" srcOrd="0" destOrd="0" presId="urn:microsoft.com/office/officeart/2005/8/layout/radial6"/>
+    <dgm:cxn modelId="{FE0FD4E5-8C01-4882-8C0F-D5890A3690C8}" type="presOf" srcId="{355AAAEB-AFD1-4802-9A3C-AD16F767BEE7}" destId="{A365F0BA-7906-4B86-AACF-E312D372B462}" srcOrd="0" destOrd="0" presId="urn:microsoft.com/office/officeart/2005/8/layout/radial6"/>
+    <dgm:cxn modelId="{24C4601D-96E8-470A-95EB-842707B88553}" type="presOf" srcId="{43E99B17-4AC8-4387-A52B-216E13B3E07F}" destId="{30D3B17C-ADFE-4D41-86A7-C02D107254C1}" srcOrd="0" destOrd="0" presId="urn:microsoft.com/office/officeart/2005/8/layout/radial6"/>
+    <dgm:cxn modelId="{87B49F98-AC55-4C3D-8ECF-D8F6B3339E8A}" srcId="{E6BCD645-185A-4E16-9B71-58625E04BF19}" destId="{E5F12C86-FDC0-4DBC-A4D3-FFEE10F48808}" srcOrd="0" destOrd="0" parTransId="{DCFD167D-C2FD-4D29-A01C-74201D74EBE6}" sibTransId="{3ED4C4D9-3E88-44C6-9CCC-53AE12020246}"/>
+    <dgm:cxn modelId="{C0577DB8-C32D-48AE-A38D-736DDE3BC138}" type="presOf" srcId="{1402902E-3883-4F86-BA2E-EB6A4D69EF3F}" destId="{C0CE6C72-EBD8-4CF8-ABDA-2F8ED73F4DB3}" srcOrd="0" destOrd="0" presId="urn:microsoft.com/office/officeart/2005/8/layout/radial6"/>
+    <dgm:cxn modelId="{C567A0BC-0D9A-4A39-A447-F141AEA3B893}" type="presOf" srcId="{E5F12C86-FDC0-4DBC-A4D3-FFEE10F48808}" destId="{B05B266E-8899-4B7D-B8AF-271C41FAF613}" srcOrd="0" destOrd="0" presId="urn:microsoft.com/office/officeart/2005/8/layout/radial6"/>
+    <dgm:cxn modelId="{B4EE3EE0-38A9-41DE-82EA-EF3129E62151}" type="presParOf" srcId="{722EF9AC-6351-49BE-BAE0-A01104CDB3B3}" destId="{196BEE09-3503-41FE-BFBA-2F76925FF1CA}" srcOrd="0" destOrd="0" presId="urn:microsoft.com/office/officeart/2005/8/layout/radial6"/>
+    <dgm:cxn modelId="{E99368DC-33DB-4CA8-8629-8F19EEB0A685}" type="presParOf" srcId="{722EF9AC-6351-49BE-BAE0-A01104CDB3B3}" destId="{B05B266E-8899-4B7D-B8AF-271C41FAF613}" srcOrd="1" destOrd="0" presId="urn:microsoft.com/office/officeart/2005/8/layout/radial6"/>
+    <dgm:cxn modelId="{C0CF20D3-CC54-4EA6-BBC0-4145EC5D1562}" type="presParOf" srcId="{722EF9AC-6351-49BE-BAE0-A01104CDB3B3}" destId="{19149C8B-CD7B-4669-9027-63FB6D9CE4FD}" srcOrd="2" destOrd="0" presId="urn:microsoft.com/office/officeart/2005/8/layout/radial6"/>
+    <dgm:cxn modelId="{88DA3CC5-2F58-4ECC-910D-40E2E62DC6A1}" type="presParOf" srcId="{722EF9AC-6351-49BE-BAE0-A01104CDB3B3}" destId="{D153308B-8360-42EF-92A2-E6480D5A3FF2}" srcOrd="3" destOrd="0" presId="urn:microsoft.com/office/officeart/2005/8/layout/radial6"/>
+    <dgm:cxn modelId="{DB3EA89B-3B4E-4CB1-8EB1-9D24F722BD21}" type="presParOf" srcId="{722EF9AC-6351-49BE-BAE0-A01104CDB3B3}" destId="{C71E3FD9-ACF6-4FE7-B636-DCF3116F4EAA}" srcOrd="4" destOrd="0" presId="urn:microsoft.com/office/officeart/2005/8/layout/radial6"/>
+    <dgm:cxn modelId="{B07A4CE2-7410-48CD-90AF-83F079E17F81}" type="presParOf" srcId="{722EF9AC-6351-49BE-BAE0-A01104CDB3B3}" destId="{AC7FF104-EA0C-4D01-9700-47DCB29D0A9D}" srcOrd="5" destOrd="0" presId="urn:microsoft.com/office/officeart/2005/8/layout/radial6"/>
+    <dgm:cxn modelId="{2CAE6992-7CDC-4E0D-9ACB-696C328D906C}" type="presParOf" srcId="{722EF9AC-6351-49BE-BAE0-A01104CDB3B3}" destId="{A365F0BA-7906-4B86-AACF-E312D372B462}" srcOrd="6" destOrd="0" presId="urn:microsoft.com/office/officeart/2005/8/layout/radial6"/>
+    <dgm:cxn modelId="{306F681D-59A2-46F7-9EB6-429D49E8E14D}" type="presParOf" srcId="{722EF9AC-6351-49BE-BAE0-A01104CDB3B3}" destId="{551C5A19-5BE1-44B5-8D48-496B45068076}" srcOrd="7" destOrd="0" presId="urn:microsoft.com/office/officeart/2005/8/layout/radial6"/>
+    <dgm:cxn modelId="{C0E59DAA-9F94-4506-86E5-63C6E99D3207}" type="presParOf" srcId="{722EF9AC-6351-49BE-BAE0-A01104CDB3B3}" destId="{91CF3872-089F-4067-8C2F-1470BA1E9EA4}" srcOrd="8" destOrd="0" presId="urn:microsoft.com/office/officeart/2005/8/layout/radial6"/>
+    <dgm:cxn modelId="{394FC106-3A0F-4DC0-9830-AB36BEA2A95B}" type="presParOf" srcId="{722EF9AC-6351-49BE-BAE0-A01104CDB3B3}" destId="{30D3B17C-ADFE-4D41-86A7-C02D107254C1}" srcOrd="9" destOrd="0" presId="urn:microsoft.com/office/officeart/2005/8/layout/radial6"/>
+    <dgm:cxn modelId="{43AD201B-065C-4186-9EFA-9559DEE55856}" type="presParOf" srcId="{722EF9AC-6351-49BE-BAE0-A01104CDB3B3}" destId="{C0CE6C72-EBD8-4CF8-ABDA-2F8ED73F4DB3}" srcOrd="10" destOrd="0" presId="urn:microsoft.com/office/officeart/2005/8/layout/radial6"/>
+    <dgm:cxn modelId="{C4D72EE9-9193-43FE-8602-22A785252097}" type="presParOf" srcId="{722EF9AC-6351-49BE-BAE0-A01104CDB3B3}" destId="{B83DC84F-46A8-46C8-ABE7-B1E2CC87BFF3}" srcOrd="11" destOrd="0" presId="urn:microsoft.com/office/officeart/2005/8/layout/radial6"/>
+    <dgm:cxn modelId="{91DE6862-EB45-4645-89D6-F796C61F982F}" type="presParOf" srcId="{722EF9AC-6351-49BE-BAE0-A01104CDB3B3}" destId="{48C00575-8B2A-499E-A898-09FC70B78B9B}" srcOrd="12" destOrd="0" presId="urn:microsoft.com/office/officeart/2005/8/layout/radial6"/>
   </dgm:cxnLst>
   <dgm:bg/>
   <dgm:whole/>
@@ -7796,6 +8873,587 @@
 </dsp:drawing>
 </file>
 
+<file path=ppt/diagrams/drawing5.xml><?xml version="1.0" encoding="utf-8"?>
+<dsp:drawing xmlns:dgm="http://schemas.openxmlformats.org/drawingml/2006/diagram" xmlns:dsp="http://schemas.microsoft.com/office/drawing/2008/diagram" xmlns:a="http://schemas.openxmlformats.org/drawingml/2006/main">
+  <dsp:spTree>
+    <dsp:nvGrpSpPr>
+      <dsp:cNvPr id="0" name=""/>
+      <dsp:cNvGrpSpPr/>
+    </dsp:nvGrpSpPr>
+    <dsp:grpSpPr/>
+    <dsp:sp modelId="{48C00575-8B2A-499E-A898-09FC70B78B9B}">
+      <dsp:nvSpPr>
+        <dsp:cNvPr id="0" name=""/>
+        <dsp:cNvSpPr/>
+      </dsp:nvSpPr>
+      <dsp:spPr>
+        <a:xfrm>
+          <a:off x="722213" y="481080"/>
+          <a:ext cx="3209200" cy="3209200"/>
+        </a:xfrm>
+        <a:prstGeom prst="blockArc">
+          <a:avLst>
+            <a:gd name="adj1" fmla="val 10800000"/>
+            <a:gd name="adj2" fmla="val 16200000"/>
+            <a:gd name="adj3" fmla="val 4639"/>
+          </a:avLst>
+        </a:prstGeom>
+        <a:solidFill>
+          <a:schemeClr val="accent1">
+            <a:tint val="60000"/>
+            <a:hueOff val="0"/>
+            <a:satOff val="0"/>
+            <a:lumOff val="0"/>
+            <a:alphaOff val="0"/>
+          </a:schemeClr>
+        </a:solidFill>
+        <a:ln>
+          <a:noFill/>
+        </a:ln>
+        <a:effectLst/>
+      </dsp:spPr>
+      <dsp:style>
+        <a:lnRef idx="0">
+          <a:scrgbClr r="0" g="0" b="0"/>
+        </a:lnRef>
+        <a:fillRef idx="1">
+          <a:scrgbClr r="0" g="0" b="0"/>
+        </a:fillRef>
+        <a:effectRef idx="0">
+          <a:scrgbClr r="0" g="0" b="0"/>
+        </a:effectRef>
+        <a:fontRef idx="minor">
+          <a:schemeClr val="lt1"/>
+        </a:fontRef>
+      </dsp:style>
+    </dsp:sp>
+    <dsp:sp modelId="{30D3B17C-ADFE-4D41-86A7-C02D107254C1}">
+      <dsp:nvSpPr>
+        <dsp:cNvPr id="0" name=""/>
+        <dsp:cNvSpPr/>
+      </dsp:nvSpPr>
+      <dsp:spPr>
+        <a:xfrm>
+          <a:off x="722213" y="481080"/>
+          <a:ext cx="3209200" cy="3209200"/>
+        </a:xfrm>
+        <a:prstGeom prst="blockArc">
+          <a:avLst>
+            <a:gd name="adj1" fmla="val 5400000"/>
+            <a:gd name="adj2" fmla="val 10800000"/>
+            <a:gd name="adj3" fmla="val 4639"/>
+          </a:avLst>
+        </a:prstGeom>
+        <a:solidFill>
+          <a:schemeClr val="accent1">
+            <a:tint val="60000"/>
+            <a:hueOff val="0"/>
+            <a:satOff val="0"/>
+            <a:lumOff val="0"/>
+            <a:alphaOff val="0"/>
+          </a:schemeClr>
+        </a:solidFill>
+        <a:ln>
+          <a:noFill/>
+        </a:ln>
+        <a:effectLst/>
+      </dsp:spPr>
+      <dsp:style>
+        <a:lnRef idx="0">
+          <a:scrgbClr r="0" g="0" b="0"/>
+        </a:lnRef>
+        <a:fillRef idx="1">
+          <a:scrgbClr r="0" g="0" b="0"/>
+        </a:fillRef>
+        <a:effectRef idx="0">
+          <a:scrgbClr r="0" g="0" b="0"/>
+        </a:effectRef>
+        <a:fontRef idx="minor">
+          <a:schemeClr val="lt1"/>
+        </a:fontRef>
+      </dsp:style>
+    </dsp:sp>
+    <dsp:sp modelId="{A365F0BA-7906-4B86-AACF-E312D372B462}">
+      <dsp:nvSpPr>
+        <dsp:cNvPr id="0" name=""/>
+        <dsp:cNvSpPr/>
+      </dsp:nvSpPr>
+      <dsp:spPr>
+        <a:xfrm>
+          <a:off x="722213" y="481080"/>
+          <a:ext cx="3209200" cy="3209200"/>
+        </a:xfrm>
+        <a:prstGeom prst="blockArc">
+          <a:avLst>
+            <a:gd name="adj1" fmla="val 0"/>
+            <a:gd name="adj2" fmla="val 5400000"/>
+            <a:gd name="adj3" fmla="val 4639"/>
+          </a:avLst>
+        </a:prstGeom>
+        <a:solidFill>
+          <a:schemeClr val="accent1">
+            <a:tint val="60000"/>
+            <a:hueOff val="0"/>
+            <a:satOff val="0"/>
+            <a:lumOff val="0"/>
+            <a:alphaOff val="0"/>
+          </a:schemeClr>
+        </a:solidFill>
+        <a:ln>
+          <a:noFill/>
+        </a:ln>
+        <a:effectLst/>
+      </dsp:spPr>
+      <dsp:style>
+        <a:lnRef idx="0">
+          <a:scrgbClr r="0" g="0" b="0"/>
+        </a:lnRef>
+        <a:fillRef idx="1">
+          <a:scrgbClr r="0" g="0" b="0"/>
+        </a:fillRef>
+        <a:effectRef idx="0">
+          <a:scrgbClr r="0" g="0" b="0"/>
+        </a:effectRef>
+        <a:fontRef idx="minor">
+          <a:schemeClr val="lt1"/>
+        </a:fontRef>
+      </dsp:style>
+    </dsp:sp>
+    <dsp:sp modelId="{D153308B-8360-42EF-92A2-E6480D5A3FF2}">
+      <dsp:nvSpPr>
+        <dsp:cNvPr id="0" name=""/>
+        <dsp:cNvSpPr/>
+      </dsp:nvSpPr>
+      <dsp:spPr>
+        <a:xfrm>
+          <a:off x="722213" y="481080"/>
+          <a:ext cx="3209200" cy="3209200"/>
+        </a:xfrm>
+        <a:prstGeom prst="blockArc">
+          <a:avLst>
+            <a:gd name="adj1" fmla="val 16200000"/>
+            <a:gd name="adj2" fmla="val 0"/>
+            <a:gd name="adj3" fmla="val 4639"/>
+          </a:avLst>
+        </a:prstGeom>
+        <a:solidFill>
+          <a:schemeClr val="accent1">
+            <a:tint val="60000"/>
+            <a:hueOff val="0"/>
+            <a:satOff val="0"/>
+            <a:lumOff val="0"/>
+            <a:alphaOff val="0"/>
+          </a:schemeClr>
+        </a:solidFill>
+        <a:ln>
+          <a:noFill/>
+        </a:ln>
+        <a:effectLst/>
+      </dsp:spPr>
+      <dsp:style>
+        <a:lnRef idx="0">
+          <a:scrgbClr r="0" g="0" b="0"/>
+        </a:lnRef>
+        <a:fillRef idx="1">
+          <a:scrgbClr r="0" g="0" b="0"/>
+        </a:fillRef>
+        <a:effectRef idx="0">
+          <a:scrgbClr r="0" g="0" b="0"/>
+        </a:effectRef>
+        <a:fontRef idx="minor">
+          <a:schemeClr val="lt1"/>
+        </a:fontRef>
+      </dsp:style>
+    </dsp:sp>
+    <dsp:sp modelId="{196BEE09-3503-41FE-BFBA-2F76925FF1CA}">
+      <dsp:nvSpPr>
+        <dsp:cNvPr id="0" name=""/>
+        <dsp:cNvSpPr/>
+      </dsp:nvSpPr>
+      <dsp:spPr>
+        <a:xfrm>
+          <a:off x="1588323" y="1347189"/>
+          <a:ext cx="1476981" cy="1476981"/>
+        </a:xfrm>
+        <a:prstGeom prst="ellipse">
+          <a:avLst/>
+        </a:prstGeom>
+        <a:solidFill>
+          <a:schemeClr val="accent1">
+            <a:hueOff val="0"/>
+            <a:satOff val="0"/>
+            <a:lumOff val="0"/>
+            <a:alphaOff val="0"/>
+          </a:schemeClr>
+        </a:solidFill>
+        <a:ln w="12700" cap="flat" cmpd="sng" algn="in">
+          <a:solidFill>
+            <a:schemeClr val="lt1">
+              <a:hueOff val="0"/>
+              <a:satOff val="0"/>
+              <a:lumOff val="0"/>
+              <a:alphaOff val="0"/>
+            </a:schemeClr>
+          </a:solidFill>
+          <a:prstDash val="solid"/>
+        </a:ln>
+        <a:effectLst/>
+      </dsp:spPr>
+      <dsp:style>
+        <a:lnRef idx="2">
+          <a:scrgbClr r="0" g="0" b="0"/>
+        </a:lnRef>
+        <a:fillRef idx="1">
+          <a:scrgbClr r="0" g="0" b="0"/>
+        </a:fillRef>
+        <a:effectRef idx="0">
+          <a:scrgbClr r="0" g="0" b="0"/>
+        </a:effectRef>
+        <a:fontRef idx="minor">
+          <a:schemeClr val="lt1"/>
+        </a:fontRef>
+      </dsp:style>
+      <dsp:txBody>
+        <a:bodyPr spcFirstLastPara="0" vert="horz" wrap="square" lIns="19050" tIns="19050" rIns="19050" bIns="19050" numCol="1" spcCol="1270" anchor="ctr" anchorCtr="0">
+          <a:noAutofit/>
+        </a:bodyPr>
+        <a:lstStyle/>
+        <a:p>
+          <a:pPr lvl="0" algn="ctr" defTabSz="666750">
+            <a:lnSpc>
+              <a:spcPct val="90000"/>
+            </a:lnSpc>
+            <a:spcBef>
+              <a:spcPct val="0"/>
+            </a:spcBef>
+            <a:spcAft>
+              <a:spcPct val="35000"/>
+            </a:spcAft>
+          </a:pPr>
+          <a:r>
+            <a:rPr lang="es-ES" sz="1500" kern="1200" dirty="0" smtClean="0"/>
+            <a:t>HOJA DE RUTA 4 LECCIONES</a:t>
+          </a:r>
+          <a:endParaRPr lang="es-ES" sz="1500" kern="1200" dirty="0"/>
+        </a:p>
+      </dsp:txBody>
+      <dsp:txXfrm>
+        <a:off x="1804622" y="1563488"/>
+        <a:ext cx="1044383" cy="1044383"/>
+      </dsp:txXfrm>
+    </dsp:sp>
+    <dsp:sp modelId="{B05B266E-8899-4B7D-B8AF-271C41FAF613}">
+      <dsp:nvSpPr>
+        <dsp:cNvPr id="0" name=""/>
+        <dsp:cNvSpPr/>
+      </dsp:nvSpPr>
+      <dsp:spPr>
+        <a:xfrm>
+          <a:off x="1809870" y="1356"/>
+          <a:ext cx="1033887" cy="1033887"/>
+        </a:xfrm>
+        <a:prstGeom prst="ellipse">
+          <a:avLst/>
+        </a:prstGeom>
+        <a:solidFill>
+          <a:schemeClr val="accent1">
+            <a:hueOff val="0"/>
+            <a:satOff val="0"/>
+            <a:lumOff val="0"/>
+            <a:alphaOff val="0"/>
+          </a:schemeClr>
+        </a:solidFill>
+        <a:ln w="12700" cap="flat" cmpd="sng" algn="in">
+          <a:solidFill>
+            <a:schemeClr val="lt1">
+              <a:hueOff val="0"/>
+              <a:satOff val="0"/>
+              <a:lumOff val="0"/>
+              <a:alphaOff val="0"/>
+            </a:schemeClr>
+          </a:solidFill>
+          <a:prstDash val="solid"/>
+        </a:ln>
+        <a:effectLst/>
+      </dsp:spPr>
+      <dsp:style>
+        <a:lnRef idx="2">
+          <a:scrgbClr r="0" g="0" b="0"/>
+        </a:lnRef>
+        <a:fillRef idx="1">
+          <a:scrgbClr r="0" g="0" b="0"/>
+        </a:fillRef>
+        <a:effectRef idx="0">
+          <a:scrgbClr r="0" g="0" b="0"/>
+        </a:effectRef>
+        <a:fontRef idx="minor">
+          <a:schemeClr val="lt1"/>
+        </a:fontRef>
+      </dsp:style>
+      <dsp:txBody>
+        <a:bodyPr spcFirstLastPara="0" vert="horz" wrap="square" lIns="10160" tIns="10160" rIns="10160" bIns="10160" numCol="1" spcCol="1270" anchor="ctr" anchorCtr="0">
+          <a:noAutofit/>
+        </a:bodyPr>
+        <a:lstStyle/>
+        <a:p>
+          <a:pPr lvl="0" algn="ctr" defTabSz="355600">
+            <a:lnSpc>
+              <a:spcPct val="90000"/>
+            </a:lnSpc>
+            <a:spcBef>
+              <a:spcPct val="0"/>
+            </a:spcBef>
+            <a:spcAft>
+              <a:spcPct val="35000"/>
+            </a:spcAft>
+          </a:pPr>
+          <a:r>
+            <a:rPr lang="es-ES" sz="800" kern="1200" dirty="0" smtClean="0"/>
+            <a:t>VECTORES</a:t>
+          </a:r>
+          <a:endParaRPr lang="es-ES" sz="800" kern="1200" dirty="0"/>
+        </a:p>
+      </dsp:txBody>
+      <dsp:txXfrm>
+        <a:off x="1961279" y="152765"/>
+        <a:ext cx="731069" cy="731069"/>
+      </dsp:txXfrm>
+    </dsp:sp>
+    <dsp:sp modelId="{C71E3FD9-ACF6-4FE7-B636-DCF3116F4EAA}">
+      <dsp:nvSpPr>
+        <dsp:cNvPr id="0" name=""/>
+        <dsp:cNvSpPr/>
+      </dsp:nvSpPr>
+      <dsp:spPr>
+        <a:xfrm>
+          <a:off x="3377250" y="1568736"/>
+          <a:ext cx="1033887" cy="1033887"/>
+        </a:xfrm>
+        <a:prstGeom prst="ellipse">
+          <a:avLst/>
+        </a:prstGeom>
+        <a:solidFill>
+          <a:schemeClr val="accent1">
+            <a:hueOff val="0"/>
+            <a:satOff val="0"/>
+            <a:lumOff val="0"/>
+            <a:alphaOff val="0"/>
+          </a:schemeClr>
+        </a:solidFill>
+        <a:ln w="12700" cap="flat" cmpd="sng" algn="in">
+          <a:solidFill>
+            <a:schemeClr val="lt1">
+              <a:hueOff val="0"/>
+              <a:satOff val="0"/>
+              <a:lumOff val="0"/>
+              <a:alphaOff val="0"/>
+            </a:schemeClr>
+          </a:solidFill>
+          <a:prstDash val="solid"/>
+        </a:ln>
+        <a:effectLst/>
+      </dsp:spPr>
+      <dsp:style>
+        <a:lnRef idx="2">
+          <a:scrgbClr r="0" g="0" b="0"/>
+        </a:lnRef>
+        <a:fillRef idx="1">
+          <a:scrgbClr r="0" g="0" b="0"/>
+        </a:fillRef>
+        <a:effectRef idx="0">
+          <a:scrgbClr r="0" g="0" b="0"/>
+        </a:effectRef>
+        <a:fontRef idx="minor">
+          <a:schemeClr val="lt1"/>
+        </a:fontRef>
+      </dsp:style>
+      <dsp:txBody>
+        <a:bodyPr spcFirstLastPara="0" vert="horz" wrap="square" lIns="10160" tIns="10160" rIns="10160" bIns="10160" numCol="1" spcCol="1270" anchor="ctr" anchorCtr="0">
+          <a:noAutofit/>
+        </a:bodyPr>
+        <a:lstStyle/>
+        <a:p>
+          <a:pPr lvl="0" algn="ctr" defTabSz="355600">
+            <a:lnSpc>
+              <a:spcPct val="90000"/>
+            </a:lnSpc>
+            <a:spcBef>
+              <a:spcPct val="0"/>
+            </a:spcBef>
+            <a:spcAft>
+              <a:spcPct val="35000"/>
+            </a:spcAft>
+          </a:pPr>
+          <a:r>
+            <a:rPr lang="es-ES" sz="800" kern="1200" dirty="0" smtClean="0"/>
+            <a:t>TEORIA DE VECTORES</a:t>
+          </a:r>
+          <a:endParaRPr lang="es-ES" sz="800" kern="1200" dirty="0"/>
+        </a:p>
+      </dsp:txBody>
+      <dsp:txXfrm>
+        <a:off x="3528659" y="1720145"/>
+        <a:ext cx="731069" cy="731069"/>
+      </dsp:txXfrm>
+    </dsp:sp>
+    <dsp:sp modelId="{551C5A19-5BE1-44B5-8D48-496B45068076}">
+      <dsp:nvSpPr>
+        <dsp:cNvPr id="0" name=""/>
+        <dsp:cNvSpPr/>
+      </dsp:nvSpPr>
+      <dsp:spPr>
+        <a:xfrm>
+          <a:off x="1809870" y="3136117"/>
+          <a:ext cx="1033887" cy="1033887"/>
+        </a:xfrm>
+        <a:prstGeom prst="ellipse">
+          <a:avLst/>
+        </a:prstGeom>
+        <a:solidFill>
+          <a:schemeClr val="accent1">
+            <a:hueOff val="0"/>
+            <a:satOff val="0"/>
+            <a:lumOff val="0"/>
+            <a:alphaOff val="0"/>
+          </a:schemeClr>
+        </a:solidFill>
+        <a:ln w="12700" cap="flat" cmpd="sng" algn="in">
+          <a:solidFill>
+            <a:schemeClr val="lt1">
+              <a:hueOff val="0"/>
+              <a:satOff val="0"/>
+              <a:lumOff val="0"/>
+              <a:alphaOff val="0"/>
+            </a:schemeClr>
+          </a:solidFill>
+          <a:prstDash val="solid"/>
+        </a:ln>
+        <a:effectLst/>
+      </dsp:spPr>
+      <dsp:style>
+        <a:lnRef idx="2">
+          <a:scrgbClr r="0" g="0" b="0"/>
+        </a:lnRef>
+        <a:fillRef idx="1">
+          <a:scrgbClr r="0" g="0" b="0"/>
+        </a:fillRef>
+        <a:effectRef idx="0">
+          <a:scrgbClr r="0" g="0" b="0"/>
+        </a:effectRef>
+        <a:fontRef idx="minor">
+          <a:schemeClr val="lt1"/>
+        </a:fontRef>
+      </dsp:style>
+      <dsp:txBody>
+        <a:bodyPr spcFirstLastPara="0" vert="horz" wrap="square" lIns="10160" tIns="10160" rIns="10160" bIns="10160" numCol="1" spcCol="1270" anchor="ctr" anchorCtr="0">
+          <a:noAutofit/>
+        </a:bodyPr>
+        <a:lstStyle/>
+        <a:p>
+          <a:pPr lvl="0" algn="ctr" defTabSz="355600">
+            <a:lnSpc>
+              <a:spcPct val="90000"/>
+            </a:lnSpc>
+            <a:spcBef>
+              <a:spcPct val="0"/>
+            </a:spcBef>
+            <a:spcAft>
+              <a:spcPct val="35000"/>
+            </a:spcAft>
+          </a:pPr>
+          <a:r>
+            <a:rPr lang="es-ES" sz="800" kern="1200" dirty="0" smtClean="0"/>
+            <a:t>CARGAR UN VECTOR</a:t>
+          </a:r>
+          <a:endParaRPr lang="es-ES" sz="800" kern="1200" dirty="0"/>
+        </a:p>
+      </dsp:txBody>
+      <dsp:txXfrm>
+        <a:off x="1961279" y="3287526"/>
+        <a:ext cx="731069" cy="731069"/>
+      </dsp:txXfrm>
+    </dsp:sp>
+    <dsp:sp modelId="{C0CE6C72-EBD8-4CF8-ABDA-2F8ED73F4DB3}">
+      <dsp:nvSpPr>
+        <dsp:cNvPr id="0" name=""/>
+        <dsp:cNvSpPr/>
+      </dsp:nvSpPr>
+      <dsp:spPr>
+        <a:xfrm>
+          <a:off x="242490" y="1568736"/>
+          <a:ext cx="1033887" cy="1033887"/>
+        </a:xfrm>
+        <a:prstGeom prst="ellipse">
+          <a:avLst/>
+        </a:prstGeom>
+        <a:solidFill>
+          <a:schemeClr val="accent1">
+            <a:hueOff val="0"/>
+            <a:satOff val="0"/>
+            <a:lumOff val="0"/>
+            <a:alphaOff val="0"/>
+          </a:schemeClr>
+        </a:solidFill>
+        <a:ln w="12700" cap="flat" cmpd="sng" algn="in">
+          <a:solidFill>
+            <a:schemeClr val="lt1">
+              <a:hueOff val="0"/>
+              <a:satOff val="0"/>
+              <a:lumOff val="0"/>
+              <a:alphaOff val="0"/>
+            </a:schemeClr>
+          </a:solidFill>
+          <a:prstDash val="solid"/>
+        </a:ln>
+        <a:effectLst/>
+      </dsp:spPr>
+      <dsp:style>
+        <a:lnRef idx="2">
+          <a:scrgbClr r="0" g="0" b="0"/>
+        </a:lnRef>
+        <a:fillRef idx="1">
+          <a:scrgbClr r="0" g="0" b="0"/>
+        </a:fillRef>
+        <a:effectRef idx="0">
+          <a:scrgbClr r="0" g="0" b="0"/>
+        </a:effectRef>
+        <a:fontRef idx="minor">
+          <a:schemeClr val="lt1"/>
+        </a:fontRef>
+      </dsp:style>
+      <dsp:txBody>
+        <a:bodyPr spcFirstLastPara="0" vert="horz" wrap="square" lIns="10160" tIns="10160" rIns="10160" bIns="10160" numCol="1" spcCol="1270" anchor="ctr" anchorCtr="0">
+          <a:noAutofit/>
+        </a:bodyPr>
+        <a:lstStyle/>
+        <a:p>
+          <a:pPr lvl="0" algn="ctr" defTabSz="355600">
+            <a:lnSpc>
+              <a:spcPct val="90000"/>
+            </a:lnSpc>
+            <a:spcBef>
+              <a:spcPct val="0"/>
+            </a:spcBef>
+            <a:spcAft>
+              <a:spcPct val="35000"/>
+            </a:spcAft>
+          </a:pPr>
+          <a:r>
+            <a:rPr lang="es-ES" sz="800" kern="1200" dirty="0" smtClean="0"/>
+            <a:t>CARGAR UN VECTOR CON VALORES LEIDOS POR PANTALLA</a:t>
+          </a:r>
+          <a:endParaRPr lang="es-ES" sz="800" kern="1200" dirty="0"/>
+        </a:p>
+      </dsp:txBody>
+      <dsp:txXfrm>
+        <a:off x="393899" y="1720145"/>
+        <a:ext cx="731069" cy="731069"/>
+      </dsp:txXfrm>
+    </dsp:sp>
+  </dsp:spTree>
+</dsp:drawing>
+</file>
+
 <file path=ppt/diagrams/layout1.xml><?xml version="1.0" encoding="utf-8"?>
 <dgm:layoutDef xmlns:dgm="http://schemas.openxmlformats.org/drawingml/2006/diagram" xmlns:a="http://schemas.openxmlformats.org/drawingml/2006/main" uniqueId="urn:microsoft.com/office/officeart/2005/8/layout/radial6">
   <dgm:title val=""/>
@@ -9143,6 +10801,413 @@
 </dgm:layoutDef>
 </file>
 
+<file path=ppt/diagrams/layout5.xml><?xml version="1.0" encoding="utf-8"?>
+<dgm:layoutDef xmlns:dgm="http://schemas.openxmlformats.org/drawingml/2006/diagram" xmlns:a="http://schemas.openxmlformats.org/drawingml/2006/main" uniqueId="urn:microsoft.com/office/officeart/2005/8/layout/radial6">
+  <dgm:title val=""/>
+  <dgm:desc val=""/>
+  <dgm:catLst>
+    <dgm:cat type="cycle" pri="9000"/>
+    <dgm:cat type="relationship" pri="21000"/>
+  </dgm:catLst>
+  <dgm:sampData>
+    <dgm:dataModel>
+      <dgm:ptLst>
+        <dgm:pt modelId="0" type="doc"/>
+        <dgm:pt modelId="1">
+          <dgm:prSet phldr="1"/>
+        </dgm:pt>
+        <dgm:pt modelId="11">
+          <dgm:prSet phldr="1"/>
+        </dgm:pt>
+        <dgm:pt modelId="12">
+          <dgm:prSet phldr="1"/>
+        </dgm:pt>
+        <dgm:pt modelId="13">
+          <dgm:prSet phldr="1"/>
+        </dgm:pt>
+        <dgm:pt modelId="14">
+          <dgm:prSet phldr="1"/>
+        </dgm:pt>
+      </dgm:ptLst>
+      <dgm:cxnLst>
+        <dgm:cxn modelId="2" srcId="0" destId="1" srcOrd="0" destOrd="0"/>
+        <dgm:cxn modelId="3" srcId="1" destId="11" srcOrd="0" destOrd="0"/>
+        <dgm:cxn modelId="4" srcId="1" destId="12" srcOrd="1" destOrd="0"/>
+        <dgm:cxn modelId="5" srcId="1" destId="13" srcOrd="2" destOrd="0"/>
+        <dgm:cxn modelId="6" srcId="1" destId="14" srcOrd="3" destOrd="0"/>
+      </dgm:cxnLst>
+      <dgm:bg/>
+      <dgm:whole/>
+    </dgm:dataModel>
+  </dgm:sampData>
+  <dgm:styleData>
+    <dgm:dataModel>
+      <dgm:ptLst>
+        <dgm:pt modelId="0" type="doc"/>
+        <dgm:pt modelId="1"/>
+        <dgm:pt modelId="11"/>
+        <dgm:pt modelId="12"/>
+        <dgm:pt modelId="13"/>
+      </dgm:ptLst>
+      <dgm:cxnLst>
+        <dgm:cxn modelId="2" srcId="0" destId="1" srcOrd="0" destOrd="0"/>
+        <dgm:cxn modelId="15" srcId="1" destId="11" srcOrd="0" destOrd="0"/>
+        <dgm:cxn modelId="16" srcId="1" destId="12" srcOrd="1" destOrd="0"/>
+        <dgm:cxn modelId="17" srcId="1" destId="13" srcOrd="2" destOrd="0"/>
+      </dgm:cxnLst>
+      <dgm:bg/>
+      <dgm:whole/>
+    </dgm:dataModel>
+  </dgm:styleData>
+  <dgm:clrData>
+    <dgm:dataModel>
+      <dgm:ptLst>
+        <dgm:pt modelId="0" type="doc"/>
+        <dgm:pt modelId="1"/>
+        <dgm:pt modelId="11"/>
+        <dgm:pt modelId="12"/>
+        <dgm:pt modelId="13"/>
+        <dgm:pt modelId="14"/>
+        <dgm:pt modelId="15"/>
+        <dgm:pt modelId="16"/>
+      </dgm:ptLst>
+      <dgm:cxnLst>
+        <dgm:cxn modelId="2" srcId="0" destId="1" srcOrd="0" destOrd="0"/>
+        <dgm:cxn modelId="16" srcId="1" destId="11" srcOrd="0" destOrd="0"/>
+        <dgm:cxn modelId="17" srcId="1" destId="12" srcOrd="1" destOrd="0"/>
+        <dgm:cxn modelId="18" srcId="1" destId="13" srcOrd="2" destOrd="0"/>
+        <dgm:cxn modelId="19" srcId="1" destId="14" srcOrd="3" destOrd="0"/>
+        <dgm:cxn modelId="20" srcId="1" destId="15" srcOrd="4" destOrd="0"/>
+        <dgm:cxn modelId="21" srcId="1" destId="16" srcOrd="5" destOrd="0"/>
+      </dgm:cxnLst>
+      <dgm:bg/>
+      <dgm:whole/>
+    </dgm:dataModel>
+  </dgm:clrData>
+  <dgm:layoutNode name="Name0">
+    <dgm:varLst>
+      <dgm:chMax val="1"/>
+      <dgm:dir/>
+      <dgm:animLvl val="ctr"/>
+      <dgm:resizeHandles val="exact"/>
+    </dgm:varLst>
+    <dgm:choose name="Name1">
+      <dgm:if name="Name2" func="var" arg="dir" op="equ" val="norm">
+        <dgm:choose name="Name3">
+          <dgm:if name="Name4" axis="ch ch" ptType="node node" st="1 1" cnt="1 0" func="cnt" op="lte" val="1">
+            <dgm:alg type="cycle">
+              <dgm:param type="stAng" val="90"/>
+              <dgm:param type="spanAng" val="360"/>
+              <dgm:param type="ctrShpMap" val="fNode"/>
+            </dgm:alg>
+          </dgm:if>
+          <dgm:else name="Name5">
+            <dgm:alg type="cycle">
+              <dgm:param type="stAng" val="0"/>
+              <dgm:param type="spanAng" val="360"/>
+              <dgm:param type="ctrShpMap" val="fNode"/>
+            </dgm:alg>
+          </dgm:else>
+        </dgm:choose>
+      </dgm:if>
+      <dgm:else name="Name6">
+        <dgm:choose name="Name7">
+          <dgm:if name="Name8" axis="ch ch" ptType="node node" st="1 1" cnt="1 0" func="cnt" op="lte" val="1">
+            <dgm:alg type="cycle">
+              <dgm:param type="stAng" val="-90"/>
+              <dgm:param type="spanAng" val="360"/>
+              <dgm:param type="ctrShpMap" val="fNode"/>
+            </dgm:alg>
+          </dgm:if>
+          <dgm:else name="Name9">
+            <dgm:alg type="cycle">
+              <dgm:param type="stAng" val="0"/>
+              <dgm:param type="spanAng" val="-360"/>
+              <dgm:param type="ctrShpMap" val="fNode"/>
+            </dgm:alg>
+          </dgm:else>
+        </dgm:choose>
+      </dgm:else>
+    </dgm:choose>
+    <dgm:shape xmlns:r="http://schemas.openxmlformats.org/officeDocument/2006/relationships" r:blip="">
+      <dgm:adjLst/>
+    </dgm:shape>
+    <dgm:presOf/>
+    <dgm:choose name="Name10">
+      <dgm:if name="Name11" func="var" arg="dir" op="equ" val="norm">
+        <dgm:choose name="Name12">
+          <dgm:if name="Name13" axis="ch ch" ptType="node node" st="1 1" cnt="1 0" func="cnt" op="equ" val="1">
+            <dgm:constrLst>
+              <dgm:constr type="diam" val="170"/>
+              <dgm:constr type="w" for="ch" forName="centerShape" refType="w"/>
+              <dgm:constr type="w" for="ch" forName="oneComp" refType="w" refFor="ch" refForName="centerShape" op="equ" fact="0.7"/>
+              <dgm:constr type="sp" refType="w" refFor="ch" refForName="oneComp" fact="0.3"/>
+              <dgm:constr type="sibSp" refType="w" refFor="ch" refForName="oneComp" fact="0.3"/>
+              <dgm:constr type="primFontSz" for="ch" forName="centerShape" val="65"/>
+              <dgm:constr type="primFontSz" for="des" forName="oneNode" refType="primFontSz" refFor="ch" refForName="centerShape" fact="0.95"/>
+              <dgm:constr type="primFontSz" for="des" forName="oneNode" refType="primFontSz" refFor="ch" refForName="centerShape" op="lte" fact="0.95"/>
+              <dgm:constr type="diam" for="ch" forName="singleconn" refType="diam" op="equ" fact="-1"/>
+              <dgm:constr type="h" for="ch" forName="singleconn" refType="w" refFor="ch" refForName="oneComp" fact="0.24"/>
+              <dgm:constr type="w" for="ch" forName="dummya" refType="w" refFor="ch" refForName="oneComp" op="equ"/>
+              <dgm:constr type="w" for="ch" forName="dummyb" refType="w" refFor="ch" refForName="oneComp" op="equ"/>
+              <dgm:constr type="w" for="ch" forName="dummyc" refType="w" refFor="ch" refForName="oneComp" op="equ"/>
+            </dgm:constrLst>
+          </dgm:if>
+          <dgm:else name="Name14">
+            <dgm:constrLst>
+              <dgm:constr type="diam" val="170"/>
+              <dgm:constr type="w" for="ch" forName="centerShape" refType="w"/>
+              <dgm:constr type="w" for="ch" forName="node" refType="w" refFor="ch" refForName="centerShape" op="equ" fact="0.7"/>
+              <dgm:constr type="sp" refType="w" refFor="ch" refForName="node" fact="0.3"/>
+              <dgm:constr type="sibSp" refType="w" refFor="ch" refForName="node" fact="0.3"/>
+              <dgm:constr type="primFontSz" for="ch" forName="centerShape" val="65"/>
+              <dgm:constr type="primFontSz" for="des" forName="node" refType="primFontSz" refFor="ch" refForName="centerShape" fact="0.78"/>
+              <dgm:constr type="primFontSz" for="ch" forName="node" refType="primFontSz" refFor="ch" refForName="centerShape" op="lte" fact="0.95"/>
+              <dgm:constr type="diam" for="ch" forName="sibTrans" refType="diam" op="equ"/>
+              <dgm:constr type="h" for="ch" forName="sibTrans" refType="w" refFor="ch" refForName="node" fact="0.24"/>
+              <dgm:constr type="w" for="ch" forName="dummy" val="1"/>
+            </dgm:constrLst>
+          </dgm:else>
+        </dgm:choose>
+      </dgm:if>
+      <dgm:else name="Name15">
+        <dgm:choose name="Name16">
+          <dgm:if name="Name17" axis="ch ch" ptType="node node" st="1 1" cnt="1 0" func="cnt" op="equ" val="1">
+            <dgm:constrLst>
+              <dgm:constr type="diam" val="170"/>
+              <dgm:constr type="w" for="ch" forName="centerShape" refType="w"/>
+              <dgm:constr type="w" for="ch" forName="oneComp" refType="w" refFor="ch" refForName="centerShape" op="equ" fact="0.7"/>
+              <dgm:constr type="sp" refType="w" refFor="ch" refForName="oneComp" fact="0.3"/>
+              <dgm:constr type="sibSp" refType="w" refFor="ch" refForName="oneComp" fact="0.3"/>
+              <dgm:constr type="primFontSz" for="ch" forName="centerShape" val="65"/>
+              <dgm:constr type="primFontSz" for="des" forName="oneNode" refType="primFontSz" refFor="ch" refForName="centerShape" fact="0.95"/>
+              <dgm:constr type="primFontSz" for="ch" forName="oneNode" refType="primFontSz" refFor="ch" refForName="centerShape" op="lte" fact="0.95"/>
+              <dgm:constr type="diam" for="ch" forName="singleconn" refType="diam"/>
+              <dgm:constr type="h" for="ch" forName="singleconn" refType="w" refFor="ch" refForName="oneComp" fact="0.24"/>
+              <dgm:constr type="diam" for="ch" refType="diam" op="equ"/>
+              <dgm:constr type="w" for="ch" forName="dummya" refType="w" refFor="ch" refForName="oneComp" op="equ"/>
+              <dgm:constr type="w" for="ch" forName="dummyb" refType="w" refFor="ch" refForName="oneComp" op="equ"/>
+              <dgm:constr type="w" for="ch" forName="dummyc" refType="w" refFor="ch" refForName="oneComp" op="equ"/>
+            </dgm:constrLst>
+          </dgm:if>
+          <dgm:else name="Name18">
+            <dgm:constrLst>
+              <dgm:constr type="diam" val="170"/>
+              <dgm:constr type="w" for="ch" forName="centerShape" refType="w"/>
+              <dgm:constr type="w" for="ch" forName="node" refType="w" refFor="ch" refForName="centerShape" op="equ" fact="0.7"/>
+              <dgm:constr type="sp" refType="w" refFor="ch" refForName="node" fact="0.3"/>
+              <dgm:constr type="sibSp" refType="w" refFor="ch" refForName="node" fact="0.3"/>
+              <dgm:constr type="primFontSz" for="ch" forName="centerShape" val="65"/>
+              <dgm:constr type="primFontSz" for="des" forName="node" refType="primFontSz" refFor="ch" refForName="centerShape" fact="0.78"/>
+              <dgm:constr type="primFontSz" for="ch" forName="node" refType="primFontSz" refFor="ch" refForName="centerShape" op="lte" fact="0.95"/>
+              <dgm:constr type="diam" for="ch" ptType="sibTrans" refType="diam" fact="-1"/>
+              <dgm:constr type="h" for="ch" forName="sibTrans" refType="w" refFor="ch" refForName="node" fact="0.24"/>
+              <dgm:constr type="diam" for="ch" refType="diam" op="equ" fact="-1"/>
+              <dgm:constr type="w" for="ch" forName="dummy" val="1"/>
+            </dgm:constrLst>
+          </dgm:else>
+        </dgm:choose>
+      </dgm:else>
+    </dgm:choose>
+    <dgm:ruleLst>
+      <dgm:rule type="diam" val="INF" fact="NaN" max="NaN"/>
+    </dgm:ruleLst>
+    <dgm:forEach name="Name19" axis="ch" ptType="node" cnt="1">
+      <dgm:layoutNode name="centerShape" styleLbl="node0">
+        <dgm:alg type="tx"/>
+        <dgm:shape xmlns:r="http://schemas.openxmlformats.org/officeDocument/2006/relationships" type="ellipse" r:blip="">
+          <dgm:adjLst/>
+        </dgm:shape>
+        <dgm:presOf axis="self"/>
+        <dgm:constrLst>
+          <dgm:constr type="h" refType="w"/>
+          <dgm:constr type="tMarg" refType="primFontSz" fact="0.1"/>
+          <dgm:constr type="bMarg" refType="primFontSz" fact="0.1"/>
+          <dgm:constr type="lMarg" refType="primFontSz" fact="0.1"/>
+          <dgm:constr type="rMarg" refType="primFontSz" fact="0.1"/>
+        </dgm:constrLst>
+        <dgm:ruleLst>
+          <dgm:rule type="primFontSz" val="5" fact="NaN" max="NaN"/>
+        </dgm:ruleLst>
+      </dgm:layoutNode>
+      <dgm:forEach name="Name20" axis="ch">
+        <dgm:forEach name="Name21" axis="self" ptType="node">
+          <dgm:choose name="Name22">
+            <dgm:if name="Name23" axis="par ch" ptType="node node" func="cnt" op="gt" val="1">
+              <dgm:layoutNode name="node" styleLbl="node1">
+                <dgm:varLst>
+                  <dgm:bulletEnabled val="1"/>
+                </dgm:varLst>
+                <dgm:alg type="tx">
+                  <dgm:param type="txAnchorVertCh" val="mid"/>
+                </dgm:alg>
+                <dgm:shape xmlns:r="http://schemas.openxmlformats.org/officeDocument/2006/relationships" type="ellipse" r:blip="">
+                  <dgm:adjLst/>
+                </dgm:shape>
+                <dgm:presOf axis="desOrSelf" ptType="node"/>
+                <dgm:constrLst>
+                  <dgm:constr type="h" refType="w"/>
+                  <dgm:constr type="tMarg" refType="primFontSz" fact="0.1"/>
+                  <dgm:constr type="bMarg" refType="primFontSz" fact="0.1"/>
+                  <dgm:constr type="lMarg" refType="primFontSz" fact="0.1"/>
+                  <dgm:constr type="rMarg" refType="primFontSz" fact="0.1"/>
+                </dgm:constrLst>
+                <dgm:ruleLst>
+                  <dgm:rule type="primFontSz" val="5" fact="NaN" max="NaN"/>
+                </dgm:ruleLst>
+              </dgm:layoutNode>
+              <dgm:layoutNode name="dummy">
+                <dgm:alg type="sp"/>
+                <dgm:shape xmlns:r="http://schemas.openxmlformats.org/officeDocument/2006/relationships" r:blip="">
+                  <dgm:adjLst/>
+                </dgm:shape>
+                <dgm:presOf/>
+                <dgm:constrLst>
+                  <dgm:constr type="h" refType="w"/>
+                </dgm:constrLst>
+                <dgm:ruleLst/>
+              </dgm:layoutNode>
+              <dgm:forEach name="sibTransForEach" axis="followSib" ptType="sibTrans" hideLastTrans="0" cnt="1">
+                <dgm:layoutNode name="sibTrans" styleLbl="sibTrans2D1">
+                  <dgm:alg type="conn">
+                    <dgm:param type="connRout" val="curve"/>
+                    <dgm:param type="begPts" val="ctr"/>
+                    <dgm:param type="endPts" val="ctr"/>
+                    <dgm:param type="begSty" val="noArr"/>
+                    <dgm:param type="endSty" val="noArr"/>
+                    <dgm:param type="dstNode" val="node"/>
+                  </dgm:alg>
+                  <dgm:shape xmlns:r="http://schemas.openxmlformats.org/officeDocument/2006/relationships" type="conn" r:blip="" zOrderOff="-999">
+                    <dgm:adjLst/>
+                  </dgm:shape>
+                  <dgm:presOf axis="self"/>
+                  <dgm:constrLst>
+                    <dgm:constr type="begPad"/>
+                    <dgm:constr type="endPad"/>
+                  </dgm:constrLst>
+                  <dgm:ruleLst/>
+                </dgm:layoutNode>
+              </dgm:forEach>
+            </dgm:if>
+            <dgm:if name="Name24" axis="par ch" ptType="node node" func="cnt" op="equ" val="1">
+              <dgm:layoutNode name="oneComp">
+                <dgm:alg type="composite">
+                  <dgm:param type="ar" val="1"/>
+                </dgm:alg>
+                <dgm:shape xmlns:r="http://schemas.openxmlformats.org/officeDocument/2006/relationships" r:blip="">
+                  <dgm:adjLst/>
+                </dgm:shape>
+                <dgm:presOf/>
+                <dgm:constrLst>
+                  <dgm:constr type="h" refType="w"/>
+                  <dgm:constr type="l" for="ch" forName="dummyConnPt" refType="w" fact="0.5"/>
+                  <dgm:constr type="t" for="ch" forName="dummyConnPt" refType="w" fact="0.5"/>
+                  <dgm:constr type="l" for="ch" forName="oneNode"/>
+                  <dgm:constr type="t" for="ch" forName="oneNode"/>
+                  <dgm:constr type="h" for="ch" forName="oneNode" refType="h"/>
+                  <dgm:constr type="w" for="ch" forName="oneNode" refType="w"/>
+                </dgm:constrLst>
+                <dgm:ruleLst/>
+                <dgm:layoutNode name="dummyConnPt" styleLbl="node1">
+                  <dgm:alg type="sp"/>
+                  <dgm:shape xmlns:r="http://schemas.openxmlformats.org/officeDocument/2006/relationships" r:blip="">
+                    <dgm:adjLst/>
+                  </dgm:shape>
+                  <dgm:presOf/>
+                  <dgm:constrLst>
+                    <dgm:constr type="w" val="1"/>
+                    <dgm:constr type="h" val="1"/>
+                  </dgm:constrLst>
+                  <dgm:ruleLst/>
+                </dgm:layoutNode>
+                <dgm:layoutNode name="oneNode" styleLbl="node1">
+                  <dgm:varLst>
+                    <dgm:bulletEnabled val="1"/>
+                  </dgm:varLst>
+                  <dgm:alg type="tx">
+                    <dgm:param type="txAnchorVertCh" val="mid"/>
+                  </dgm:alg>
+                  <dgm:shape xmlns:r="http://schemas.openxmlformats.org/officeDocument/2006/relationships" type="ellipse" r:blip="">
+                    <dgm:adjLst/>
+                  </dgm:shape>
+                  <dgm:presOf axis="desOrSelf" ptType="node"/>
+                  <dgm:constrLst>
+                    <dgm:constr type="h" refType="w"/>
+                    <dgm:constr type="tMarg" refType="primFontSz" fact="0.1"/>
+                    <dgm:constr type="bMarg" refType="primFontSz" fact="0.1"/>
+                    <dgm:constr type="lMarg" refType="primFontSz" fact="0.1"/>
+                    <dgm:constr type="rMarg" refType="primFontSz" fact="0.1"/>
+                  </dgm:constrLst>
+                  <dgm:ruleLst>
+                    <dgm:rule type="primFontSz" val="5" fact="NaN" max="NaN"/>
+                  </dgm:ruleLst>
+                </dgm:layoutNode>
+              </dgm:layoutNode>
+              <dgm:layoutNode name="dummya">
+                <dgm:alg type="sp"/>
+                <dgm:shape xmlns:r="http://schemas.openxmlformats.org/officeDocument/2006/relationships" r:blip="">
+                  <dgm:adjLst/>
+                </dgm:shape>
+                <dgm:presOf/>
+                <dgm:constrLst>
+                  <dgm:constr type="h" refType="w"/>
+                </dgm:constrLst>
+                <dgm:ruleLst/>
+              </dgm:layoutNode>
+              <dgm:layoutNode name="dummyb">
+                <dgm:alg type="sp"/>
+                <dgm:shape xmlns:r="http://schemas.openxmlformats.org/officeDocument/2006/relationships" r:blip="">
+                  <dgm:adjLst/>
+                </dgm:shape>
+                <dgm:presOf/>
+                <dgm:constrLst>
+                  <dgm:constr type="h" refType="w"/>
+                </dgm:constrLst>
+                <dgm:ruleLst/>
+              </dgm:layoutNode>
+              <dgm:layoutNode name="dummyc">
+                <dgm:alg type="sp"/>
+                <dgm:shape xmlns:r="http://schemas.openxmlformats.org/officeDocument/2006/relationships" r:blip="">
+                  <dgm:adjLst/>
+                </dgm:shape>
+                <dgm:presOf/>
+                <dgm:constrLst>
+                  <dgm:constr type="h" refType="w"/>
+                </dgm:constrLst>
+                <dgm:ruleLst/>
+              </dgm:layoutNode>
+              <dgm:forEach name="sibTransForEach1" axis="followSib" ptType="sibTrans" hideLastTrans="0" cnt="1">
+                <dgm:layoutNode name="singleconn" styleLbl="sibTrans2D1">
+                  <dgm:alg type="conn">
+                    <dgm:param type="connRout" val="longCurve"/>
+                    <dgm:param type="begPts" val="bCtr"/>
+                    <dgm:param type="endPts" val="tCtr"/>
+                    <dgm:param type="begSty" val="noArr"/>
+                    <dgm:param type="endSty" val="noArr"/>
+                    <dgm:param type="srcNode" val="dummyConnPt"/>
+                    <dgm:param type="dstNode" val="dummyConnPt"/>
+                  </dgm:alg>
+                  <dgm:shape xmlns:r="http://schemas.openxmlformats.org/officeDocument/2006/relationships" type="conn" r:blip="" zOrderOff="-999">
+                    <dgm:adjLst/>
+                  </dgm:shape>
+                  <dgm:presOf axis="self"/>
+                  <dgm:constrLst>
+                    <dgm:constr type="begPad"/>
+                    <dgm:constr type="endPad"/>
+                  </dgm:constrLst>
+                  <dgm:ruleLst/>
+                </dgm:layoutNode>
+              </dgm:forEach>
+            </dgm:if>
+            <dgm:else name="Name25"/>
+          </dgm:choose>
+        </dgm:forEach>
+      </dgm:forEach>
+    </dgm:forEach>
+  </dgm:layoutNode>
+</dgm:layoutDef>
+</file>
+
 <file path=ppt/diagrams/quickStyle1.xml><?xml version="1.0" encoding="utf-8"?>
 <dgm:styleDef xmlns:dgm="http://schemas.openxmlformats.org/drawingml/2006/diagram" xmlns:a="http://schemas.openxmlformats.org/drawingml/2006/main" uniqueId="urn:microsoft.com/office/officeart/2005/8/quickstyle/simple1">
   <dgm:title val=""/>
@@ -12246,6 +14311,1040 @@
 </file>
 
 <file path=ppt/diagrams/quickStyle4.xml><?xml version="1.0" encoding="utf-8"?>
+<dgm:styleDef xmlns:dgm="http://schemas.openxmlformats.org/drawingml/2006/diagram" xmlns:a="http://schemas.openxmlformats.org/drawingml/2006/main" uniqueId="urn:microsoft.com/office/officeart/2005/8/quickstyle/simple1">
+  <dgm:title val=""/>
+  <dgm:desc val=""/>
+  <dgm:catLst>
+    <dgm:cat type="simple" pri="10100"/>
+  </dgm:catLst>
+  <dgm:scene3d>
+    <a:camera prst="orthographicFront"/>
+    <a:lightRig rig="threePt" dir="t"/>
+  </dgm:scene3d>
+  <dgm:styleLbl name="node0">
+    <dgm:scene3d>
+      <a:camera prst="orthographicFront"/>
+      <a:lightRig rig="threePt" dir="t"/>
+    </dgm:scene3d>
+    <dgm:sp3d/>
+    <dgm:txPr/>
+    <dgm:style>
+      <a:lnRef idx="2">
+        <a:scrgbClr r="0" g="0" b="0"/>
+      </a:lnRef>
+      <a:fillRef idx="1">
+        <a:scrgbClr r="0" g="0" b="0"/>
+      </a:fillRef>
+      <a:effectRef idx="0">
+        <a:scrgbClr r="0" g="0" b="0"/>
+      </a:effectRef>
+      <a:fontRef idx="minor">
+        <a:schemeClr val="lt1"/>
+      </a:fontRef>
+    </dgm:style>
+  </dgm:styleLbl>
+  <dgm:styleLbl name="lnNode1">
+    <dgm:scene3d>
+      <a:camera prst="orthographicFront"/>
+      <a:lightRig rig="threePt" dir="t"/>
+    </dgm:scene3d>
+    <dgm:sp3d/>
+    <dgm:txPr/>
+    <dgm:style>
+      <a:lnRef idx="2">
+        <a:scrgbClr r="0" g="0" b="0"/>
+      </a:lnRef>
+      <a:fillRef idx="1">
+        <a:scrgbClr r="0" g="0" b="0"/>
+      </a:fillRef>
+      <a:effectRef idx="0">
+        <a:scrgbClr r="0" g="0" b="0"/>
+      </a:effectRef>
+      <a:fontRef idx="minor">
+        <a:schemeClr val="lt1"/>
+      </a:fontRef>
+    </dgm:style>
+  </dgm:styleLbl>
+  <dgm:styleLbl name="vennNode1">
+    <dgm:scene3d>
+      <a:camera prst="orthographicFront"/>
+      <a:lightRig rig="threePt" dir="t"/>
+    </dgm:scene3d>
+    <dgm:sp3d/>
+    <dgm:txPr/>
+    <dgm:style>
+      <a:lnRef idx="2">
+        <a:scrgbClr r="0" g="0" b="0"/>
+      </a:lnRef>
+      <a:fillRef idx="1">
+        <a:scrgbClr r="0" g="0" b="0"/>
+      </a:fillRef>
+      <a:effectRef idx="0">
+        <a:scrgbClr r="0" g="0" b="0"/>
+      </a:effectRef>
+      <a:fontRef idx="minor">
+        <a:schemeClr val="tx1"/>
+      </a:fontRef>
+    </dgm:style>
+  </dgm:styleLbl>
+  <dgm:styleLbl name="alignNode1">
+    <dgm:scene3d>
+      <a:camera prst="orthographicFront"/>
+      <a:lightRig rig="threePt" dir="t"/>
+    </dgm:scene3d>
+    <dgm:sp3d/>
+    <dgm:txPr/>
+    <dgm:style>
+      <a:lnRef idx="2">
+        <a:scrgbClr r="0" g="0" b="0"/>
+      </a:lnRef>
+      <a:fillRef idx="1">
+        <a:scrgbClr r="0" g="0" b="0"/>
+      </a:fillRef>
+      <a:effectRef idx="0">
+        <a:scrgbClr r="0" g="0" b="0"/>
+      </a:effectRef>
+      <a:fontRef idx="minor">
+        <a:schemeClr val="lt1"/>
+      </a:fontRef>
+    </dgm:style>
+  </dgm:styleLbl>
+  <dgm:styleLbl name="node1">
+    <dgm:scene3d>
+      <a:camera prst="orthographicFront"/>
+      <a:lightRig rig="threePt" dir="t"/>
+    </dgm:scene3d>
+    <dgm:sp3d/>
+    <dgm:txPr/>
+    <dgm:style>
+      <a:lnRef idx="2">
+        <a:scrgbClr r="0" g="0" b="0"/>
+      </a:lnRef>
+      <a:fillRef idx="1">
+        <a:scrgbClr r="0" g="0" b="0"/>
+      </a:fillRef>
+      <a:effectRef idx="0">
+        <a:scrgbClr r="0" g="0" b="0"/>
+      </a:effectRef>
+      <a:fontRef idx="minor">
+        <a:schemeClr val="lt1"/>
+      </a:fontRef>
+    </dgm:style>
+  </dgm:styleLbl>
+  <dgm:styleLbl name="node2">
+    <dgm:scene3d>
+      <a:camera prst="orthographicFront"/>
+      <a:lightRig rig="threePt" dir="t"/>
+    </dgm:scene3d>
+    <dgm:sp3d/>
+    <dgm:txPr/>
+    <dgm:style>
+      <a:lnRef idx="2">
+        <a:scrgbClr r="0" g="0" b="0"/>
+      </a:lnRef>
+      <a:fillRef idx="1">
+        <a:scrgbClr r="0" g="0" b="0"/>
+      </a:fillRef>
+      <a:effectRef idx="0">
+        <a:scrgbClr r="0" g="0" b="0"/>
+      </a:effectRef>
+      <a:fontRef idx="minor">
+        <a:schemeClr val="lt1"/>
+      </a:fontRef>
+    </dgm:style>
+  </dgm:styleLbl>
+  <dgm:styleLbl name="node3">
+    <dgm:scene3d>
+      <a:camera prst="orthographicFront"/>
+      <a:lightRig rig="threePt" dir="t"/>
+    </dgm:scene3d>
+    <dgm:sp3d/>
+    <dgm:txPr/>
+    <dgm:style>
+      <a:lnRef idx="2">
+        <a:scrgbClr r="0" g="0" b="0"/>
+      </a:lnRef>
+      <a:fillRef idx="1">
+        <a:scrgbClr r="0" g="0" b="0"/>
+      </a:fillRef>
+      <a:effectRef idx="0">
+        <a:scrgbClr r="0" g="0" b="0"/>
+      </a:effectRef>
+      <a:fontRef idx="minor">
+        <a:schemeClr val="lt1"/>
+      </a:fontRef>
+    </dgm:style>
+  </dgm:styleLbl>
+  <dgm:styleLbl name="node4">
+    <dgm:scene3d>
+      <a:camera prst="orthographicFront"/>
+      <a:lightRig rig="threePt" dir="t"/>
+    </dgm:scene3d>
+    <dgm:sp3d/>
+    <dgm:txPr/>
+    <dgm:style>
+      <a:lnRef idx="2">
+        <a:scrgbClr r="0" g="0" b="0"/>
+      </a:lnRef>
+      <a:fillRef idx="1">
+        <a:scrgbClr r="0" g="0" b="0"/>
+      </a:fillRef>
+      <a:effectRef idx="0">
+        <a:scrgbClr r="0" g="0" b="0"/>
+      </a:effectRef>
+      <a:fontRef idx="minor">
+        <a:schemeClr val="lt1"/>
+      </a:fontRef>
+    </dgm:style>
+  </dgm:styleLbl>
+  <dgm:styleLbl name="fgImgPlace1">
+    <dgm:scene3d>
+      <a:camera prst="orthographicFront"/>
+      <a:lightRig rig="threePt" dir="t"/>
+    </dgm:scene3d>
+    <dgm:sp3d/>
+    <dgm:txPr/>
+    <dgm:style>
+      <a:lnRef idx="2">
+        <a:scrgbClr r="0" g="0" b="0"/>
+      </a:lnRef>
+      <a:fillRef idx="1">
+        <a:scrgbClr r="0" g="0" b="0"/>
+      </a:fillRef>
+      <a:effectRef idx="0">
+        <a:scrgbClr r="0" g="0" b="0"/>
+      </a:effectRef>
+      <a:fontRef idx="minor"/>
+    </dgm:style>
+  </dgm:styleLbl>
+  <dgm:styleLbl name="alignImgPlace1">
+    <dgm:scene3d>
+      <a:camera prst="orthographicFront"/>
+      <a:lightRig rig="threePt" dir="t"/>
+    </dgm:scene3d>
+    <dgm:sp3d/>
+    <dgm:txPr/>
+    <dgm:style>
+      <a:lnRef idx="2">
+        <a:scrgbClr r="0" g="0" b="0"/>
+      </a:lnRef>
+      <a:fillRef idx="1">
+        <a:scrgbClr r="0" g="0" b="0"/>
+      </a:fillRef>
+      <a:effectRef idx="0">
+        <a:scrgbClr r="0" g="0" b="0"/>
+      </a:effectRef>
+      <a:fontRef idx="minor"/>
+    </dgm:style>
+  </dgm:styleLbl>
+  <dgm:styleLbl name="bgImgPlace1">
+    <dgm:scene3d>
+      <a:camera prst="orthographicFront"/>
+      <a:lightRig rig="threePt" dir="t"/>
+    </dgm:scene3d>
+    <dgm:sp3d/>
+    <dgm:txPr/>
+    <dgm:style>
+      <a:lnRef idx="2">
+        <a:scrgbClr r="0" g="0" b="0"/>
+      </a:lnRef>
+      <a:fillRef idx="1">
+        <a:scrgbClr r="0" g="0" b="0"/>
+      </a:fillRef>
+      <a:effectRef idx="0">
+        <a:scrgbClr r="0" g="0" b="0"/>
+      </a:effectRef>
+      <a:fontRef idx="minor"/>
+    </dgm:style>
+  </dgm:styleLbl>
+  <dgm:styleLbl name="sibTrans2D1">
+    <dgm:scene3d>
+      <a:camera prst="orthographicFront"/>
+      <a:lightRig rig="threePt" dir="t"/>
+    </dgm:scene3d>
+    <dgm:sp3d/>
+    <dgm:txPr/>
+    <dgm:style>
+      <a:lnRef idx="0">
+        <a:scrgbClr r="0" g="0" b="0"/>
+      </a:lnRef>
+      <a:fillRef idx="1">
+        <a:scrgbClr r="0" g="0" b="0"/>
+      </a:fillRef>
+      <a:effectRef idx="0">
+        <a:scrgbClr r="0" g="0" b="0"/>
+      </a:effectRef>
+      <a:fontRef idx="minor">
+        <a:schemeClr val="lt1"/>
+      </a:fontRef>
+    </dgm:style>
+  </dgm:styleLbl>
+  <dgm:styleLbl name="fgSibTrans2D1">
+    <dgm:scene3d>
+      <a:camera prst="orthographicFront"/>
+      <a:lightRig rig="threePt" dir="t"/>
+    </dgm:scene3d>
+    <dgm:sp3d/>
+    <dgm:txPr/>
+    <dgm:style>
+      <a:lnRef idx="0">
+        <a:scrgbClr r="0" g="0" b="0"/>
+      </a:lnRef>
+      <a:fillRef idx="1">
+        <a:scrgbClr r="0" g="0" b="0"/>
+      </a:fillRef>
+      <a:effectRef idx="0">
+        <a:scrgbClr r="0" g="0" b="0"/>
+      </a:effectRef>
+      <a:fontRef idx="minor">
+        <a:schemeClr val="lt1"/>
+      </a:fontRef>
+    </dgm:style>
+  </dgm:styleLbl>
+  <dgm:styleLbl name="bgSibTrans2D1">
+    <dgm:scene3d>
+      <a:camera prst="orthographicFront"/>
+      <a:lightRig rig="threePt" dir="t"/>
+    </dgm:scene3d>
+    <dgm:sp3d/>
+    <dgm:txPr/>
+    <dgm:style>
+      <a:lnRef idx="0">
+        <a:scrgbClr r="0" g="0" b="0"/>
+      </a:lnRef>
+      <a:fillRef idx="1">
+        <a:scrgbClr r="0" g="0" b="0"/>
+      </a:fillRef>
+      <a:effectRef idx="0">
+        <a:scrgbClr r="0" g="0" b="0"/>
+      </a:effectRef>
+      <a:fontRef idx="minor">
+        <a:schemeClr val="lt1"/>
+      </a:fontRef>
+    </dgm:style>
+  </dgm:styleLbl>
+  <dgm:styleLbl name="sibTrans1D1">
+    <dgm:scene3d>
+      <a:camera prst="orthographicFront"/>
+      <a:lightRig rig="threePt" dir="t"/>
+    </dgm:scene3d>
+    <dgm:sp3d/>
+    <dgm:txPr/>
+    <dgm:style>
+      <a:lnRef idx="1">
+        <a:scrgbClr r="0" g="0" b="0"/>
+      </a:lnRef>
+      <a:fillRef idx="0">
+        <a:scrgbClr r="0" g="0" b="0"/>
+      </a:fillRef>
+      <a:effectRef idx="0">
+        <a:scrgbClr r="0" g="0" b="0"/>
+      </a:effectRef>
+      <a:fontRef idx="minor"/>
+    </dgm:style>
+  </dgm:styleLbl>
+  <dgm:styleLbl name="callout">
+    <dgm:scene3d>
+      <a:camera prst="orthographicFront"/>
+      <a:lightRig rig="threePt" dir="t"/>
+    </dgm:scene3d>
+    <dgm:sp3d/>
+    <dgm:txPr/>
+    <dgm:style>
+      <a:lnRef idx="2">
+        <a:scrgbClr r="0" g="0" b="0"/>
+      </a:lnRef>
+      <a:fillRef idx="1">
+        <a:scrgbClr r="0" g="0" b="0"/>
+      </a:fillRef>
+      <a:effectRef idx="0">
+        <a:scrgbClr r="0" g="0" b="0"/>
+      </a:effectRef>
+      <a:fontRef idx="minor"/>
+    </dgm:style>
+  </dgm:styleLbl>
+  <dgm:styleLbl name="asst0">
+    <dgm:scene3d>
+      <a:camera prst="orthographicFront"/>
+      <a:lightRig rig="threePt" dir="t"/>
+    </dgm:scene3d>
+    <dgm:sp3d/>
+    <dgm:txPr/>
+    <dgm:style>
+      <a:lnRef idx="2">
+        <a:scrgbClr r="0" g="0" b="0"/>
+      </a:lnRef>
+      <a:fillRef idx="1">
+        <a:scrgbClr r="0" g="0" b="0"/>
+      </a:fillRef>
+      <a:effectRef idx="0">
+        <a:scrgbClr r="0" g="0" b="0"/>
+      </a:effectRef>
+      <a:fontRef idx="minor">
+        <a:schemeClr val="lt1"/>
+      </a:fontRef>
+    </dgm:style>
+  </dgm:styleLbl>
+  <dgm:styleLbl name="asst1">
+    <dgm:scene3d>
+      <a:camera prst="orthographicFront"/>
+      <a:lightRig rig="threePt" dir="t"/>
+    </dgm:scene3d>
+    <dgm:sp3d/>
+    <dgm:txPr/>
+    <dgm:style>
+      <a:lnRef idx="2">
+        <a:scrgbClr r="0" g="0" b="0"/>
+      </a:lnRef>
+      <a:fillRef idx="1">
+        <a:scrgbClr r="0" g="0" b="0"/>
+      </a:fillRef>
+      <a:effectRef idx="0">
+        <a:scrgbClr r="0" g="0" b="0"/>
+      </a:effectRef>
+      <a:fontRef idx="minor">
+        <a:schemeClr val="lt1"/>
+      </a:fontRef>
+    </dgm:style>
+  </dgm:styleLbl>
+  <dgm:styleLbl name="asst2">
+    <dgm:scene3d>
+      <a:camera prst="orthographicFront"/>
+      <a:lightRig rig="threePt" dir="t"/>
+    </dgm:scene3d>
+    <dgm:sp3d/>
+    <dgm:txPr/>
+    <dgm:style>
+      <a:lnRef idx="2">
+        <a:scrgbClr r="0" g="0" b="0"/>
+      </a:lnRef>
+      <a:fillRef idx="1">
+        <a:scrgbClr r="0" g="0" b="0"/>
+      </a:fillRef>
+      <a:effectRef idx="0">
+        <a:scrgbClr r="0" g="0" b="0"/>
+      </a:effectRef>
+      <a:fontRef idx="minor">
+        <a:schemeClr val="lt1"/>
+      </a:fontRef>
+    </dgm:style>
+  </dgm:styleLbl>
+  <dgm:styleLbl name="asst3">
+    <dgm:scene3d>
+      <a:camera prst="orthographicFront"/>
+      <a:lightRig rig="threePt" dir="t"/>
+    </dgm:scene3d>
+    <dgm:sp3d/>
+    <dgm:txPr/>
+    <dgm:style>
+      <a:lnRef idx="2">
+        <a:scrgbClr r="0" g="0" b="0"/>
+      </a:lnRef>
+      <a:fillRef idx="1">
+        <a:scrgbClr r="0" g="0" b="0"/>
+      </a:fillRef>
+      <a:effectRef idx="0">
+        <a:scrgbClr r="0" g="0" b="0"/>
+      </a:effectRef>
+      <a:fontRef idx="minor">
+        <a:schemeClr val="lt1"/>
+      </a:fontRef>
+    </dgm:style>
+  </dgm:styleLbl>
+  <dgm:styleLbl name="asst4">
+    <dgm:scene3d>
+      <a:camera prst="orthographicFront"/>
+      <a:lightRig rig="threePt" dir="t"/>
+    </dgm:scene3d>
+    <dgm:sp3d/>
+    <dgm:txPr/>
+    <dgm:style>
+      <a:lnRef idx="2">
+        <a:scrgbClr r="0" g="0" b="0"/>
+      </a:lnRef>
+      <a:fillRef idx="1">
+        <a:scrgbClr r="0" g="0" b="0"/>
+      </a:fillRef>
+      <a:effectRef idx="0">
+        <a:scrgbClr r="0" g="0" b="0"/>
+      </a:effectRef>
+      <a:fontRef idx="minor">
+        <a:schemeClr val="lt1"/>
+      </a:fontRef>
+    </dgm:style>
+  </dgm:styleLbl>
+  <dgm:styleLbl name="parChTrans2D1">
+    <dgm:scene3d>
+      <a:camera prst="orthographicFront"/>
+      <a:lightRig rig="threePt" dir="t"/>
+    </dgm:scene3d>
+    <dgm:sp3d/>
+    <dgm:txPr/>
+    <dgm:style>
+      <a:lnRef idx="2">
+        <a:scrgbClr r="0" g="0" b="0"/>
+      </a:lnRef>
+      <a:fillRef idx="1">
+        <a:scrgbClr r="0" g="0" b="0"/>
+      </a:fillRef>
+      <a:effectRef idx="0">
+        <a:scrgbClr r="0" g="0" b="0"/>
+      </a:effectRef>
+      <a:fontRef idx="minor">
+        <a:schemeClr val="lt1"/>
+      </a:fontRef>
+    </dgm:style>
+  </dgm:styleLbl>
+  <dgm:styleLbl name="parChTrans2D2">
+    <dgm:scene3d>
+      <a:camera prst="orthographicFront"/>
+      <a:lightRig rig="threePt" dir="t"/>
+    </dgm:scene3d>
+    <dgm:sp3d/>
+    <dgm:txPr/>
+    <dgm:style>
+      <a:lnRef idx="2">
+        <a:scrgbClr r="0" g="0" b="0"/>
+      </a:lnRef>
+      <a:fillRef idx="1">
+        <a:scrgbClr r="0" g="0" b="0"/>
+      </a:fillRef>
+      <a:effectRef idx="0">
+        <a:scrgbClr r="0" g="0" b="0"/>
+      </a:effectRef>
+      <a:fontRef idx="minor">
+        <a:schemeClr val="lt1"/>
+      </a:fontRef>
+    </dgm:style>
+  </dgm:styleLbl>
+  <dgm:styleLbl name="parChTrans2D3">
+    <dgm:scene3d>
+      <a:camera prst="orthographicFront"/>
+      <a:lightRig rig="threePt" dir="t"/>
+    </dgm:scene3d>
+    <dgm:sp3d/>
+    <dgm:txPr/>
+    <dgm:style>
+      <a:lnRef idx="2">
+        <a:scrgbClr r="0" g="0" b="0"/>
+      </a:lnRef>
+      <a:fillRef idx="1">
+        <a:scrgbClr r="0" g="0" b="0"/>
+      </a:fillRef>
+      <a:effectRef idx="0">
+        <a:scrgbClr r="0" g="0" b="0"/>
+      </a:effectRef>
+      <a:fontRef idx="minor">
+        <a:schemeClr val="lt1"/>
+      </a:fontRef>
+    </dgm:style>
+  </dgm:styleLbl>
+  <dgm:styleLbl name="parChTrans2D4">
+    <dgm:scene3d>
+      <a:camera prst="orthographicFront"/>
+      <a:lightRig rig="threePt" dir="t"/>
+    </dgm:scene3d>
+    <dgm:sp3d/>
+    <dgm:txPr/>
+    <dgm:style>
+      <a:lnRef idx="2">
+        <a:scrgbClr r="0" g="0" b="0"/>
+      </a:lnRef>
+      <a:fillRef idx="1">
+        <a:scrgbClr r="0" g="0" b="0"/>
+      </a:fillRef>
+      <a:effectRef idx="0">
+        <a:scrgbClr r="0" g="0" b="0"/>
+      </a:effectRef>
+      <a:fontRef idx="minor">
+        <a:schemeClr val="lt1"/>
+      </a:fontRef>
+    </dgm:style>
+  </dgm:styleLbl>
+  <dgm:styleLbl name="parChTrans1D1">
+    <dgm:scene3d>
+      <a:camera prst="orthographicFront"/>
+      <a:lightRig rig="threePt" dir="t"/>
+    </dgm:scene3d>
+    <dgm:sp3d/>
+    <dgm:txPr/>
+    <dgm:style>
+      <a:lnRef idx="2">
+        <a:scrgbClr r="0" g="0" b="0"/>
+      </a:lnRef>
+      <a:fillRef idx="0">
+        <a:scrgbClr r="0" g="0" b="0"/>
+      </a:fillRef>
+      <a:effectRef idx="0">
+        <a:scrgbClr r="0" g="0" b="0"/>
+      </a:effectRef>
+      <a:fontRef idx="minor"/>
+    </dgm:style>
+  </dgm:styleLbl>
+  <dgm:styleLbl name="parChTrans1D2">
+    <dgm:scene3d>
+      <a:camera prst="orthographicFront"/>
+      <a:lightRig rig="threePt" dir="t"/>
+    </dgm:scene3d>
+    <dgm:sp3d/>
+    <dgm:txPr/>
+    <dgm:style>
+      <a:lnRef idx="2">
+        <a:scrgbClr r="0" g="0" b="0"/>
+      </a:lnRef>
+      <a:fillRef idx="0">
+        <a:scrgbClr r="0" g="0" b="0"/>
+      </a:fillRef>
+      <a:effectRef idx="0">
+        <a:scrgbClr r="0" g="0" b="0"/>
+      </a:effectRef>
+      <a:fontRef idx="minor"/>
+    </dgm:style>
+  </dgm:styleLbl>
+  <dgm:styleLbl name="parChTrans1D3">
+    <dgm:scene3d>
+      <a:camera prst="orthographicFront"/>
+      <a:lightRig rig="threePt" dir="t"/>
+    </dgm:scene3d>
+    <dgm:sp3d/>
+    <dgm:txPr/>
+    <dgm:style>
+      <a:lnRef idx="2">
+        <a:scrgbClr r="0" g="0" b="0"/>
+      </a:lnRef>
+      <a:fillRef idx="0">
+        <a:scrgbClr r="0" g="0" b="0"/>
+      </a:fillRef>
+      <a:effectRef idx="0">
+        <a:scrgbClr r="0" g="0" b="0"/>
+      </a:effectRef>
+      <a:fontRef idx="minor"/>
+    </dgm:style>
+  </dgm:styleLbl>
+  <dgm:styleLbl name="parChTrans1D4">
+    <dgm:scene3d>
+      <a:camera prst="orthographicFront"/>
+      <a:lightRig rig="threePt" dir="t"/>
+    </dgm:scene3d>
+    <dgm:sp3d/>
+    <dgm:txPr/>
+    <dgm:style>
+      <a:lnRef idx="2">
+        <a:scrgbClr r="0" g="0" b="0"/>
+      </a:lnRef>
+      <a:fillRef idx="0">
+        <a:scrgbClr r="0" g="0" b="0"/>
+      </a:fillRef>
+      <a:effectRef idx="0">
+        <a:scrgbClr r="0" g="0" b="0"/>
+      </a:effectRef>
+      <a:fontRef idx="minor"/>
+    </dgm:style>
+  </dgm:styleLbl>
+  <dgm:styleLbl name="fgAcc1">
+    <dgm:scene3d>
+      <a:camera prst="orthographicFront"/>
+      <a:lightRig rig="threePt" dir="t"/>
+    </dgm:scene3d>
+    <dgm:sp3d/>
+    <dgm:txPr/>
+    <dgm:style>
+      <a:lnRef idx="2">
+        <a:scrgbClr r="0" g="0" b="0"/>
+      </a:lnRef>
+      <a:fillRef idx="1">
+        <a:scrgbClr r="0" g="0" b="0"/>
+      </a:fillRef>
+      <a:effectRef idx="0">
+        <a:scrgbClr r="0" g="0" b="0"/>
+      </a:effectRef>
+      <a:fontRef idx="minor"/>
+    </dgm:style>
+  </dgm:styleLbl>
+  <dgm:styleLbl name="conFgAcc1">
+    <dgm:scene3d>
+      <a:camera prst="orthographicFront"/>
+      <a:lightRig rig="threePt" dir="t"/>
+    </dgm:scene3d>
+    <dgm:sp3d/>
+    <dgm:txPr/>
+    <dgm:style>
+      <a:lnRef idx="2">
+        <a:scrgbClr r="0" g="0" b="0"/>
+      </a:lnRef>
+      <a:fillRef idx="1">
+        <a:scrgbClr r="0" g="0" b="0"/>
+      </a:fillRef>
+      <a:effectRef idx="0">
+        <a:scrgbClr r="0" g="0" b="0"/>
+      </a:effectRef>
+      <a:fontRef idx="minor"/>
+    </dgm:style>
+  </dgm:styleLbl>
+  <dgm:styleLbl name="alignAcc1">
+    <dgm:scene3d>
+      <a:camera prst="orthographicFront"/>
+      <a:lightRig rig="threePt" dir="t"/>
+    </dgm:scene3d>
+    <dgm:sp3d/>
+    <dgm:txPr/>
+    <dgm:style>
+      <a:lnRef idx="2">
+        <a:scrgbClr r="0" g="0" b="0"/>
+      </a:lnRef>
+      <a:fillRef idx="1">
+        <a:scrgbClr r="0" g="0" b="0"/>
+      </a:fillRef>
+      <a:effectRef idx="0">
+        <a:scrgbClr r="0" g="0" b="0"/>
+      </a:effectRef>
+      <a:fontRef idx="minor"/>
+    </dgm:style>
+  </dgm:styleLbl>
+  <dgm:styleLbl name="trAlignAcc1">
+    <dgm:scene3d>
+      <a:camera prst="orthographicFront"/>
+      <a:lightRig rig="threePt" dir="t"/>
+    </dgm:scene3d>
+    <dgm:sp3d/>
+    <dgm:txPr/>
+    <dgm:style>
+      <a:lnRef idx="1">
+        <a:scrgbClr r="0" g="0" b="0"/>
+      </a:lnRef>
+      <a:fillRef idx="1">
+        <a:scrgbClr r="0" g="0" b="0"/>
+      </a:fillRef>
+      <a:effectRef idx="0">
+        <a:scrgbClr r="0" g="0" b="0"/>
+      </a:effectRef>
+      <a:fontRef idx="minor"/>
+    </dgm:style>
+  </dgm:styleLbl>
+  <dgm:styleLbl name="bgAcc1">
+    <dgm:scene3d>
+      <a:camera prst="orthographicFront"/>
+      <a:lightRig rig="threePt" dir="t"/>
+    </dgm:scene3d>
+    <dgm:sp3d/>
+    <dgm:txPr/>
+    <dgm:style>
+      <a:lnRef idx="2">
+        <a:scrgbClr r="0" g="0" b="0"/>
+      </a:lnRef>
+      <a:fillRef idx="1">
+        <a:scrgbClr r="0" g="0" b="0"/>
+      </a:fillRef>
+      <a:effectRef idx="0">
+        <a:scrgbClr r="0" g="0" b="0"/>
+      </a:effectRef>
+      <a:fontRef idx="minor"/>
+    </dgm:style>
+  </dgm:styleLbl>
+  <dgm:styleLbl name="solidFgAcc1">
+    <dgm:scene3d>
+      <a:camera prst="orthographicFront"/>
+      <a:lightRig rig="threePt" dir="t"/>
+    </dgm:scene3d>
+    <dgm:sp3d/>
+    <dgm:txPr/>
+    <dgm:style>
+      <a:lnRef idx="2">
+        <a:scrgbClr r="0" g="0" b="0"/>
+      </a:lnRef>
+      <a:fillRef idx="1">
+        <a:scrgbClr r="0" g="0" b="0"/>
+      </a:fillRef>
+      <a:effectRef idx="0">
+        <a:scrgbClr r="0" g="0" b="0"/>
+      </a:effectRef>
+      <a:fontRef idx="minor"/>
+    </dgm:style>
+  </dgm:styleLbl>
+  <dgm:styleLbl name="solidAlignAcc1">
+    <dgm:scene3d>
+      <a:camera prst="orthographicFront"/>
+      <a:lightRig rig="threePt" dir="t"/>
+    </dgm:scene3d>
+    <dgm:sp3d/>
+    <dgm:txPr/>
+    <dgm:style>
+      <a:lnRef idx="2">
+        <a:scrgbClr r="0" g="0" b="0"/>
+      </a:lnRef>
+      <a:fillRef idx="1">
+        <a:scrgbClr r="0" g="0" b="0"/>
+      </a:fillRef>
+      <a:effectRef idx="0">
+        <a:scrgbClr r="0" g="0" b="0"/>
+      </a:effectRef>
+      <a:fontRef idx="minor"/>
+    </dgm:style>
+  </dgm:styleLbl>
+  <dgm:styleLbl name="solidBgAcc1">
+    <dgm:scene3d>
+      <a:camera prst="orthographicFront"/>
+      <a:lightRig rig="threePt" dir="t"/>
+    </dgm:scene3d>
+    <dgm:sp3d/>
+    <dgm:txPr/>
+    <dgm:style>
+      <a:lnRef idx="2">
+        <a:scrgbClr r="0" g="0" b="0"/>
+      </a:lnRef>
+      <a:fillRef idx="1">
+        <a:scrgbClr r="0" g="0" b="0"/>
+      </a:fillRef>
+      <a:effectRef idx="0">
+        <a:scrgbClr r="0" g="0" b="0"/>
+      </a:effectRef>
+      <a:fontRef idx="minor"/>
+    </dgm:style>
+  </dgm:styleLbl>
+  <dgm:styleLbl name="fgAccFollowNode1">
+    <dgm:scene3d>
+      <a:camera prst="orthographicFront"/>
+      <a:lightRig rig="threePt" dir="t"/>
+    </dgm:scene3d>
+    <dgm:sp3d/>
+    <dgm:txPr/>
+    <dgm:style>
+      <a:lnRef idx="2">
+        <a:scrgbClr r="0" g="0" b="0"/>
+      </a:lnRef>
+      <a:fillRef idx="1">
+        <a:scrgbClr r="0" g="0" b="0"/>
+      </a:fillRef>
+      <a:effectRef idx="0">
+        <a:scrgbClr r="0" g="0" b="0"/>
+      </a:effectRef>
+      <a:fontRef idx="minor"/>
+    </dgm:style>
+  </dgm:styleLbl>
+  <dgm:styleLbl name="alignAccFollowNode1">
+    <dgm:scene3d>
+      <a:camera prst="orthographicFront"/>
+      <a:lightRig rig="threePt" dir="t"/>
+    </dgm:scene3d>
+    <dgm:sp3d/>
+    <dgm:txPr/>
+    <dgm:style>
+      <a:lnRef idx="2">
+        <a:scrgbClr r="0" g="0" b="0"/>
+      </a:lnRef>
+      <a:fillRef idx="1">
+        <a:scrgbClr r="0" g="0" b="0"/>
+      </a:fillRef>
+      <a:effectRef idx="0">
+        <a:scrgbClr r="0" g="0" b="0"/>
+      </a:effectRef>
+      <a:fontRef idx="minor"/>
+    </dgm:style>
+  </dgm:styleLbl>
+  <dgm:styleLbl name="bgAccFollowNode1">
+    <dgm:scene3d>
+      <a:camera prst="orthographicFront"/>
+      <a:lightRig rig="threePt" dir="t"/>
+    </dgm:scene3d>
+    <dgm:sp3d/>
+    <dgm:txPr/>
+    <dgm:style>
+      <a:lnRef idx="2">
+        <a:scrgbClr r="0" g="0" b="0"/>
+      </a:lnRef>
+      <a:fillRef idx="1">
+        <a:scrgbClr r="0" g="0" b="0"/>
+      </a:fillRef>
+      <a:effectRef idx="0">
+        <a:scrgbClr r="0" g="0" b="0"/>
+      </a:effectRef>
+      <a:fontRef idx="minor"/>
+    </dgm:style>
+  </dgm:styleLbl>
+  <dgm:styleLbl name="fgAcc0">
+    <dgm:scene3d>
+      <a:camera prst="orthographicFront"/>
+      <a:lightRig rig="threePt" dir="t"/>
+    </dgm:scene3d>
+    <dgm:sp3d/>
+    <dgm:txPr/>
+    <dgm:style>
+      <a:lnRef idx="2">
+        <a:scrgbClr r="0" g="0" b="0"/>
+      </a:lnRef>
+      <a:fillRef idx="1">
+        <a:scrgbClr r="0" g="0" b="0"/>
+      </a:fillRef>
+      <a:effectRef idx="0">
+        <a:scrgbClr r="0" g="0" b="0"/>
+      </a:effectRef>
+      <a:fontRef idx="minor"/>
+    </dgm:style>
+  </dgm:styleLbl>
+  <dgm:styleLbl name="fgAcc2">
+    <dgm:scene3d>
+      <a:camera prst="orthographicFront"/>
+      <a:lightRig rig="threePt" dir="t"/>
+    </dgm:scene3d>
+    <dgm:sp3d/>
+    <dgm:txPr/>
+    <dgm:style>
+      <a:lnRef idx="2">
+        <a:scrgbClr r="0" g="0" b="0"/>
+      </a:lnRef>
+      <a:fillRef idx="1">
+        <a:scrgbClr r="0" g="0" b="0"/>
+      </a:fillRef>
+      <a:effectRef idx="0">
+        <a:scrgbClr r="0" g="0" b="0"/>
+      </a:effectRef>
+      <a:fontRef idx="minor"/>
+    </dgm:style>
+  </dgm:styleLbl>
+  <dgm:styleLbl name="fgAcc3">
+    <dgm:scene3d>
+      <a:camera prst="orthographicFront"/>
+      <a:lightRig rig="threePt" dir="t"/>
+    </dgm:scene3d>
+    <dgm:sp3d/>
+    <dgm:txPr/>
+    <dgm:style>
+      <a:lnRef idx="2">
+        <a:scrgbClr r="0" g="0" b="0"/>
+      </a:lnRef>
+      <a:fillRef idx="1">
+        <a:scrgbClr r="0" g="0" b="0"/>
+      </a:fillRef>
+      <a:effectRef idx="0">
+        <a:scrgbClr r="0" g="0" b="0"/>
+      </a:effectRef>
+      <a:fontRef idx="minor"/>
+    </dgm:style>
+  </dgm:styleLbl>
+  <dgm:styleLbl name="fgAcc4">
+    <dgm:scene3d>
+      <a:camera prst="orthographicFront"/>
+      <a:lightRig rig="threePt" dir="t"/>
+    </dgm:scene3d>
+    <dgm:sp3d/>
+    <dgm:txPr/>
+    <dgm:style>
+      <a:lnRef idx="2">
+        <a:scrgbClr r="0" g="0" b="0"/>
+      </a:lnRef>
+      <a:fillRef idx="1">
+        <a:scrgbClr r="0" g="0" b="0"/>
+      </a:fillRef>
+      <a:effectRef idx="0">
+        <a:scrgbClr r="0" g="0" b="0"/>
+      </a:effectRef>
+      <a:fontRef idx="minor"/>
+    </dgm:style>
+  </dgm:styleLbl>
+  <dgm:styleLbl name="bgShp">
+    <dgm:scene3d>
+      <a:camera prst="orthographicFront"/>
+      <a:lightRig rig="threePt" dir="t"/>
+    </dgm:scene3d>
+    <dgm:sp3d/>
+    <dgm:txPr/>
+    <dgm:style>
+      <a:lnRef idx="0">
+        <a:scrgbClr r="0" g="0" b="0"/>
+      </a:lnRef>
+      <a:fillRef idx="1">
+        <a:scrgbClr r="0" g="0" b="0"/>
+      </a:fillRef>
+      <a:effectRef idx="0">
+        <a:scrgbClr r="0" g="0" b="0"/>
+      </a:effectRef>
+      <a:fontRef idx="minor"/>
+    </dgm:style>
+  </dgm:styleLbl>
+  <dgm:styleLbl name="dkBgShp">
+    <dgm:scene3d>
+      <a:camera prst="orthographicFront"/>
+      <a:lightRig rig="threePt" dir="t"/>
+    </dgm:scene3d>
+    <dgm:sp3d/>
+    <dgm:txPr/>
+    <dgm:style>
+      <a:lnRef idx="0">
+        <a:scrgbClr r="0" g="0" b="0"/>
+      </a:lnRef>
+      <a:fillRef idx="1">
+        <a:scrgbClr r="0" g="0" b="0"/>
+      </a:fillRef>
+      <a:effectRef idx="0">
+        <a:scrgbClr r="0" g="0" b="0"/>
+      </a:effectRef>
+      <a:fontRef idx="minor"/>
+    </dgm:style>
+  </dgm:styleLbl>
+  <dgm:styleLbl name="trBgShp">
+    <dgm:scene3d>
+      <a:camera prst="orthographicFront"/>
+      <a:lightRig rig="threePt" dir="t"/>
+    </dgm:scene3d>
+    <dgm:sp3d/>
+    <dgm:txPr/>
+    <dgm:style>
+      <a:lnRef idx="0">
+        <a:scrgbClr r="0" g="0" b="0"/>
+      </a:lnRef>
+      <a:fillRef idx="1">
+        <a:scrgbClr r="0" g="0" b="0"/>
+      </a:fillRef>
+      <a:effectRef idx="0">
+        <a:scrgbClr r="0" g="0" b="0"/>
+      </a:effectRef>
+      <a:fontRef idx="minor"/>
+    </dgm:style>
+  </dgm:styleLbl>
+  <dgm:styleLbl name="fgShp">
+    <dgm:scene3d>
+      <a:camera prst="orthographicFront"/>
+      <a:lightRig rig="threePt" dir="t"/>
+    </dgm:scene3d>
+    <dgm:sp3d/>
+    <dgm:txPr/>
+    <dgm:style>
+      <a:lnRef idx="2">
+        <a:scrgbClr r="0" g="0" b="0"/>
+      </a:lnRef>
+      <a:fillRef idx="1">
+        <a:scrgbClr r="0" g="0" b="0"/>
+      </a:fillRef>
+      <a:effectRef idx="0">
+        <a:scrgbClr r="0" g="0" b="0"/>
+      </a:effectRef>
+      <a:fontRef idx="minor"/>
+    </dgm:style>
+  </dgm:styleLbl>
+  <dgm:styleLbl name="revTx">
+    <dgm:scene3d>
+      <a:camera prst="orthographicFront"/>
+      <a:lightRig rig="threePt" dir="t"/>
+    </dgm:scene3d>
+    <dgm:sp3d/>
+    <dgm:txPr/>
+    <dgm:style>
+      <a:lnRef idx="0">
+        <a:scrgbClr r="0" g="0" b="0"/>
+      </a:lnRef>
+      <a:fillRef idx="0">
+        <a:scrgbClr r="0" g="0" b="0"/>
+      </a:fillRef>
+      <a:effectRef idx="0">
+        <a:scrgbClr r="0" g="0" b="0"/>
+      </a:effectRef>
+      <a:fontRef idx="minor"/>
+    </dgm:style>
+  </dgm:styleLbl>
+</dgm:styleDef>
+</file>
+
+<file path=ppt/diagrams/quickStyle5.xml><?xml version="1.0" encoding="utf-8"?>
 <dgm:styleDef xmlns:dgm="http://schemas.openxmlformats.org/drawingml/2006/diagram" xmlns:a="http://schemas.openxmlformats.org/drawingml/2006/main" uniqueId="urn:microsoft.com/office/officeart/2005/8/quickstyle/simple1">
   <dgm:title val=""/>
   <dgm:desc val=""/>
@@ -14490,7 +17589,7 @@
           <a:p>
             <a:fld id="{9ECBFC88-F22F-4398-975C-D0F8EC99CB0D}" type="datetimeFigureOut">
               <a:rPr lang="es-BO" smtClean="0"/>
-              <a:t>3/11/2024</a:t>
+              <a:t>4/11/2024</a:t>
             </a:fld>
             <a:endParaRPr lang="es-BO"/>
           </a:p>
@@ -14728,7 +17827,7 @@
           <a:p>
             <a:fld id="{9ECBFC88-F22F-4398-975C-D0F8EC99CB0D}" type="datetimeFigureOut">
               <a:rPr lang="es-BO" smtClean="0"/>
-              <a:t>3/11/2024</a:t>
+              <a:t>4/11/2024</a:t>
             </a:fld>
             <a:endParaRPr lang="es-BO"/>
           </a:p>
@@ -14908,7 +18007,7 @@
           <a:p>
             <a:fld id="{9ECBFC88-F22F-4398-975C-D0F8EC99CB0D}" type="datetimeFigureOut">
               <a:rPr lang="es-BO" smtClean="0"/>
-              <a:t>3/11/2024</a:t>
+              <a:t>4/11/2024</a:t>
             </a:fld>
             <a:endParaRPr lang="es-BO"/>
           </a:p>
@@ -15078,7 +18177,7 @@
           <a:p>
             <a:fld id="{9ECBFC88-F22F-4398-975C-D0F8EC99CB0D}" type="datetimeFigureOut">
               <a:rPr lang="es-BO" smtClean="0"/>
-              <a:t>3/11/2024</a:t>
+              <a:t>4/11/2024</a:t>
             </a:fld>
             <a:endParaRPr lang="es-BO"/>
           </a:p>
@@ -15354,7 +18453,7 @@
           <a:p>
             <a:fld id="{9ECBFC88-F22F-4398-975C-D0F8EC99CB0D}" type="datetimeFigureOut">
               <a:rPr lang="es-BO" smtClean="0"/>
-              <a:t>3/11/2024</a:t>
+              <a:t>4/11/2024</a:t>
             </a:fld>
             <a:endParaRPr lang="es-BO"/>
           </a:p>
@@ -16555,7 +19654,7 @@
           <a:p>
             <a:fld id="{9ECBFC88-F22F-4398-975C-D0F8EC99CB0D}" type="datetimeFigureOut">
               <a:rPr lang="es-BO" smtClean="0"/>
-              <a:t>3/11/2024</a:t>
+              <a:t>4/11/2024</a:t>
             </a:fld>
             <a:endParaRPr lang="es-BO"/>
           </a:p>
@@ -16945,7 +20044,7 @@
           <a:p>
             <a:fld id="{9ECBFC88-F22F-4398-975C-D0F8EC99CB0D}" type="datetimeFigureOut">
               <a:rPr lang="es-BO" smtClean="0"/>
-              <a:t>3/11/2024</a:t>
+              <a:t>4/11/2024</a:t>
             </a:fld>
             <a:endParaRPr lang="es-BO"/>
           </a:p>
@@ -17068,7 +20167,7 @@
           <a:p>
             <a:fld id="{9ECBFC88-F22F-4398-975C-D0F8EC99CB0D}" type="datetimeFigureOut">
               <a:rPr lang="es-BO" smtClean="0"/>
-              <a:t>3/11/2024</a:t>
+              <a:t>4/11/2024</a:t>
             </a:fld>
             <a:endParaRPr lang="es-BO"/>
           </a:p>
@@ -17163,7 +20262,7 @@
           <a:p>
             <a:fld id="{9ECBFC88-F22F-4398-975C-D0F8EC99CB0D}" type="datetimeFigureOut">
               <a:rPr lang="es-BO" smtClean="0"/>
-              <a:t>3/11/2024</a:t>
+              <a:t>4/11/2024</a:t>
             </a:fld>
             <a:endParaRPr lang="es-BO"/>
           </a:p>
@@ -17926,7 +21025,7 @@
           <a:p>
             <a:fld id="{9ECBFC88-F22F-4398-975C-D0F8EC99CB0D}" type="datetimeFigureOut">
               <a:rPr lang="es-BO" smtClean="0"/>
-              <a:t>3/11/2024</a:t>
+              <a:t>4/11/2024</a:t>
             </a:fld>
             <a:endParaRPr lang="es-BO"/>
           </a:p>
@@ -18766,7 +21865,7 @@
           <a:p>
             <a:fld id="{9ECBFC88-F22F-4398-975C-D0F8EC99CB0D}" type="datetimeFigureOut">
               <a:rPr lang="es-BO" smtClean="0"/>
-              <a:t>3/11/2024</a:t>
+              <a:t>4/11/2024</a:t>
             </a:fld>
             <a:endParaRPr lang="es-BO"/>
           </a:p>
@@ -18993,7 +22092,7 @@
           <a:p>
             <a:fld id="{9ECBFC88-F22F-4398-975C-D0F8EC99CB0D}" type="datetimeFigureOut">
               <a:rPr lang="es-BO" smtClean="0"/>
-              <a:t>3/11/2024</a:t>
+              <a:t>4/11/2024</a:t>
             </a:fld>
             <a:endParaRPr lang="es-BO"/>
           </a:p>
@@ -20603,7 +23702,371 @@
           <a:bodyPr/>
           <a:lstStyle/>
           <a:p>
-            <a:endParaRPr lang="en-US"/>
+            <a:r>
+              <a:rPr lang="es-ES" dirty="0" smtClean="0"/>
+              <a:t>Estructura </a:t>
+            </a:r>
+            <a:r>
+              <a:rPr lang="es-ES" dirty="0" err="1" smtClean="0"/>
+              <a:t>swith</a:t>
+            </a:r>
+            <a:r>
+              <a:rPr lang="es-ES" dirty="0" smtClean="0"/>
+              <a:t> case</a:t>
+            </a:r>
+            <a:endParaRPr lang="en-US" dirty="0"/>
+          </a:p>
+        </p:txBody>
+      </p:sp>
+      <p:sp>
+        <p:nvSpPr>
+          <p:cNvPr id="4" name="CuadroTexto 3"/>
+          <p:cNvSpPr txBox="1"/>
+          <p:nvPr/>
+        </p:nvSpPr>
+        <p:spPr>
+          <a:xfrm>
+            <a:off x="1251678" y="1778000"/>
+            <a:ext cx="2625078" cy="369332"/>
+          </a:xfrm>
+          <a:prstGeom prst="rect">
+            <a:avLst/>
+          </a:prstGeom>
+          <a:noFill/>
+        </p:spPr>
+        <p:txBody>
+          <a:bodyPr wrap="none" rtlCol="0">
+            <a:spAutoFit/>
+          </a:bodyPr>
+          <a:lstStyle/>
+          <a:p>
+            <a:pPr marL="285750" indent="-285750">
+              <a:buFont typeface="Arial" panose="020B0604020202020204" pitchFamily="34" charset="0"/>
+              <a:buChar char="•"/>
+            </a:pPr>
+            <a:r>
+              <a:rPr lang="es-ES" dirty="0" smtClean="0"/>
+              <a:t>Mecanismo de control.</a:t>
+            </a:r>
+            <a:endParaRPr lang="en-US" dirty="0"/>
+          </a:p>
+        </p:txBody>
+      </p:sp>
+      <p:pic>
+        <p:nvPicPr>
+          <p:cNvPr id="5" name="Imagen 4"/>
+          <p:cNvPicPr>
+            <a:picLocks noChangeAspect="1"/>
+          </p:cNvPicPr>
+          <p:nvPr/>
+        </p:nvPicPr>
+        <p:blipFill rotWithShape="1">
+          <a:blip r:embed="rId2"/>
+          <a:srcRect l="6000" t="7909" r="6474" b="5389"/>
+          <a:stretch/>
+        </p:blipFill>
+        <p:spPr>
+          <a:xfrm>
+            <a:off x="4385733" y="2582333"/>
+            <a:ext cx="7526867" cy="3386668"/>
+          </a:xfrm>
+          <a:prstGeom prst="rect">
+            <a:avLst/>
+          </a:prstGeom>
+        </p:spPr>
+      </p:pic>
+      <p:pic>
+        <p:nvPicPr>
+          <p:cNvPr id="6" name="Imagen 5"/>
+          <p:cNvPicPr>
+            <a:picLocks noChangeAspect="1"/>
+          </p:cNvPicPr>
+          <p:nvPr/>
+        </p:nvPicPr>
+        <p:blipFill>
+          <a:blip r:embed="rId3"/>
+          <a:stretch>
+            <a:fillRect/>
+          </a:stretch>
+        </p:blipFill>
+        <p:spPr>
+          <a:xfrm>
+            <a:off x="775539" y="2631631"/>
+            <a:ext cx="3610194" cy="3288072"/>
+          </a:xfrm>
+          <a:prstGeom prst="rect">
+            <a:avLst/>
+          </a:prstGeom>
+        </p:spPr>
+      </p:pic>
+    </p:spTree>
+    <p:extLst>
+      <p:ext uri="{BB962C8B-B14F-4D97-AF65-F5344CB8AC3E}">
+        <p14:creationId xmlns:p14="http://schemas.microsoft.com/office/powerpoint/2010/main" val="910873455"/>
+      </p:ext>
+    </p:extLst>
+  </p:cSld>
+  <p:clrMapOvr>
+    <a:masterClrMapping/>
+  </p:clrMapOvr>
+</p:sld>
+</file>
+
+<file path=ppt/slides/slide14.xml><?xml version="1.0" encoding="utf-8"?>
+<p:sld xmlns:a="http://schemas.openxmlformats.org/drawingml/2006/main" xmlns:r="http://schemas.openxmlformats.org/officeDocument/2006/relationships" xmlns:p="http://schemas.openxmlformats.org/presentationml/2006/main">
+  <p:cSld>
+    <p:spTree>
+      <p:nvGrpSpPr>
+        <p:cNvPr id="1" name=""/>
+        <p:cNvGrpSpPr/>
+        <p:nvPr/>
+      </p:nvGrpSpPr>
+      <p:grpSpPr>
+        <a:xfrm>
+          <a:off x="0" y="0"/>
+          <a:ext cx="0" cy="0"/>
+          <a:chOff x="0" y="0"/>
+          <a:chExt cx="0" cy="0"/>
+        </a:xfrm>
+      </p:grpSpPr>
+      <p:sp>
+        <p:nvSpPr>
+          <p:cNvPr id="2" name="Título 1"/>
+          <p:cNvSpPr>
+            <a:spLocks noGrp="1"/>
+          </p:cNvSpPr>
+          <p:nvPr>
+            <p:ph type="title"/>
+          </p:nvPr>
+        </p:nvSpPr>
+        <p:spPr/>
+        <p:txBody>
+          <a:bodyPr/>
+          <a:lstStyle/>
+          <a:p>
+            <a:r>
+              <a:rPr lang="es-ES" dirty="0" smtClean="0"/>
+              <a:t>funciones</a:t>
+            </a:r>
+            <a:endParaRPr lang="en-US" dirty="0"/>
+          </a:p>
+        </p:txBody>
+      </p:sp>
+      <p:pic>
+        <p:nvPicPr>
+          <p:cNvPr id="4" name="Imagen 3"/>
+          <p:cNvPicPr>
+            <a:picLocks noChangeAspect="1"/>
+          </p:cNvPicPr>
+          <p:nvPr/>
+        </p:nvPicPr>
+        <p:blipFill>
+          <a:blip r:embed="rId2"/>
+          <a:stretch>
+            <a:fillRect/>
+          </a:stretch>
+        </p:blipFill>
+        <p:spPr>
+          <a:xfrm>
+            <a:off x="7913477" y="900819"/>
+            <a:ext cx="2012209" cy="3357914"/>
+          </a:xfrm>
+          <a:prstGeom prst="rect">
+            <a:avLst/>
+          </a:prstGeom>
+        </p:spPr>
+      </p:pic>
+      <p:sp>
+        <p:nvSpPr>
+          <p:cNvPr id="5" name="CuadroTexto 4"/>
+          <p:cNvSpPr txBox="1"/>
+          <p:nvPr/>
+        </p:nvSpPr>
+        <p:spPr>
+          <a:xfrm>
+            <a:off x="1251678" y="2328333"/>
+            <a:ext cx="4031681" cy="923330"/>
+          </a:xfrm>
+          <a:prstGeom prst="rect">
+            <a:avLst/>
+          </a:prstGeom>
+          <a:noFill/>
+        </p:spPr>
+        <p:txBody>
+          <a:bodyPr wrap="none" rtlCol="0">
+            <a:spAutoFit/>
+          </a:bodyPr>
+          <a:lstStyle/>
+          <a:p>
+            <a:pPr marL="285750" indent="-285750">
+              <a:buFont typeface="Arial" panose="020B0604020202020204" pitchFamily="34" charset="0"/>
+              <a:buChar char="•"/>
+            </a:pPr>
+            <a:r>
+              <a:rPr lang="es-ES" dirty="0" smtClean="0"/>
+              <a:t>Algoritmo dentro de una misma clase</a:t>
+            </a:r>
+            <a:r>
+              <a:rPr lang="en-US" dirty="0" smtClean="0"/>
+              <a:t>.</a:t>
+            </a:r>
+          </a:p>
+          <a:p>
+            <a:pPr marL="285750" indent="-285750">
+              <a:buFont typeface="Arial" panose="020B0604020202020204" pitchFamily="34" charset="0"/>
+              <a:buChar char="•"/>
+            </a:pPr>
+            <a:r>
+              <a:rPr lang="es-ES" dirty="0" smtClean="0"/>
+              <a:t>Se puede llamar a una función dentro</a:t>
+            </a:r>
+          </a:p>
+          <a:p>
+            <a:r>
+              <a:rPr lang="es-ES" dirty="0" smtClean="0"/>
+              <a:t>	De el algoritmo</a:t>
+            </a:r>
+          </a:p>
+        </p:txBody>
+      </p:sp>
+      <p:sp>
+        <p:nvSpPr>
+          <p:cNvPr id="6" name="CuadroTexto 5"/>
+          <p:cNvSpPr txBox="1"/>
+          <p:nvPr/>
+        </p:nvSpPr>
+        <p:spPr>
+          <a:xfrm>
+            <a:off x="1251678" y="4509532"/>
+            <a:ext cx="1587038" cy="369332"/>
+          </a:xfrm>
+          <a:prstGeom prst="rect">
+            <a:avLst/>
+          </a:prstGeom>
+          <a:noFill/>
+        </p:spPr>
+        <p:txBody>
+          <a:bodyPr wrap="none" rtlCol="0">
+            <a:spAutoFit/>
+          </a:bodyPr>
+          <a:lstStyle/>
+          <a:p>
+            <a:r>
+              <a:rPr lang="es-ES" dirty="0" smtClean="0"/>
+              <a:t>PARAMETROS</a:t>
+            </a:r>
+            <a:endParaRPr lang="en-US" dirty="0"/>
+          </a:p>
+        </p:txBody>
+      </p:sp>
+      <p:sp>
+        <p:nvSpPr>
+          <p:cNvPr id="7" name="CuadroTexto 6"/>
+          <p:cNvSpPr txBox="1"/>
+          <p:nvPr/>
+        </p:nvSpPr>
+        <p:spPr>
+          <a:xfrm>
+            <a:off x="1363133" y="5169932"/>
+            <a:ext cx="1627369" cy="369332"/>
+          </a:xfrm>
+          <a:prstGeom prst="rect">
+            <a:avLst/>
+          </a:prstGeom>
+          <a:noFill/>
+        </p:spPr>
+        <p:txBody>
+          <a:bodyPr wrap="none" rtlCol="0">
+            <a:spAutoFit/>
+          </a:bodyPr>
+          <a:lstStyle/>
+          <a:p>
+            <a:pPr marL="285750" indent="-285750">
+              <a:buFont typeface="Arial" panose="020B0604020202020204" pitchFamily="34" charset="0"/>
+              <a:buChar char="•"/>
+            </a:pPr>
+            <a:r>
+              <a:rPr lang="es-ES" dirty="0" smtClean="0"/>
+              <a:t>Argumentos</a:t>
+            </a:r>
+            <a:endParaRPr lang="en-US" dirty="0"/>
+          </a:p>
+        </p:txBody>
+      </p:sp>
+      <p:pic>
+        <p:nvPicPr>
+          <p:cNvPr id="8" name="Imagen 7"/>
+          <p:cNvPicPr>
+            <a:picLocks noChangeAspect="1"/>
+          </p:cNvPicPr>
+          <p:nvPr/>
+        </p:nvPicPr>
+        <p:blipFill>
+          <a:blip r:embed="rId3"/>
+          <a:stretch>
+            <a:fillRect/>
+          </a:stretch>
+        </p:blipFill>
+        <p:spPr>
+          <a:xfrm>
+            <a:off x="7913477" y="4509532"/>
+            <a:ext cx="2140116" cy="2011030"/>
+          </a:xfrm>
+          <a:prstGeom prst="rect">
+            <a:avLst/>
+          </a:prstGeom>
+        </p:spPr>
+      </p:pic>
+    </p:spTree>
+    <p:extLst>
+      <p:ext uri="{BB962C8B-B14F-4D97-AF65-F5344CB8AC3E}">
+        <p14:creationId xmlns:p14="http://schemas.microsoft.com/office/powerpoint/2010/main" val="266666411"/>
+      </p:ext>
+    </p:extLst>
+  </p:cSld>
+  <p:clrMapOvr>
+    <a:masterClrMapping/>
+  </p:clrMapOvr>
+</p:sld>
+</file>
+
+<file path=ppt/slides/slide15.xml><?xml version="1.0" encoding="utf-8"?>
+<p:sld xmlns:a="http://schemas.openxmlformats.org/drawingml/2006/main" xmlns:r="http://schemas.openxmlformats.org/officeDocument/2006/relationships" xmlns:p="http://schemas.openxmlformats.org/presentationml/2006/main">
+  <p:cSld>
+    <p:spTree>
+      <p:nvGrpSpPr>
+        <p:cNvPr id="1" name=""/>
+        <p:cNvGrpSpPr/>
+        <p:nvPr/>
+      </p:nvGrpSpPr>
+      <p:grpSpPr>
+        <a:xfrm>
+          <a:off x="0" y="0"/>
+          <a:ext cx="0" cy="0"/>
+          <a:chOff x="0" y="0"/>
+          <a:chExt cx="0" cy="0"/>
+        </a:xfrm>
+      </p:grpSpPr>
+      <p:sp>
+        <p:nvSpPr>
+          <p:cNvPr id="2" name="Título 1"/>
+          <p:cNvSpPr>
+            <a:spLocks noGrp="1"/>
+          </p:cNvSpPr>
+          <p:nvPr>
+            <p:ph type="title"/>
+          </p:nvPr>
+        </p:nvSpPr>
+        <p:spPr/>
+        <p:txBody>
+          <a:bodyPr/>
+          <a:lstStyle/>
+          <a:p>
+            <a:r>
+              <a:rPr lang="es-ES" dirty="0" smtClean="0"/>
+              <a:t>Variables de retorno</a:t>
+            </a:r>
+            <a:endParaRPr lang="en-US" dirty="0"/>
           </a:p>
         </p:txBody>
       </p:sp>
@@ -20617,25 +24080,368 @@
             <p:ph idx="1"/>
           </p:nvPr>
         </p:nvSpPr>
-        <p:spPr/>
+        <p:spPr>
+          <a:xfrm>
+            <a:off x="1251678" y="2286001"/>
+            <a:ext cx="4895122" cy="3593591"/>
+          </a:xfrm>
+        </p:spPr>
         <p:txBody>
           <a:bodyPr/>
           <a:lstStyle/>
           <a:p>
-            <a:endParaRPr lang="en-US"/>
+            <a:r>
+              <a:rPr lang="es-ES" dirty="0" smtClean="0"/>
+              <a:t>Es una variable que nos devuelve el valor de una función, esto quiere decir que el resultado de todas las operaciones hechas en una función quedara almacenado en dicha variable.</a:t>
+            </a:r>
+          </a:p>
+          <a:p>
+            <a:endParaRPr lang="en-US" dirty="0"/>
           </a:p>
         </p:txBody>
       </p:sp>
+      <p:pic>
+        <p:nvPicPr>
+          <p:cNvPr id="4" name="Imagen 3"/>
+          <p:cNvPicPr>
+            <a:picLocks noChangeAspect="1"/>
+          </p:cNvPicPr>
+          <p:nvPr/>
+        </p:nvPicPr>
+        <p:blipFill>
+          <a:blip r:embed="rId2"/>
+          <a:stretch>
+            <a:fillRect/>
+          </a:stretch>
+        </p:blipFill>
+        <p:spPr>
+          <a:xfrm>
+            <a:off x="6769348" y="2286001"/>
+            <a:ext cx="3638735" cy="3131884"/>
+          </a:xfrm>
+          <a:prstGeom prst="rect">
+            <a:avLst/>
+          </a:prstGeom>
+        </p:spPr>
+      </p:pic>
     </p:spTree>
     <p:extLst>
       <p:ext uri="{BB962C8B-B14F-4D97-AF65-F5344CB8AC3E}">
-        <p14:creationId xmlns:p14="http://schemas.microsoft.com/office/powerpoint/2010/main" val="910873455"/>
+        <p14:creationId xmlns:p14="http://schemas.microsoft.com/office/powerpoint/2010/main" val="548757422"/>
       </p:ext>
     </p:extLst>
   </p:cSld>
   <p:clrMapOvr>
     <a:masterClrMapping/>
   </p:clrMapOvr>
+  <p:timing>
+    <p:tnLst>
+      <p:par>
+        <p:cTn id="1" dur="indefinite" restart="never" nodeType="tmRoot"/>
+      </p:par>
+    </p:tnLst>
+  </p:timing>
+</p:sld>
+</file>
+
+<file path=ppt/slides/slide16.xml><?xml version="1.0" encoding="utf-8"?>
+<p:sld xmlns:a="http://schemas.openxmlformats.org/drawingml/2006/main" xmlns:r="http://schemas.openxmlformats.org/officeDocument/2006/relationships" xmlns:p="http://schemas.openxmlformats.org/presentationml/2006/main">
+  <p:cSld>
+    <p:spTree>
+      <p:nvGrpSpPr>
+        <p:cNvPr id="1" name=""/>
+        <p:cNvGrpSpPr/>
+        <p:nvPr/>
+      </p:nvGrpSpPr>
+      <p:grpSpPr>
+        <a:xfrm>
+          <a:off x="0" y="0"/>
+          <a:ext cx="0" cy="0"/>
+          <a:chOff x="0" y="0"/>
+          <a:chExt cx="0" cy="0"/>
+        </a:xfrm>
+      </p:grpSpPr>
+      <p:sp>
+        <p:nvSpPr>
+          <p:cNvPr id="2" name="Título 1"/>
+          <p:cNvSpPr>
+            <a:spLocks noGrp="1"/>
+          </p:cNvSpPr>
+          <p:nvPr>
+            <p:ph type="title"/>
+          </p:nvPr>
+        </p:nvSpPr>
+        <p:spPr/>
+        <p:txBody>
+          <a:bodyPr/>
+          <a:lstStyle/>
+          <a:p>
+            <a:r>
+              <a:rPr lang="es-ES" dirty="0" smtClean="0"/>
+              <a:t>vectores</a:t>
+            </a:r>
+            <a:endParaRPr lang="en-US" dirty="0"/>
+          </a:p>
+        </p:txBody>
+      </p:sp>
+      <p:graphicFrame>
+        <p:nvGraphicFramePr>
+          <p:cNvPr id="6" name="Marcador de contenido 5"/>
+          <p:cNvGraphicFramePr>
+            <a:graphicFrameLocks noGrp="1"/>
+          </p:cNvGraphicFramePr>
+          <p:nvPr>
+            <p:ph idx="1"/>
+            <p:extLst>
+              <p:ext uri="{D42A27DB-BD31-4B8C-83A1-F6EECF244321}">
+                <p14:modId xmlns:p14="http://schemas.microsoft.com/office/powerpoint/2010/main" val="2962488415"/>
+              </p:ext>
+            </p:extLst>
+          </p:nvPr>
+        </p:nvGraphicFramePr>
+        <p:xfrm>
+          <a:off x="936466" y="1759978"/>
+          <a:ext cx="4653628" cy="4171361"/>
+        </p:xfrm>
+        <a:graphic>
+          <a:graphicData uri="http://schemas.openxmlformats.org/drawingml/2006/diagram">
+            <dgm:relIds xmlns:dgm="http://schemas.openxmlformats.org/drawingml/2006/diagram" xmlns:r="http://schemas.openxmlformats.org/officeDocument/2006/relationships" r:dm="rId2" r:lo="rId3" r:qs="rId4" r:cs="rId5"/>
+          </a:graphicData>
+        </a:graphic>
+      </p:graphicFrame>
+      <p:sp>
+        <p:nvSpPr>
+          <p:cNvPr id="7" name="CuadroTexto 6"/>
+          <p:cNvSpPr txBox="1"/>
+          <p:nvPr/>
+        </p:nvSpPr>
+        <p:spPr>
+          <a:xfrm>
+            <a:off x="5967167" y="1874517"/>
+            <a:ext cx="4660250" cy="1200329"/>
+          </a:xfrm>
+          <a:prstGeom prst="rect">
+            <a:avLst/>
+          </a:prstGeom>
+          <a:noFill/>
+        </p:spPr>
+        <p:txBody>
+          <a:bodyPr wrap="none" rtlCol="0">
+            <a:spAutoFit/>
+          </a:bodyPr>
+          <a:lstStyle/>
+          <a:p>
+            <a:pPr marL="285750" indent="-285750">
+              <a:buFont typeface="Arial" panose="020B0604020202020204" pitchFamily="34" charset="0"/>
+              <a:buChar char="•"/>
+            </a:pPr>
+            <a:r>
+              <a:rPr lang="es-ES" dirty="0" smtClean="0"/>
+              <a:t>En una zona de almacenamiento contiguo, </a:t>
+            </a:r>
+          </a:p>
+          <a:p>
+            <a:r>
+              <a:rPr lang="es-ES" dirty="0" smtClean="0"/>
+              <a:t>que contiene una serie de elementos del mismo</a:t>
+            </a:r>
+          </a:p>
+          <a:p>
+            <a:r>
+              <a:rPr lang="es-ES" dirty="0"/>
+              <a:t>t</a:t>
+            </a:r>
+            <a:r>
+              <a:rPr lang="es-ES" dirty="0" smtClean="0"/>
+              <a:t>ipo y se distinguen entre si por un índice y un</a:t>
+            </a:r>
+          </a:p>
+          <a:p>
+            <a:r>
+              <a:rPr lang="es-ES" dirty="0" smtClean="0"/>
+              <a:t>nombre.</a:t>
+            </a:r>
+            <a:endParaRPr lang="en-US" dirty="0"/>
+          </a:p>
+        </p:txBody>
+      </p:sp>
+      <p:pic>
+        <p:nvPicPr>
+          <p:cNvPr id="8" name="Imagen 7"/>
+          <p:cNvPicPr>
+            <a:picLocks noChangeAspect="1"/>
+          </p:cNvPicPr>
+          <p:nvPr/>
+        </p:nvPicPr>
+        <p:blipFill>
+          <a:blip r:embed="rId7"/>
+          <a:stretch>
+            <a:fillRect/>
+          </a:stretch>
+        </p:blipFill>
+        <p:spPr>
+          <a:xfrm>
+            <a:off x="5744890" y="3397201"/>
+            <a:ext cx="2372056" cy="2943636"/>
+          </a:xfrm>
+          <a:prstGeom prst="rect">
+            <a:avLst/>
+          </a:prstGeom>
+        </p:spPr>
+      </p:pic>
+      <p:pic>
+        <p:nvPicPr>
+          <p:cNvPr id="9" name="Imagen 8"/>
+          <p:cNvPicPr>
+            <a:picLocks noChangeAspect="1"/>
+          </p:cNvPicPr>
+          <p:nvPr/>
+        </p:nvPicPr>
+        <p:blipFill>
+          <a:blip r:embed="rId8"/>
+          <a:stretch>
+            <a:fillRect/>
+          </a:stretch>
+        </p:blipFill>
+        <p:spPr>
+          <a:xfrm>
+            <a:off x="8404712" y="3884617"/>
+            <a:ext cx="3477057" cy="2046722"/>
+          </a:xfrm>
+          <a:prstGeom prst="rect">
+            <a:avLst/>
+          </a:prstGeom>
+        </p:spPr>
+      </p:pic>
+    </p:spTree>
+    <p:extLst>
+      <p:ext uri="{BB962C8B-B14F-4D97-AF65-F5344CB8AC3E}">
+        <p14:creationId xmlns:p14="http://schemas.microsoft.com/office/powerpoint/2010/main" val="719749988"/>
+      </p:ext>
+    </p:extLst>
+  </p:cSld>
+  <p:clrMapOvr>
+    <a:masterClrMapping/>
+  </p:clrMapOvr>
+  <p:timing>
+    <p:tnLst>
+      <p:par>
+        <p:cTn id="1" dur="indefinite" restart="never" nodeType="tmRoot"/>
+      </p:par>
+    </p:tnLst>
+  </p:timing>
+</p:sld>
+</file>
+
+<file path=ppt/slides/slide17.xml><?xml version="1.0" encoding="utf-8"?>
+<p:sld xmlns:a="http://schemas.openxmlformats.org/drawingml/2006/main" xmlns:r="http://schemas.openxmlformats.org/officeDocument/2006/relationships" xmlns:p="http://schemas.openxmlformats.org/presentationml/2006/main">
+  <p:cSld>
+    <p:spTree>
+      <p:nvGrpSpPr>
+        <p:cNvPr id="1" name=""/>
+        <p:cNvGrpSpPr/>
+        <p:nvPr/>
+      </p:nvGrpSpPr>
+      <p:grpSpPr>
+        <a:xfrm>
+          <a:off x="0" y="0"/>
+          <a:ext cx="0" cy="0"/>
+          <a:chOff x="0" y="0"/>
+          <a:chExt cx="0" cy="0"/>
+        </a:xfrm>
+      </p:grpSpPr>
+      <p:sp>
+        <p:nvSpPr>
+          <p:cNvPr id="2" name="Título 1"/>
+          <p:cNvSpPr>
+            <a:spLocks noGrp="1"/>
+          </p:cNvSpPr>
+          <p:nvPr>
+            <p:ph type="title"/>
+          </p:nvPr>
+        </p:nvSpPr>
+        <p:spPr/>
+        <p:txBody>
+          <a:bodyPr/>
+          <a:lstStyle/>
+          <a:p>
+            <a:r>
+              <a:rPr lang="es-ES" dirty="0" smtClean="0"/>
+              <a:t>matrices</a:t>
+            </a:r>
+            <a:endParaRPr lang="en-US" dirty="0"/>
+          </a:p>
+        </p:txBody>
+      </p:sp>
+      <p:sp>
+        <p:nvSpPr>
+          <p:cNvPr id="3" name="Marcador de contenido 2"/>
+          <p:cNvSpPr>
+            <a:spLocks noGrp="1"/>
+          </p:cNvSpPr>
+          <p:nvPr>
+            <p:ph idx="1"/>
+          </p:nvPr>
+        </p:nvSpPr>
+        <p:spPr>
+          <a:xfrm>
+            <a:off x="1251678" y="2196392"/>
+            <a:ext cx="4074466" cy="3593591"/>
+          </a:xfrm>
+        </p:spPr>
+        <p:txBody>
+          <a:bodyPr/>
+          <a:lstStyle/>
+          <a:p>
+            <a:r>
+              <a:rPr lang="es-ES" dirty="0" smtClean="0"/>
+              <a:t>Una matriz es un espacio bidimensional que se asigna en la memoria del computador. A las matrices se les debe definir el tamaño especifico de filas y columnas.</a:t>
+            </a:r>
+            <a:endParaRPr lang="en-US" dirty="0"/>
+          </a:p>
+        </p:txBody>
+      </p:sp>
+      <p:pic>
+        <p:nvPicPr>
+          <p:cNvPr id="5" name="Imagen 4"/>
+          <p:cNvPicPr>
+            <a:picLocks noChangeAspect="1"/>
+          </p:cNvPicPr>
+          <p:nvPr/>
+        </p:nvPicPr>
+        <p:blipFill>
+          <a:blip r:embed="rId2"/>
+          <a:stretch>
+            <a:fillRect/>
+          </a:stretch>
+        </p:blipFill>
+        <p:spPr>
+          <a:xfrm>
+            <a:off x="6340839" y="1703159"/>
+            <a:ext cx="4157252" cy="4408699"/>
+          </a:xfrm>
+          <a:prstGeom prst="rect">
+            <a:avLst/>
+          </a:prstGeom>
+        </p:spPr>
+      </p:pic>
+    </p:spTree>
+    <p:extLst>
+      <p:ext uri="{BB962C8B-B14F-4D97-AF65-F5344CB8AC3E}">
+        <p14:creationId xmlns:p14="http://schemas.microsoft.com/office/powerpoint/2010/main" val="3595007734"/>
+      </p:ext>
+    </p:extLst>
+  </p:cSld>
+  <p:clrMapOvr>
+    <a:masterClrMapping/>
+  </p:clrMapOvr>
+  <p:timing>
+    <p:tnLst>
+      <p:par>
+        <p:cTn id="1" dur="indefinite" restart="never" nodeType="tmRoot"/>
+      </p:par>
+    </p:tnLst>
+  </p:timing>
 </p:sld>
 </file>
 

</xml_diff>